<commit_message>
Final doc, final ppt
</commit_message>
<xml_diff>
--- a/Tasks/M102.pptx
+++ b/Tasks/M102.pptx
@@ -28,12 +28,13 @@
     <p:sldId id="277" r:id="rId22"/>
     <p:sldId id="276" r:id="rId23"/>
     <p:sldId id="278" r:id="rId24"/>
-    <p:sldId id="279" r:id="rId25"/>
-    <p:sldId id="280" r:id="rId26"/>
-    <p:sldId id="281" r:id="rId27"/>
-    <p:sldId id="282" r:id="rId28"/>
-    <p:sldId id="283" r:id="rId29"/>
-    <p:sldId id="284" r:id="rId30"/>
+    <p:sldId id="285" r:id="rId25"/>
+    <p:sldId id="279" r:id="rId26"/>
+    <p:sldId id="280" r:id="rId27"/>
+    <p:sldId id="281" r:id="rId28"/>
+    <p:sldId id="282" r:id="rId29"/>
+    <p:sldId id="283" r:id="rId30"/>
+    <p:sldId id="284" r:id="rId31"/>
   </p:sldIdLst>
   <p:sldSz cx="9144000" cy="6858000" type="screen4x3"/>
   <p:notesSz cx="6858000" cy="9144000"/>
@@ -164,7 +165,7 @@
   </p:defaultTextStyle>
   <p:extLst>
     <p:ext uri="{EFAFB233-063F-42B5-8137-9DF3F51BA10A}">
-      <p15:sldGuideLst xmlns:p15="http://schemas.microsoft.com/office/powerpoint/2012/main">
+      <p15:sldGuideLst xmlns:p15="http://schemas.microsoft.com/office/powerpoint/2012/main" xmlns="">
         <p15:guide id="1" orient="horz" pos="2160">
           <p15:clr>
             <a:srgbClr val="A4A3A4"/>
@@ -203,7 +204,7 @@
           <p:cNvPr id="2" name="Τίτλος 1">
             <a:extLst>
               <a:ext uri="{FF2B5EF4-FFF2-40B4-BE49-F238E27FC236}">
-                <a16:creationId xmlns:a16="http://schemas.microsoft.com/office/drawing/2014/main" id="{8509AC75-F7AD-4E17-AE77-1D750C16E190}"/>
+                <a16:creationId xmlns:a16="http://schemas.microsoft.com/office/drawing/2014/main" xmlns="" id="{8509AC75-F7AD-4E17-AE77-1D750C16E190}"/>
               </a:ext>
             </a:extLst>
           </p:cNvPr>
@@ -240,7 +241,7 @@
           <p:cNvPr id="3" name="Υπότιτλος 2">
             <a:extLst>
               <a:ext uri="{FF2B5EF4-FFF2-40B4-BE49-F238E27FC236}">
-                <a16:creationId xmlns:a16="http://schemas.microsoft.com/office/drawing/2014/main" id="{EEF0878F-FCA1-402B-A233-79BE9F0F83AA}"/>
+                <a16:creationId xmlns:a16="http://schemas.microsoft.com/office/drawing/2014/main" xmlns="" id="{EEF0878F-FCA1-402B-A233-79BE9F0F83AA}"/>
               </a:ext>
             </a:extLst>
           </p:cNvPr>
@@ -310,7 +311,7 @@
           <p:cNvPr id="4" name="Θέση ημερομηνίας 3">
             <a:extLst>
               <a:ext uri="{FF2B5EF4-FFF2-40B4-BE49-F238E27FC236}">
-                <a16:creationId xmlns:a16="http://schemas.microsoft.com/office/drawing/2014/main" id="{867C03BC-2A28-48F3-938C-2B2EDDF4CF83}"/>
+                <a16:creationId xmlns:a16="http://schemas.microsoft.com/office/drawing/2014/main" xmlns="" id="{867C03BC-2A28-48F3-938C-2B2EDDF4CF83}"/>
               </a:ext>
             </a:extLst>
           </p:cNvPr>
@@ -339,7 +340,7 @@
           <p:cNvPr id="5" name="Θέση υποσέλιδου 4">
             <a:extLst>
               <a:ext uri="{FF2B5EF4-FFF2-40B4-BE49-F238E27FC236}">
-                <a16:creationId xmlns:a16="http://schemas.microsoft.com/office/drawing/2014/main" id="{B8E371A4-868D-43F2-9AD2-A7EB151691BA}"/>
+                <a16:creationId xmlns:a16="http://schemas.microsoft.com/office/drawing/2014/main" xmlns="" id="{B8E371A4-868D-43F2-9AD2-A7EB151691BA}"/>
               </a:ext>
             </a:extLst>
           </p:cNvPr>
@@ -368,7 +369,7 @@
           <p:cNvPr id="6" name="Θέση αριθμού διαφάνειας 5">
             <a:extLst>
               <a:ext uri="{FF2B5EF4-FFF2-40B4-BE49-F238E27FC236}">
-                <a16:creationId xmlns:a16="http://schemas.microsoft.com/office/drawing/2014/main" id="{754C6D34-29DB-47C6-9531-23E257C8821B}"/>
+                <a16:creationId xmlns:a16="http://schemas.microsoft.com/office/drawing/2014/main" xmlns="" id="{754C6D34-29DB-47C6-9531-23E257C8821B}"/>
               </a:ext>
             </a:extLst>
           </p:cNvPr>
@@ -400,7 +401,7 @@
     </p:spTree>
     <p:extLst>
       <p:ext uri="{BB962C8B-B14F-4D97-AF65-F5344CB8AC3E}">
-        <p14:creationId xmlns:p14="http://schemas.microsoft.com/office/powerpoint/2010/main" val="1015621782"/>
+        <p14:creationId xmlns:p14="http://schemas.microsoft.com/office/powerpoint/2010/main" xmlns="" val="1015621782"/>
       </p:ext>
     </p:extLst>
   </p:cSld>
@@ -432,7 +433,7 @@
           <p:cNvPr id="2" name="Τίτλος 1">
             <a:extLst>
               <a:ext uri="{FF2B5EF4-FFF2-40B4-BE49-F238E27FC236}">
-                <a16:creationId xmlns:a16="http://schemas.microsoft.com/office/drawing/2014/main" id="{E0177635-BDC8-47BD-9B47-9261EB430F9B}"/>
+                <a16:creationId xmlns:a16="http://schemas.microsoft.com/office/drawing/2014/main" xmlns="" id="{E0177635-BDC8-47BD-9B47-9261EB430F9B}"/>
               </a:ext>
             </a:extLst>
           </p:cNvPr>
@@ -460,7 +461,7 @@
           <p:cNvPr id="3" name="Θέση κατακόρυφου κειμένου 2">
             <a:extLst>
               <a:ext uri="{FF2B5EF4-FFF2-40B4-BE49-F238E27FC236}">
-                <a16:creationId xmlns:a16="http://schemas.microsoft.com/office/drawing/2014/main" id="{B079C817-0402-4E00-B731-849F6656ADD6}"/>
+                <a16:creationId xmlns:a16="http://schemas.microsoft.com/office/drawing/2014/main" xmlns="" id="{B079C817-0402-4E00-B731-849F6656ADD6}"/>
               </a:ext>
             </a:extLst>
           </p:cNvPr>
@@ -517,7 +518,7 @@
           <p:cNvPr id="4" name="Θέση ημερομηνίας 3">
             <a:extLst>
               <a:ext uri="{FF2B5EF4-FFF2-40B4-BE49-F238E27FC236}">
-                <a16:creationId xmlns:a16="http://schemas.microsoft.com/office/drawing/2014/main" id="{B94977BA-AB96-4F5B-99FB-877DB4F40D2C}"/>
+                <a16:creationId xmlns:a16="http://schemas.microsoft.com/office/drawing/2014/main" xmlns="" id="{B94977BA-AB96-4F5B-99FB-877DB4F40D2C}"/>
               </a:ext>
             </a:extLst>
           </p:cNvPr>
@@ -546,7 +547,7 @@
           <p:cNvPr id="5" name="Θέση υποσέλιδου 4">
             <a:extLst>
               <a:ext uri="{FF2B5EF4-FFF2-40B4-BE49-F238E27FC236}">
-                <a16:creationId xmlns:a16="http://schemas.microsoft.com/office/drawing/2014/main" id="{FC52D52F-4A96-47A6-AB5E-0D50D1F364DF}"/>
+                <a16:creationId xmlns:a16="http://schemas.microsoft.com/office/drawing/2014/main" xmlns="" id="{FC52D52F-4A96-47A6-AB5E-0D50D1F364DF}"/>
               </a:ext>
             </a:extLst>
           </p:cNvPr>
@@ -575,7 +576,7 @@
           <p:cNvPr id="6" name="Θέση αριθμού διαφάνειας 5">
             <a:extLst>
               <a:ext uri="{FF2B5EF4-FFF2-40B4-BE49-F238E27FC236}">
-                <a16:creationId xmlns:a16="http://schemas.microsoft.com/office/drawing/2014/main" id="{E154040A-7F55-45BB-B7D9-802A4EE5A491}"/>
+                <a16:creationId xmlns:a16="http://schemas.microsoft.com/office/drawing/2014/main" xmlns="" id="{E154040A-7F55-45BB-B7D9-802A4EE5A491}"/>
               </a:ext>
             </a:extLst>
           </p:cNvPr>
@@ -607,7 +608,7 @@
     </p:spTree>
     <p:extLst>
       <p:ext uri="{BB962C8B-B14F-4D97-AF65-F5344CB8AC3E}">
-        <p14:creationId xmlns:p14="http://schemas.microsoft.com/office/powerpoint/2010/main" val="3087340405"/>
+        <p14:creationId xmlns:p14="http://schemas.microsoft.com/office/powerpoint/2010/main" xmlns="" val="3087340405"/>
       </p:ext>
     </p:extLst>
   </p:cSld>
@@ -639,7 +640,7 @@
           <p:cNvPr id="2" name="Κατακόρυφος τίτλος 1">
             <a:extLst>
               <a:ext uri="{FF2B5EF4-FFF2-40B4-BE49-F238E27FC236}">
-                <a16:creationId xmlns:a16="http://schemas.microsoft.com/office/drawing/2014/main" id="{72E7E313-AFB5-4231-966C-2D8DFB5234E9}"/>
+                <a16:creationId xmlns:a16="http://schemas.microsoft.com/office/drawing/2014/main" xmlns="" id="{72E7E313-AFB5-4231-966C-2D8DFB5234E9}"/>
               </a:ext>
             </a:extLst>
           </p:cNvPr>
@@ -672,7 +673,7 @@
           <p:cNvPr id="3" name="Θέση κατακόρυφου κειμένου 2">
             <a:extLst>
               <a:ext uri="{FF2B5EF4-FFF2-40B4-BE49-F238E27FC236}">
-                <a16:creationId xmlns:a16="http://schemas.microsoft.com/office/drawing/2014/main" id="{F50A783C-B231-4C7C-BEE9-2F520EEB9536}"/>
+                <a16:creationId xmlns:a16="http://schemas.microsoft.com/office/drawing/2014/main" xmlns="" id="{F50A783C-B231-4C7C-BEE9-2F520EEB9536}"/>
               </a:ext>
             </a:extLst>
           </p:cNvPr>
@@ -734,7 +735,7 @@
           <p:cNvPr id="4" name="Θέση ημερομηνίας 3">
             <a:extLst>
               <a:ext uri="{FF2B5EF4-FFF2-40B4-BE49-F238E27FC236}">
-                <a16:creationId xmlns:a16="http://schemas.microsoft.com/office/drawing/2014/main" id="{7B3E5318-64A0-476E-BCDB-60056E83F5C3}"/>
+                <a16:creationId xmlns:a16="http://schemas.microsoft.com/office/drawing/2014/main" xmlns="" id="{7B3E5318-64A0-476E-BCDB-60056E83F5C3}"/>
               </a:ext>
             </a:extLst>
           </p:cNvPr>
@@ -763,7 +764,7 @@
           <p:cNvPr id="5" name="Θέση υποσέλιδου 4">
             <a:extLst>
               <a:ext uri="{FF2B5EF4-FFF2-40B4-BE49-F238E27FC236}">
-                <a16:creationId xmlns:a16="http://schemas.microsoft.com/office/drawing/2014/main" id="{66580386-8997-481A-91D9-3D244DBA6F1A}"/>
+                <a16:creationId xmlns:a16="http://schemas.microsoft.com/office/drawing/2014/main" xmlns="" id="{66580386-8997-481A-91D9-3D244DBA6F1A}"/>
               </a:ext>
             </a:extLst>
           </p:cNvPr>
@@ -792,7 +793,7 @@
           <p:cNvPr id="6" name="Θέση αριθμού διαφάνειας 5">
             <a:extLst>
               <a:ext uri="{FF2B5EF4-FFF2-40B4-BE49-F238E27FC236}">
-                <a16:creationId xmlns:a16="http://schemas.microsoft.com/office/drawing/2014/main" id="{A979E5BB-42F3-4620-8408-93563F428DE2}"/>
+                <a16:creationId xmlns:a16="http://schemas.microsoft.com/office/drawing/2014/main" xmlns="" id="{A979E5BB-42F3-4620-8408-93563F428DE2}"/>
               </a:ext>
             </a:extLst>
           </p:cNvPr>
@@ -824,7 +825,7 @@
     </p:spTree>
     <p:extLst>
       <p:ext uri="{BB962C8B-B14F-4D97-AF65-F5344CB8AC3E}">
-        <p14:creationId xmlns:p14="http://schemas.microsoft.com/office/powerpoint/2010/main" val="3973780500"/>
+        <p14:creationId xmlns:p14="http://schemas.microsoft.com/office/powerpoint/2010/main" xmlns="" val="3973780500"/>
       </p:ext>
     </p:extLst>
   </p:cSld>
@@ -856,7 +857,7 @@
           <p:cNvPr id="2" name="Τίτλος 1">
             <a:extLst>
               <a:ext uri="{FF2B5EF4-FFF2-40B4-BE49-F238E27FC236}">
-                <a16:creationId xmlns:a16="http://schemas.microsoft.com/office/drawing/2014/main" id="{946A6936-5B4C-4264-B0BD-ACF422487D73}"/>
+                <a16:creationId xmlns:a16="http://schemas.microsoft.com/office/drawing/2014/main" xmlns="" id="{946A6936-5B4C-4264-B0BD-ACF422487D73}"/>
               </a:ext>
             </a:extLst>
           </p:cNvPr>
@@ -884,7 +885,7 @@
           <p:cNvPr id="3" name="Θέση περιεχομένου 2">
             <a:extLst>
               <a:ext uri="{FF2B5EF4-FFF2-40B4-BE49-F238E27FC236}">
-                <a16:creationId xmlns:a16="http://schemas.microsoft.com/office/drawing/2014/main" id="{5965AAAA-29E5-4991-9C79-1E02A7637E82}"/>
+                <a16:creationId xmlns:a16="http://schemas.microsoft.com/office/drawing/2014/main" xmlns="" id="{5965AAAA-29E5-4991-9C79-1E02A7637E82}"/>
               </a:ext>
             </a:extLst>
           </p:cNvPr>
@@ -941,7 +942,7 @@
           <p:cNvPr id="4" name="Θέση ημερομηνίας 3">
             <a:extLst>
               <a:ext uri="{FF2B5EF4-FFF2-40B4-BE49-F238E27FC236}">
-                <a16:creationId xmlns:a16="http://schemas.microsoft.com/office/drawing/2014/main" id="{D49D9EBD-A58D-4462-9A98-D499BDBA12CC}"/>
+                <a16:creationId xmlns:a16="http://schemas.microsoft.com/office/drawing/2014/main" xmlns="" id="{D49D9EBD-A58D-4462-9A98-D499BDBA12CC}"/>
               </a:ext>
             </a:extLst>
           </p:cNvPr>
@@ -970,7 +971,7 @@
           <p:cNvPr id="5" name="Θέση υποσέλιδου 4">
             <a:extLst>
               <a:ext uri="{FF2B5EF4-FFF2-40B4-BE49-F238E27FC236}">
-                <a16:creationId xmlns:a16="http://schemas.microsoft.com/office/drawing/2014/main" id="{6F105102-E0E9-4E8C-AB33-D571E9937FF7}"/>
+                <a16:creationId xmlns:a16="http://schemas.microsoft.com/office/drawing/2014/main" xmlns="" id="{6F105102-E0E9-4E8C-AB33-D571E9937FF7}"/>
               </a:ext>
             </a:extLst>
           </p:cNvPr>
@@ -999,7 +1000,7 @@
           <p:cNvPr id="6" name="Θέση αριθμού διαφάνειας 5">
             <a:extLst>
               <a:ext uri="{FF2B5EF4-FFF2-40B4-BE49-F238E27FC236}">
-                <a16:creationId xmlns:a16="http://schemas.microsoft.com/office/drawing/2014/main" id="{AD98263E-88DE-4EB8-B153-98AB7BD5A610}"/>
+                <a16:creationId xmlns:a16="http://schemas.microsoft.com/office/drawing/2014/main" xmlns="" id="{AD98263E-88DE-4EB8-B153-98AB7BD5A610}"/>
               </a:ext>
             </a:extLst>
           </p:cNvPr>
@@ -1031,7 +1032,7 @@
     </p:spTree>
     <p:extLst>
       <p:ext uri="{BB962C8B-B14F-4D97-AF65-F5344CB8AC3E}">
-        <p14:creationId xmlns:p14="http://schemas.microsoft.com/office/powerpoint/2010/main" val="2408842492"/>
+        <p14:creationId xmlns:p14="http://schemas.microsoft.com/office/powerpoint/2010/main" xmlns="" val="2408842492"/>
       </p:ext>
     </p:extLst>
   </p:cSld>
@@ -1063,7 +1064,7 @@
           <p:cNvPr id="2" name="Τίτλος 1">
             <a:extLst>
               <a:ext uri="{FF2B5EF4-FFF2-40B4-BE49-F238E27FC236}">
-                <a16:creationId xmlns:a16="http://schemas.microsoft.com/office/drawing/2014/main" id="{30056D21-16F1-4B41-B00F-43ECCDD2970E}"/>
+                <a16:creationId xmlns:a16="http://schemas.microsoft.com/office/drawing/2014/main" xmlns="" id="{30056D21-16F1-4B41-B00F-43ECCDD2970E}"/>
               </a:ext>
             </a:extLst>
           </p:cNvPr>
@@ -1100,7 +1101,7 @@
           <p:cNvPr id="3" name="Θέση κειμένου 2">
             <a:extLst>
               <a:ext uri="{FF2B5EF4-FFF2-40B4-BE49-F238E27FC236}">
-                <a16:creationId xmlns:a16="http://schemas.microsoft.com/office/drawing/2014/main" id="{80E7CC5A-EE1E-4B74-9FF4-16DDDF7BBFFE}"/>
+                <a16:creationId xmlns:a16="http://schemas.microsoft.com/office/drawing/2014/main" xmlns="" id="{80E7CC5A-EE1E-4B74-9FF4-16DDDF7BBFFE}"/>
               </a:ext>
             </a:extLst>
           </p:cNvPr>
@@ -1171,7 +1172,7 @@
           <p:cNvPr id="4" name="Θέση ημερομηνίας 3">
             <a:extLst>
               <a:ext uri="{FF2B5EF4-FFF2-40B4-BE49-F238E27FC236}">
-                <a16:creationId xmlns:a16="http://schemas.microsoft.com/office/drawing/2014/main" id="{BD59FC7C-DDA0-439F-9FCF-F15C5FBC5F28}"/>
+                <a16:creationId xmlns:a16="http://schemas.microsoft.com/office/drawing/2014/main" xmlns="" id="{BD59FC7C-DDA0-439F-9FCF-F15C5FBC5F28}"/>
               </a:ext>
             </a:extLst>
           </p:cNvPr>
@@ -1200,7 +1201,7 @@
           <p:cNvPr id="5" name="Θέση υποσέλιδου 4">
             <a:extLst>
               <a:ext uri="{FF2B5EF4-FFF2-40B4-BE49-F238E27FC236}">
-                <a16:creationId xmlns:a16="http://schemas.microsoft.com/office/drawing/2014/main" id="{13683F84-6E82-49A2-A247-D3F23B15B485}"/>
+                <a16:creationId xmlns:a16="http://schemas.microsoft.com/office/drawing/2014/main" xmlns="" id="{13683F84-6E82-49A2-A247-D3F23B15B485}"/>
               </a:ext>
             </a:extLst>
           </p:cNvPr>
@@ -1229,7 +1230,7 @@
           <p:cNvPr id="6" name="Θέση αριθμού διαφάνειας 5">
             <a:extLst>
               <a:ext uri="{FF2B5EF4-FFF2-40B4-BE49-F238E27FC236}">
-                <a16:creationId xmlns:a16="http://schemas.microsoft.com/office/drawing/2014/main" id="{C2B0A562-92A3-4583-AE6E-1F59EC5BE9D6}"/>
+                <a16:creationId xmlns:a16="http://schemas.microsoft.com/office/drawing/2014/main" xmlns="" id="{C2B0A562-92A3-4583-AE6E-1F59EC5BE9D6}"/>
               </a:ext>
             </a:extLst>
           </p:cNvPr>
@@ -1261,7 +1262,7 @@
     </p:spTree>
     <p:extLst>
       <p:ext uri="{BB962C8B-B14F-4D97-AF65-F5344CB8AC3E}">
-        <p14:creationId xmlns:p14="http://schemas.microsoft.com/office/powerpoint/2010/main" val="2233495379"/>
+        <p14:creationId xmlns:p14="http://schemas.microsoft.com/office/powerpoint/2010/main" xmlns="" val="2233495379"/>
       </p:ext>
     </p:extLst>
   </p:cSld>
@@ -1293,7 +1294,7 @@
           <p:cNvPr id="2" name="Τίτλος 1">
             <a:extLst>
               <a:ext uri="{FF2B5EF4-FFF2-40B4-BE49-F238E27FC236}">
-                <a16:creationId xmlns:a16="http://schemas.microsoft.com/office/drawing/2014/main" id="{1E95B0B1-6FC6-4E5A-A530-20DC20BE3EA4}"/>
+                <a16:creationId xmlns:a16="http://schemas.microsoft.com/office/drawing/2014/main" xmlns="" id="{1E95B0B1-6FC6-4E5A-A530-20DC20BE3EA4}"/>
               </a:ext>
             </a:extLst>
           </p:cNvPr>
@@ -1321,7 +1322,7 @@
           <p:cNvPr id="3" name="Θέση περιεχομένου 2">
             <a:extLst>
               <a:ext uri="{FF2B5EF4-FFF2-40B4-BE49-F238E27FC236}">
-                <a16:creationId xmlns:a16="http://schemas.microsoft.com/office/drawing/2014/main" id="{33B973D2-B133-4CBC-9E74-430849527C5D}"/>
+                <a16:creationId xmlns:a16="http://schemas.microsoft.com/office/drawing/2014/main" xmlns="" id="{33B973D2-B133-4CBC-9E74-430849527C5D}"/>
               </a:ext>
             </a:extLst>
           </p:cNvPr>
@@ -1383,7 +1384,7 @@
           <p:cNvPr id="4" name="Θέση περιεχομένου 3">
             <a:extLst>
               <a:ext uri="{FF2B5EF4-FFF2-40B4-BE49-F238E27FC236}">
-                <a16:creationId xmlns:a16="http://schemas.microsoft.com/office/drawing/2014/main" id="{EC4FE06D-C5DA-4534-9752-AE3A9B14FB6C}"/>
+                <a16:creationId xmlns:a16="http://schemas.microsoft.com/office/drawing/2014/main" xmlns="" id="{EC4FE06D-C5DA-4534-9752-AE3A9B14FB6C}"/>
               </a:ext>
             </a:extLst>
           </p:cNvPr>
@@ -1445,7 +1446,7 @@
           <p:cNvPr id="5" name="Θέση ημερομηνίας 4">
             <a:extLst>
               <a:ext uri="{FF2B5EF4-FFF2-40B4-BE49-F238E27FC236}">
-                <a16:creationId xmlns:a16="http://schemas.microsoft.com/office/drawing/2014/main" id="{18E5D071-38DE-474E-9817-3E7880BE1485}"/>
+                <a16:creationId xmlns:a16="http://schemas.microsoft.com/office/drawing/2014/main" xmlns="" id="{18E5D071-38DE-474E-9817-3E7880BE1485}"/>
               </a:ext>
             </a:extLst>
           </p:cNvPr>
@@ -1474,7 +1475,7 @@
           <p:cNvPr id="6" name="Θέση υποσέλιδου 5">
             <a:extLst>
               <a:ext uri="{FF2B5EF4-FFF2-40B4-BE49-F238E27FC236}">
-                <a16:creationId xmlns:a16="http://schemas.microsoft.com/office/drawing/2014/main" id="{B566B170-75D6-4B4B-AD9B-CAF696A4A35F}"/>
+                <a16:creationId xmlns:a16="http://schemas.microsoft.com/office/drawing/2014/main" xmlns="" id="{B566B170-75D6-4B4B-AD9B-CAF696A4A35F}"/>
               </a:ext>
             </a:extLst>
           </p:cNvPr>
@@ -1503,7 +1504,7 @@
           <p:cNvPr id="7" name="Θέση αριθμού διαφάνειας 6">
             <a:extLst>
               <a:ext uri="{FF2B5EF4-FFF2-40B4-BE49-F238E27FC236}">
-                <a16:creationId xmlns:a16="http://schemas.microsoft.com/office/drawing/2014/main" id="{811F70E8-303C-4FF0-800D-D1615242AEBD}"/>
+                <a16:creationId xmlns:a16="http://schemas.microsoft.com/office/drawing/2014/main" xmlns="" id="{811F70E8-303C-4FF0-800D-D1615242AEBD}"/>
               </a:ext>
             </a:extLst>
           </p:cNvPr>
@@ -1535,7 +1536,7 @@
     </p:spTree>
     <p:extLst>
       <p:ext uri="{BB962C8B-B14F-4D97-AF65-F5344CB8AC3E}">
-        <p14:creationId xmlns:p14="http://schemas.microsoft.com/office/powerpoint/2010/main" val="2075222230"/>
+        <p14:creationId xmlns:p14="http://schemas.microsoft.com/office/powerpoint/2010/main" xmlns="" val="2075222230"/>
       </p:ext>
     </p:extLst>
   </p:cSld>
@@ -1567,7 +1568,7 @@
           <p:cNvPr id="2" name="Τίτλος 1">
             <a:extLst>
               <a:ext uri="{FF2B5EF4-FFF2-40B4-BE49-F238E27FC236}">
-                <a16:creationId xmlns:a16="http://schemas.microsoft.com/office/drawing/2014/main" id="{C2D10CCD-395F-4ED7-9AAB-AAC81F254D73}"/>
+                <a16:creationId xmlns:a16="http://schemas.microsoft.com/office/drawing/2014/main" xmlns="" id="{C2D10CCD-395F-4ED7-9AAB-AAC81F254D73}"/>
               </a:ext>
             </a:extLst>
           </p:cNvPr>
@@ -1600,7 +1601,7 @@
           <p:cNvPr id="3" name="Θέση κειμένου 2">
             <a:extLst>
               <a:ext uri="{FF2B5EF4-FFF2-40B4-BE49-F238E27FC236}">
-                <a16:creationId xmlns:a16="http://schemas.microsoft.com/office/drawing/2014/main" id="{90BA9849-8C4D-4297-B7C9-EC91315F8744}"/>
+                <a16:creationId xmlns:a16="http://schemas.microsoft.com/office/drawing/2014/main" xmlns="" id="{90BA9849-8C4D-4297-B7C9-EC91315F8744}"/>
               </a:ext>
             </a:extLst>
           </p:cNvPr>
@@ -1671,7 +1672,7 @@
           <p:cNvPr id="4" name="Θέση περιεχομένου 3">
             <a:extLst>
               <a:ext uri="{FF2B5EF4-FFF2-40B4-BE49-F238E27FC236}">
-                <a16:creationId xmlns:a16="http://schemas.microsoft.com/office/drawing/2014/main" id="{B62EE8A8-142F-4E91-A455-3A1E511C9C48}"/>
+                <a16:creationId xmlns:a16="http://schemas.microsoft.com/office/drawing/2014/main" xmlns="" id="{B62EE8A8-142F-4E91-A455-3A1E511C9C48}"/>
               </a:ext>
             </a:extLst>
           </p:cNvPr>
@@ -1733,7 +1734,7 @@
           <p:cNvPr id="5" name="Θέση κειμένου 4">
             <a:extLst>
               <a:ext uri="{FF2B5EF4-FFF2-40B4-BE49-F238E27FC236}">
-                <a16:creationId xmlns:a16="http://schemas.microsoft.com/office/drawing/2014/main" id="{4D11D8FD-AF48-4333-B3A3-C4F122916228}"/>
+                <a16:creationId xmlns:a16="http://schemas.microsoft.com/office/drawing/2014/main" xmlns="" id="{4D11D8FD-AF48-4333-B3A3-C4F122916228}"/>
               </a:ext>
             </a:extLst>
           </p:cNvPr>
@@ -1804,7 +1805,7 @@
           <p:cNvPr id="6" name="Θέση περιεχομένου 5">
             <a:extLst>
               <a:ext uri="{FF2B5EF4-FFF2-40B4-BE49-F238E27FC236}">
-                <a16:creationId xmlns:a16="http://schemas.microsoft.com/office/drawing/2014/main" id="{61C11A0D-27CC-43BB-9E44-02FA59E8AF88}"/>
+                <a16:creationId xmlns:a16="http://schemas.microsoft.com/office/drawing/2014/main" xmlns="" id="{61C11A0D-27CC-43BB-9E44-02FA59E8AF88}"/>
               </a:ext>
             </a:extLst>
           </p:cNvPr>
@@ -1866,7 +1867,7 @@
           <p:cNvPr id="7" name="Θέση ημερομηνίας 6">
             <a:extLst>
               <a:ext uri="{FF2B5EF4-FFF2-40B4-BE49-F238E27FC236}">
-                <a16:creationId xmlns:a16="http://schemas.microsoft.com/office/drawing/2014/main" id="{D2669FAE-F62C-479E-A394-64A93BE2DB15}"/>
+                <a16:creationId xmlns:a16="http://schemas.microsoft.com/office/drawing/2014/main" xmlns="" id="{D2669FAE-F62C-479E-A394-64A93BE2DB15}"/>
               </a:ext>
             </a:extLst>
           </p:cNvPr>
@@ -1895,7 +1896,7 @@
           <p:cNvPr id="8" name="Θέση υποσέλιδου 7">
             <a:extLst>
               <a:ext uri="{FF2B5EF4-FFF2-40B4-BE49-F238E27FC236}">
-                <a16:creationId xmlns:a16="http://schemas.microsoft.com/office/drawing/2014/main" id="{8A5EE5CA-B5F4-4C84-AACA-D771A798BAFA}"/>
+                <a16:creationId xmlns:a16="http://schemas.microsoft.com/office/drawing/2014/main" xmlns="" id="{8A5EE5CA-B5F4-4C84-AACA-D771A798BAFA}"/>
               </a:ext>
             </a:extLst>
           </p:cNvPr>
@@ -1924,7 +1925,7 @@
           <p:cNvPr id="9" name="Θέση αριθμού διαφάνειας 8">
             <a:extLst>
               <a:ext uri="{FF2B5EF4-FFF2-40B4-BE49-F238E27FC236}">
-                <a16:creationId xmlns:a16="http://schemas.microsoft.com/office/drawing/2014/main" id="{D1A6548F-E5D2-4D86-B4C9-BBD4FAD8CF31}"/>
+                <a16:creationId xmlns:a16="http://schemas.microsoft.com/office/drawing/2014/main" xmlns="" id="{D1A6548F-E5D2-4D86-B4C9-BBD4FAD8CF31}"/>
               </a:ext>
             </a:extLst>
           </p:cNvPr>
@@ -1956,7 +1957,7 @@
     </p:spTree>
     <p:extLst>
       <p:ext uri="{BB962C8B-B14F-4D97-AF65-F5344CB8AC3E}">
-        <p14:creationId xmlns:p14="http://schemas.microsoft.com/office/powerpoint/2010/main" val="4291809879"/>
+        <p14:creationId xmlns:p14="http://schemas.microsoft.com/office/powerpoint/2010/main" xmlns="" val="4291809879"/>
       </p:ext>
     </p:extLst>
   </p:cSld>
@@ -1988,7 +1989,7 @@
           <p:cNvPr id="2" name="Τίτλος 1">
             <a:extLst>
               <a:ext uri="{FF2B5EF4-FFF2-40B4-BE49-F238E27FC236}">
-                <a16:creationId xmlns:a16="http://schemas.microsoft.com/office/drawing/2014/main" id="{FD4485F6-1513-452F-B2E8-1DF01EA23343}"/>
+                <a16:creationId xmlns:a16="http://schemas.microsoft.com/office/drawing/2014/main" xmlns="" id="{FD4485F6-1513-452F-B2E8-1DF01EA23343}"/>
               </a:ext>
             </a:extLst>
           </p:cNvPr>
@@ -2016,7 +2017,7 @@
           <p:cNvPr id="3" name="Θέση ημερομηνίας 2">
             <a:extLst>
               <a:ext uri="{FF2B5EF4-FFF2-40B4-BE49-F238E27FC236}">
-                <a16:creationId xmlns:a16="http://schemas.microsoft.com/office/drawing/2014/main" id="{4C6D2844-A2A3-48FF-AB77-8A9DBF710AF6}"/>
+                <a16:creationId xmlns:a16="http://schemas.microsoft.com/office/drawing/2014/main" xmlns="" id="{4C6D2844-A2A3-48FF-AB77-8A9DBF710AF6}"/>
               </a:ext>
             </a:extLst>
           </p:cNvPr>
@@ -2045,7 +2046,7 @@
           <p:cNvPr id="4" name="Θέση υποσέλιδου 3">
             <a:extLst>
               <a:ext uri="{FF2B5EF4-FFF2-40B4-BE49-F238E27FC236}">
-                <a16:creationId xmlns:a16="http://schemas.microsoft.com/office/drawing/2014/main" id="{F37E8CF0-E03E-4CFA-A189-81D49BF231A5}"/>
+                <a16:creationId xmlns:a16="http://schemas.microsoft.com/office/drawing/2014/main" xmlns="" id="{F37E8CF0-E03E-4CFA-A189-81D49BF231A5}"/>
               </a:ext>
             </a:extLst>
           </p:cNvPr>
@@ -2074,7 +2075,7 @@
           <p:cNvPr id="5" name="Θέση αριθμού διαφάνειας 4">
             <a:extLst>
               <a:ext uri="{FF2B5EF4-FFF2-40B4-BE49-F238E27FC236}">
-                <a16:creationId xmlns:a16="http://schemas.microsoft.com/office/drawing/2014/main" id="{2F464A38-E9C0-4F02-A28A-8F8E94243C1D}"/>
+                <a16:creationId xmlns:a16="http://schemas.microsoft.com/office/drawing/2014/main" xmlns="" id="{2F464A38-E9C0-4F02-A28A-8F8E94243C1D}"/>
               </a:ext>
             </a:extLst>
           </p:cNvPr>
@@ -2106,7 +2107,7 @@
     </p:spTree>
     <p:extLst>
       <p:ext uri="{BB962C8B-B14F-4D97-AF65-F5344CB8AC3E}">
-        <p14:creationId xmlns:p14="http://schemas.microsoft.com/office/powerpoint/2010/main" val="2567529306"/>
+        <p14:creationId xmlns:p14="http://schemas.microsoft.com/office/powerpoint/2010/main" xmlns="" val="2567529306"/>
       </p:ext>
     </p:extLst>
   </p:cSld>
@@ -2138,7 +2139,7 @@
           <p:cNvPr id="2" name="Θέση ημερομηνίας 1">
             <a:extLst>
               <a:ext uri="{FF2B5EF4-FFF2-40B4-BE49-F238E27FC236}">
-                <a16:creationId xmlns:a16="http://schemas.microsoft.com/office/drawing/2014/main" id="{D80E1189-46B3-48E8-B4B0-A0C2A8D2F9D9}"/>
+                <a16:creationId xmlns:a16="http://schemas.microsoft.com/office/drawing/2014/main" xmlns="" id="{D80E1189-46B3-48E8-B4B0-A0C2A8D2F9D9}"/>
               </a:ext>
             </a:extLst>
           </p:cNvPr>
@@ -2167,7 +2168,7 @@
           <p:cNvPr id="3" name="Θέση υποσέλιδου 2">
             <a:extLst>
               <a:ext uri="{FF2B5EF4-FFF2-40B4-BE49-F238E27FC236}">
-                <a16:creationId xmlns:a16="http://schemas.microsoft.com/office/drawing/2014/main" id="{4374BEC9-86AA-4BB4-B539-ACF7D31FDAA8}"/>
+                <a16:creationId xmlns:a16="http://schemas.microsoft.com/office/drawing/2014/main" xmlns="" id="{4374BEC9-86AA-4BB4-B539-ACF7D31FDAA8}"/>
               </a:ext>
             </a:extLst>
           </p:cNvPr>
@@ -2196,7 +2197,7 @@
           <p:cNvPr id="4" name="Θέση αριθμού διαφάνειας 3">
             <a:extLst>
               <a:ext uri="{FF2B5EF4-FFF2-40B4-BE49-F238E27FC236}">
-                <a16:creationId xmlns:a16="http://schemas.microsoft.com/office/drawing/2014/main" id="{F6FCDA7D-797E-447D-ABCE-9F6E47C043A5}"/>
+                <a16:creationId xmlns:a16="http://schemas.microsoft.com/office/drawing/2014/main" xmlns="" id="{F6FCDA7D-797E-447D-ABCE-9F6E47C043A5}"/>
               </a:ext>
             </a:extLst>
           </p:cNvPr>
@@ -2228,7 +2229,7 @@
     </p:spTree>
     <p:extLst>
       <p:ext uri="{BB962C8B-B14F-4D97-AF65-F5344CB8AC3E}">
-        <p14:creationId xmlns:p14="http://schemas.microsoft.com/office/powerpoint/2010/main" val="394152131"/>
+        <p14:creationId xmlns:p14="http://schemas.microsoft.com/office/powerpoint/2010/main" xmlns="" val="394152131"/>
       </p:ext>
     </p:extLst>
   </p:cSld>
@@ -2260,7 +2261,7 @@
           <p:cNvPr id="2" name="Τίτλος 1">
             <a:extLst>
               <a:ext uri="{FF2B5EF4-FFF2-40B4-BE49-F238E27FC236}">
-                <a16:creationId xmlns:a16="http://schemas.microsoft.com/office/drawing/2014/main" id="{CA66F50E-74A6-4A4C-8FEB-8E24FA8BA759}"/>
+                <a16:creationId xmlns:a16="http://schemas.microsoft.com/office/drawing/2014/main" xmlns="" id="{CA66F50E-74A6-4A4C-8FEB-8E24FA8BA759}"/>
               </a:ext>
             </a:extLst>
           </p:cNvPr>
@@ -2297,7 +2298,7 @@
           <p:cNvPr id="3" name="Θέση περιεχομένου 2">
             <a:extLst>
               <a:ext uri="{FF2B5EF4-FFF2-40B4-BE49-F238E27FC236}">
-                <a16:creationId xmlns:a16="http://schemas.microsoft.com/office/drawing/2014/main" id="{0D0A7A68-79AA-4DEA-B7FF-01CFCE95FDC2}"/>
+                <a16:creationId xmlns:a16="http://schemas.microsoft.com/office/drawing/2014/main" xmlns="" id="{0D0A7A68-79AA-4DEA-B7FF-01CFCE95FDC2}"/>
               </a:ext>
             </a:extLst>
           </p:cNvPr>
@@ -2387,7 +2388,7 @@
           <p:cNvPr id="4" name="Θέση κειμένου 3">
             <a:extLst>
               <a:ext uri="{FF2B5EF4-FFF2-40B4-BE49-F238E27FC236}">
-                <a16:creationId xmlns:a16="http://schemas.microsoft.com/office/drawing/2014/main" id="{5B5216AE-014F-4CFA-9A1C-7A0401CACBF5}"/>
+                <a16:creationId xmlns:a16="http://schemas.microsoft.com/office/drawing/2014/main" xmlns="" id="{5B5216AE-014F-4CFA-9A1C-7A0401CACBF5}"/>
               </a:ext>
             </a:extLst>
           </p:cNvPr>
@@ -2458,7 +2459,7 @@
           <p:cNvPr id="5" name="Θέση ημερομηνίας 4">
             <a:extLst>
               <a:ext uri="{FF2B5EF4-FFF2-40B4-BE49-F238E27FC236}">
-                <a16:creationId xmlns:a16="http://schemas.microsoft.com/office/drawing/2014/main" id="{5337CB36-3A4C-4397-A907-9C0E60E128D2}"/>
+                <a16:creationId xmlns:a16="http://schemas.microsoft.com/office/drawing/2014/main" xmlns="" id="{5337CB36-3A4C-4397-A907-9C0E60E128D2}"/>
               </a:ext>
             </a:extLst>
           </p:cNvPr>
@@ -2487,7 +2488,7 @@
           <p:cNvPr id="6" name="Θέση υποσέλιδου 5">
             <a:extLst>
               <a:ext uri="{FF2B5EF4-FFF2-40B4-BE49-F238E27FC236}">
-                <a16:creationId xmlns:a16="http://schemas.microsoft.com/office/drawing/2014/main" id="{839CF776-85BA-400B-BCCE-D174C8DBFEA7}"/>
+                <a16:creationId xmlns:a16="http://schemas.microsoft.com/office/drawing/2014/main" xmlns="" id="{839CF776-85BA-400B-BCCE-D174C8DBFEA7}"/>
               </a:ext>
             </a:extLst>
           </p:cNvPr>
@@ -2516,7 +2517,7 @@
           <p:cNvPr id="7" name="Θέση αριθμού διαφάνειας 6">
             <a:extLst>
               <a:ext uri="{FF2B5EF4-FFF2-40B4-BE49-F238E27FC236}">
-                <a16:creationId xmlns:a16="http://schemas.microsoft.com/office/drawing/2014/main" id="{E40C10F8-6D93-4C6F-ADB1-63D3B5B3FA8D}"/>
+                <a16:creationId xmlns:a16="http://schemas.microsoft.com/office/drawing/2014/main" xmlns="" id="{E40C10F8-6D93-4C6F-ADB1-63D3B5B3FA8D}"/>
               </a:ext>
             </a:extLst>
           </p:cNvPr>
@@ -2548,7 +2549,7 @@
     </p:spTree>
     <p:extLst>
       <p:ext uri="{BB962C8B-B14F-4D97-AF65-F5344CB8AC3E}">
-        <p14:creationId xmlns:p14="http://schemas.microsoft.com/office/powerpoint/2010/main" val="1608026369"/>
+        <p14:creationId xmlns:p14="http://schemas.microsoft.com/office/powerpoint/2010/main" xmlns="" val="1608026369"/>
       </p:ext>
     </p:extLst>
   </p:cSld>
@@ -2580,7 +2581,7 @@
           <p:cNvPr id="2" name="Τίτλος 1">
             <a:extLst>
               <a:ext uri="{FF2B5EF4-FFF2-40B4-BE49-F238E27FC236}">
-                <a16:creationId xmlns:a16="http://schemas.microsoft.com/office/drawing/2014/main" id="{6AF9A0BF-278D-4AD8-BFFB-8B183ED94FDB}"/>
+                <a16:creationId xmlns:a16="http://schemas.microsoft.com/office/drawing/2014/main" xmlns="" id="{6AF9A0BF-278D-4AD8-BFFB-8B183ED94FDB}"/>
               </a:ext>
             </a:extLst>
           </p:cNvPr>
@@ -2617,7 +2618,7 @@
           <p:cNvPr id="3" name="Θέση εικόνας 2">
             <a:extLst>
               <a:ext uri="{FF2B5EF4-FFF2-40B4-BE49-F238E27FC236}">
-                <a16:creationId xmlns:a16="http://schemas.microsoft.com/office/drawing/2014/main" id="{27B216CB-B1D2-476F-A7C4-48BC69E4885E}"/>
+                <a16:creationId xmlns:a16="http://schemas.microsoft.com/office/drawing/2014/main" xmlns="" id="{27B216CB-B1D2-476F-A7C4-48BC69E4885E}"/>
               </a:ext>
             </a:extLst>
           </p:cNvPr>
@@ -2684,7 +2685,7 @@
           <p:cNvPr id="4" name="Θέση κειμένου 3">
             <a:extLst>
               <a:ext uri="{FF2B5EF4-FFF2-40B4-BE49-F238E27FC236}">
-                <a16:creationId xmlns:a16="http://schemas.microsoft.com/office/drawing/2014/main" id="{408B316B-87C3-46DF-8DBB-DA7469EC95FF}"/>
+                <a16:creationId xmlns:a16="http://schemas.microsoft.com/office/drawing/2014/main" xmlns="" id="{408B316B-87C3-46DF-8DBB-DA7469EC95FF}"/>
               </a:ext>
             </a:extLst>
           </p:cNvPr>
@@ -2755,7 +2756,7 @@
           <p:cNvPr id="5" name="Θέση ημερομηνίας 4">
             <a:extLst>
               <a:ext uri="{FF2B5EF4-FFF2-40B4-BE49-F238E27FC236}">
-                <a16:creationId xmlns:a16="http://schemas.microsoft.com/office/drawing/2014/main" id="{7ADABE8C-1E0B-4B46-96A7-E21311A7F81C}"/>
+                <a16:creationId xmlns:a16="http://schemas.microsoft.com/office/drawing/2014/main" xmlns="" id="{7ADABE8C-1E0B-4B46-96A7-E21311A7F81C}"/>
               </a:ext>
             </a:extLst>
           </p:cNvPr>
@@ -2784,7 +2785,7 @@
           <p:cNvPr id="6" name="Θέση υποσέλιδου 5">
             <a:extLst>
               <a:ext uri="{FF2B5EF4-FFF2-40B4-BE49-F238E27FC236}">
-                <a16:creationId xmlns:a16="http://schemas.microsoft.com/office/drawing/2014/main" id="{6B2223F8-FC8F-4D73-9BFA-53D9DD37A702}"/>
+                <a16:creationId xmlns:a16="http://schemas.microsoft.com/office/drawing/2014/main" xmlns="" id="{6B2223F8-FC8F-4D73-9BFA-53D9DD37A702}"/>
               </a:ext>
             </a:extLst>
           </p:cNvPr>
@@ -2813,7 +2814,7 @@
           <p:cNvPr id="7" name="Θέση αριθμού διαφάνειας 6">
             <a:extLst>
               <a:ext uri="{FF2B5EF4-FFF2-40B4-BE49-F238E27FC236}">
-                <a16:creationId xmlns:a16="http://schemas.microsoft.com/office/drawing/2014/main" id="{FA2CCB49-36C3-4A16-95EB-5C76F6B12626}"/>
+                <a16:creationId xmlns:a16="http://schemas.microsoft.com/office/drawing/2014/main" xmlns="" id="{FA2CCB49-36C3-4A16-95EB-5C76F6B12626}"/>
               </a:ext>
             </a:extLst>
           </p:cNvPr>
@@ -2845,7 +2846,7 @@
     </p:spTree>
     <p:extLst>
       <p:ext uri="{BB962C8B-B14F-4D97-AF65-F5344CB8AC3E}">
-        <p14:creationId xmlns:p14="http://schemas.microsoft.com/office/powerpoint/2010/main" val="1337766616"/>
+        <p14:creationId xmlns:p14="http://schemas.microsoft.com/office/powerpoint/2010/main" xmlns="" val="1337766616"/>
       </p:ext>
     </p:extLst>
   </p:cSld>
@@ -2861,7 +2862,7 @@
     <p:bg>
       <p:bgPr>
         <a:blipFill dpi="0" rotWithShape="0">
-          <a:blip r:embed="rId13"/>
+          <a:blip r:embed="rId13" cstate="print"/>
           <a:srcRect/>
           <a:stretch>
             <a:fillRect/>
@@ -2889,7 +2890,7 @@
           <p:cNvPr id="1026" name="Rectangle 2">
             <a:extLst>
               <a:ext uri="{FF2B5EF4-FFF2-40B4-BE49-F238E27FC236}">
-                <a16:creationId xmlns:a16="http://schemas.microsoft.com/office/drawing/2014/main" id="{1BEB1C84-A068-45B6-8189-C71A06D43A7C}"/>
+                <a16:creationId xmlns:a16="http://schemas.microsoft.com/office/drawing/2014/main" xmlns="" id="{1BEB1C84-A068-45B6-8189-C71A06D43A7C}"/>
               </a:ext>
             </a:extLst>
           </p:cNvPr>
@@ -2915,14 +2916,14 @@
           <a:effectLst/>
           <a:extLst>
             <a:ext uri="{909E8E84-426E-40DD-AFC4-6F175D3DCCD1}">
-              <a14:hiddenFill xmlns:a14="http://schemas.microsoft.com/office/drawing/2010/main">
+              <a14:hiddenFill xmlns:a14="http://schemas.microsoft.com/office/drawing/2010/main" xmlns="">
                 <a:solidFill>
                   <a:schemeClr val="accent1"/>
                 </a:solidFill>
               </a14:hiddenFill>
             </a:ext>
             <a:ext uri="{91240B29-F687-4F45-9708-019B960494DF}">
-              <a14:hiddenLine xmlns:a14="http://schemas.microsoft.com/office/drawing/2010/main" w="9525">
+              <a14:hiddenLine xmlns:a14="http://schemas.microsoft.com/office/drawing/2010/main" xmlns="" w="9525">
                 <a:solidFill>
                   <a:schemeClr val="tx1"/>
                 </a:solidFill>
@@ -2932,7 +2933,7 @@
               </a14:hiddenLine>
             </a:ext>
             <a:ext uri="{AF507438-7753-43E0-B8FC-AC1667EBCBE1}">
-              <a14:hiddenEffects xmlns:a14="http://schemas.microsoft.com/office/drawing/2010/main">
+              <a14:hiddenEffects xmlns:a14="http://schemas.microsoft.com/office/drawing/2010/main" xmlns="">
                 <a:effectLst>
                   <a:outerShdw dist="35921" dir="2700000" algn="ctr" rotWithShape="0">
                     <a:schemeClr val="bg2"/>
@@ -2963,7 +2964,7 @@
           <p:cNvPr id="1027" name="Rectangle 3">
             <a:extLst>
               <a:ext uri="{FF2B5EF4-FFF2-40B4-BE49-F238E27FC236}">
-                <a16:creationId xmlns:a16="http://schemas.microsoft.com/office/drawing/2014/main" id="{FD7D50F5-A978-40AA-A481-95B8F31498A8}"/>
+                <a16:creationId xmlns:a16="http://schemas.microsoft.com/office/drawing/2014/main" xmlns="" id="{FD7D50F5-A978-40AA-A481-95B8F31498A8}"/>
               </a:ext>
             </a:extLst>
           </p:cNvPr>
@@ -2989,14 +2990,14 @@
           <a:effectLst/>
           <a:extLst>
             <a:ext uri="{909E8E84-426E-40DD-AFC4-6F175D3DCCD1}">
-              <a14:hiddenFill xmlns:a14="http://schemas.microsoft.com/office/drawing/2010/main">
+              <a14:hiddenFill xmlns:a14="http://schemas.microsoft.com/office/drawing/2010/main" xmlns="">
                 <a:solidFill>
                   <a:schemeClr val="accent1"/>
                 </a:solidFill>
               </a14:hiddenFill>
             </a:ext>
             <a:ext uri="{91240B29-F687-4F45-9708-019B960494DF}">
-              <a14:hiddenLine xmlns:a14="http://schemas.microsoft.com/office/drawing/2010/main" w="9525">
+              <a14:hiddenLine xmlns:a14="http://schemas.microsoft.com/office/drawing/2010/main" xmlns="" w="9525">
                 <a:solidFill>
                   <a:schemeClr val="tx1"/>
                 </a:solidFill>
@@ -3006,7 +3007,7 @@
               </a14:hiddenLine>
             </a:ext>
             <a:ext uri="{AF507438-7753-43E0-B8FC-AC1667EBCBE1}">
-              <a14:hiddenEffects xmlns:a14="http://schemas.microsoft.com/office/drawing/2010/main">
+              <a14:hiddenEffects xmlns:a14="http://schemas.microsoft.com/office/drawing/2010/main" xmlns="">
                 <a:effectLst>
                   <a:outerShdw dist="35921" dir="2700000" algn="ctr" rotWithShape="0">
                     <a:schemeClr val="bg2"/>
@@ -3065,7 +3066,7 @@
           <p:cNvPr id="1028" name="Rectangle 4">
             <a:extLst>
               <a:ext uri="{FF2B5EF4-FFF2-40B4-BE49-F238E27FC236}">
-                <a16:creationId xmlns:a16="http://schemas.microsoft.com/office/drawing/2014/main" id="{02C40ADB-4FD2-47B1-B9B1-B057B9BA7ACE}"/>
+                <a16:creationId xmlns:a16="http://schemas.microsoft.com/office/drawing/2014/main" xmlns="" id="{02C40ADB-4FD2-47B1-B9B1-B057B9BA7ACE}"/>
               </a:ext>
             </a:extLst>
           </p:cNvPr>
@@ -3091,14 +3092,14 @@
           <a:effectLst/>
           <a:extLst>
             <a:ext uri="{909E8E84-426E-40DD-AFC4-6F175D3DCCD1}">
-              <a14:hiddenFill xmlns:a14="http://schemas.microsoft.com/office/drawing/2010/main">
+              <a14:hiddenFill xmlns:a14="http://schemas.microsoft.com/office/drawing/2010/main" xmlns="">
                 <a:solidFill>
                   <a:schemeClr val="accent1"/>
                 </a:solidFill>
               </a14:hiddenFill>
             </a:ext>
             <a:ext uri="{91240B29-F687-4F45-9708-019B960494DF}">
-              <a14:hiddenLine xmlns:a14="http://schemas.microsoft.com/office/drawing/2010/main" w="9525">
+              <a14:hiddenLine xmlns:a14="http://schemas.microsoft.com/office/drawing/2010/main" xmlns="" w="9525">
                 <a:solidFill>
                   <a:schemeClr val="tx1"/>
                 </a:solidFill>
@@ -3108,7 +3109,7 @@
               </a14:hiddenLine>
             </a:ext>
             <a:ext uri="{AF507438-7753-43E0-B8FC-AC1667EBCBE1}">
-              <a14:hiddenEffects xmlns:a14="http://schemas.microsoft.com/office/drawing/2010/main">
+              <a14:hiddenEffects xmlns:a14="http://schemas.microsoft.com/office/drawing/2010/main" xmlns="">
                 <a:effectLst>
                   <a:outerShdw dist="35921" dir="2700000" algn="ctr" rotWithShape="0">
                     <a:schemeClr val="bg2"/>
@@ -3139,7 +3140,7 @@
           <p:cNvPr id="1029" name="Rectangle 5">
             <a:extLst>
               <a:ext uri="{FF2B5EF4-FFF2-40B4-BE49-F238E27FC236}">
-                <a16:creationId xmlns:a16="http://schemas.microsoft.com/office/drawing/2014/main" id="{8BB8EA04-4F46-4FA8-8763-67E26F6D4518}"/>
+                <a16:creationId xmlns:a16="http://schemas.microsoft.com/office/drawing/2014/main" xmlns="" id="{8BB8EA04-4F46-4FA8-8763-67E26F6D4518}"/>
               </a:ext>
             </a:extLst>
           </p:cNvPr>
@@ -3165,14 +3166,14 @@
           <a:effectLst/>
           <a:extLst>
             <a:ext uri="{909E8E84-426E-40DD-AFC4-6F175D3DCCD1}">
-              <a14:hiddenFill xmlns:a14="http://schemas.microsoft.com/office/drawing/2010/main">
+              <a14:hiddenFill xmlns:a14="http://schemas.microsoft.com/office/drawing/2010/main" xmlns="">
                 <a:solidFill>
                   <a:schemeClr val="accent1"/>
                 </a:solidFill>
               </a14:hiddenFill>
             </a:ext>
             <a:ext uri="{91240B29-F687-4F45-9708-019B960494DF}">
-              <a14:hiddenLine xmlns:a14="http://schemas.microsoft.com/office/drawing/2010/main" w="9525">
+              <a14:hiddenLine xmlns:a14="http://schemas.microsoft.com/office/drawing/2010/main" xmlns="" w="9525">
                 <a:solidFill>
                   <a:schemeClr val="tx1"/>
                 </a:solidFill>
@@ -3182,7 +3183,7 @@
               </a14:hiddenLine>
             </a:ext>
             <a:ext uri="{AF507438-7753-43E0-B8FC-AC1667EBCBE1}">
-              <a14:hiddenEffects xmlns:a14="http://schemas.microsoft.com/office/drawing/2010/main">
+              <a14:hiddenEffects xmlns:a14="http://schemas.microsoft.com/office/drawing/2010/main" xmlns="">
                 <a:effectLst>
                   <a:outerShdw dist="35921" dir="2700000" algn="ctr" rotWithShape="0">
                     <a:schemeClr val="bg2"/>
@@ -3213,7 +3214,7 @@
           <p:cNvPr id="1030" name="Rectangle 6">
             <a:extLst>
               <a:ext uri="{FF2B5EF4-FFF2-40B4-BE49-F238E27FC236}">
-                <a16:creationId xmlns:a16="http://schemas.microsoft.com/office/drawing/2014/main" id="{9937D052-FC38-4E81-BE7A-8C0E9A7C95A0}"/>
+                <a16:creationId xmlns:a16="http://schemas.microsoft.com/office/drawing/2014/main" xmlns="" id="{9937D052-FC38-4E81-BE7A-8C0E9A7C95A0}"/>
               </a:ext>
             </a:extLst>
           </p:cNvPr>
@@ -3239,14 +3240,14 @@
           <a:effectLst/>
           <a:extLst>
             <a:ext uri="{909E8E84-426E-40DD-AFC4-6F175D3DCCD1}">
-              <a14:hiddenFill xmlns:a14="http://schemas.microsoft.com/office/drawing/2010/main">
+              <a14:hiddenFill xmlns:a14="http://schemas.microsoft.com/office/drawing/2010/main" xmlns="">
                 <a:solidFill>
                   <a:schemeClr val="accent1"/>
                 </a:solidFill>
               </a14:hiddenFill>
             </a:ext>
             <a:ext uri="{91240B29-F687-4F45-9708-019B960494DF}">
-              <a14:hiddenLine xmlns:a14="http://schemas.microsoft.com/office/drawing/2010/main" w="9525">
+              <a14:hiddenLine xmlns:a14="http://schemas.microsoft.com/office/drawing/2010/main" xmlns="" w="9525">
                 <a:solidFill>
                   <a:schemeClr val="tx1"/>
                 </a:solidFill>
@@ -3256,7 +3257,7 @@
               </a14:hiddenLine>
             </a:ext>
             <a:ext uri="{AF507438-7753-43E0-B8FC-AC1667EBCBE1}">
-              <a14:hiddenEffects xmlns:a14="http://schemas.microsoft.com/office/drawing/2010/main">
+              <a14:hiddenEffects xmlns:a14="http://schemas.microsoft.com/office/drawing/2010/main" xmlns="">
                 <a:effectLst>
                   <a:outerShdw dist="35921" dir="2700000" algn="ctr" rotWithShape="0">
                     <a:schemeClr val="bg2"/>
@@ -3706,7 +3707,7 @@
     <p:bg>
       <p:bgPr>
         <a:blipFill dpi="0" rotWithShape="0">
-          <a:blip r:embed="rId2">
+          <a:blip r:embed="rId2" cstate="print">
             <a:lum/>
           </a:blip>
           <a:srcRect/>
@@ -3736,7 +3737,7 @@
           <p:cNvPr id="2198" name="Rectangle 150">
             <a:extLst>
               <a:ext uri="{FF2B5EF4-FFF2-40B4-BE49-F238E27FC236}">
-                <a16:creationId xmlns:a16="http://schemas.microsoft.com/office/drawing/2014/main" id="{419DED07-BEEE-4682-9A6B-C3F37ABA6960}"/>
+                <a16:creationId xmlns:a16="http://schemas.microsoft.com/office/drawing/2014/main" xmlns="" id="{419DED07-BEEE-4682-9A6B-C3F37ABA6960}"/>
               </a:ext>
             </a:extLst>
           </p:cNvPr>
@@ -3781,7 +3782,7 @@
           <p:cNvPr id="2217" name="Rectangle 169">
             <a:extLst>
               <a:ext uri="{FF2B5EF4-FFF2-40B4-BE49-F238E27FC236}">
-                <a16:creationId xmlns:a16="http://schemas.microsoft.com/office/drawing/2014/main" id="{888B61AD-BB87-40B6-97B8-BF39A903ECF7}"/>
+                <a16:creationId xmlns:a16="http://schemas.microsoft.com/office/drawing/2014/main" xmlns="" id="{888B61AD-BB87-40B6-97B8-BF39A903ECF7}"/>
               </a:ext>
             </a:extLst>
           </p:cNvPr>
@@ -3805,14 +3806,14 @@
           <a:effectLst/>
           <a:extLst>
             <a:ext uri="{909E8E84-426E-40DD-AFC4-6F175D3DCCD1}">
-              <a14:hiddenFill xmlns:a14="http://schemas.microsoft.com/office/drawing/2010/main">
+              <a14:hiddenFill xmlns:a14="http://schemas.microsoft.com/office/drawing/2010/main" xmlns="">
                 <a:solidFill>
                   <a:schemeClr val="accent1"/>
                 </a:solidFill>
               </a14:hiddenFill>
             </a:ext>
             <a:ext uri="{91240B29-F687-4F45-9708-019B960494DF}">
-              <a14:hiddenLine xmlns:a14="http://schemas.microsoft.com/office/drawing/2010/main" w="9525">
+              <a14:hiddenLine xmlns:a14="http://schemas.microsoft.com/office/drawing/2010/main" xmlns="" w="9525">
                 <a:solidFill>
                   <a:schemeClr val="tx1"/>
                 </a:solidFill>
@@ -3822,7 +3823,7 @@
               </a14:hiddenLine>
             </a:ext>
             <a:ext uri="{AF507438-7753-43E0-B8FC-AC1667EBCBE1}">
-              <a14:hiddenEffects xmlns:a14="http://schemas.microsoft.com/office/drawing/2010/main">
+              <a14:hiddenEffects xmlns:a14="http://schemas.microsoft.com/office/drawing/2010/main" xmlns="">
                 <a:effectLst>
                   <a:outerShdw dist="35921" dir="2700000" algn="ctr" rotWithShape="0">
                     <a:schemeClr val="bg2"/>
@@ -3995,6 +3996,15 @@
               </a:rPr>
               <a:t>Νάσια</a:t>
             </a:r>
+            <a:r>
+              <a:rPr lang="el-GR" altLang="el-GR" sz="2000" b="1" dirty="0">
+                <a:solidFill>
+                  <a:schemeClr val="bg1"/>
+                </a:solidFill>
+                <a:latin typeface="Book Antiqua" panose="02040602050305030304" pitchFamily="18" charset="0"/>
+              </a:rPr>
+              <a:t/>
+            </a:r>
             <a:br>
               <a:rPr lang="el-GR" altLang="el-GR" sz="2000" b="1" dirty="0">
                 <a:solidFill>
@@ -4017,7 +4027,7 @@
           <p:cNvPr id="2" name="Ορθογώνιο 1">
             <a:extLst>
               <a:ext uri="{FF2B5EF4-FFF2-40B4-BE49-F238E27FC236}">
-                <a16:creationId xmlns:a16="http://schemas.microsoft.com/office/drawing/2014/main" id="{97F4FE3E-7A51-4117-8485-99A241533F5F}"/>
+                <a16:creationId xmlns:a16="http://schemas.microsoft.com/office/drawing/2014/main" xmlns="" id="{97F4FE3E-7A51-4117-8485-99A241533F5F}"/>
               </a:ext>
             </a:extLst>
           </p:cNvPr>
@@ -4103,7 +4113,7 @@
     <p:bg>
       <p:bgPr>
         <a:blipFill dpi="0" rotWithShape="0">
-          <a:blip r:embed="rId2">
+          <a:blip r:embed="rId2" cstate="print">
             <a:lum/>
           </a:blip>
           <a:srcRect/>
@@ -4133,7 +4143,7 @@
           <p:cNvPr id="2" name="Ορθογώνιο 1">
             <a:extLst>
               <a:ext uri="{FF2B5EF4-FFF2-40B4-BE49-F238E27FC236}">
-                <a16:creationId xmlns:a16="http://schemas.microsoft.com/office/drawing/2014/main" id="{7C7B8017-EC96-4686-A821-7348D3493D8E}"/>
+                <a16:creationId xmlns:a16="http://schemas.microsoft.com/office/drawing/2014/main" xmlns="" id="{7C7B8017-EC96-4686-A821-7348D3493D8E}"/>
               </a:ext>
             </a:extLst>
           </p:cNvPr>
@@ -4267,7 +4277,7 @@
           <p:cNvPr id="8" name="Rectangle 2">
             <a:extLst>
               <a:ext uri="{FF2B5EF4-FFF2-40B4-BE49-F238E27FC236}">
-                <a16:creationId xmlns:a16="http://schemas.microsoft.com/office/drawing/2014/main" id="{03793955-60FD-4DD3-B17A-7045EF66DA60}"/>
+                <a16:creationId xmlns:a16="http://schemas.microsoft.com/office/drawing/2014/main" xmlns="" id="{03793955-60FD-4DD3-B17A-7045EF66DA60}"/>
               </a:ext>
             </a:extLst>
           </p:cNvPr>
@@ -4335,7 +4345,7 @@
     </p:spTree>
     <p:extLst>
       <p:ext uri="{BB962C8B-B14F-4D97-AF65-F5344CB8AC3E}">
-        <p14:creationId xmlns:p14="http://schemas.microsoft.com/office/powerpoint/2010/main" val="151554975"/>
+        <p14:creationId xmlns:p14="http://schemas.microsoft.com/office/powerpoint/2010/main" xmlns="" val="151554975"/>
       </p:ext>
     </p:extLst>
   </p:cSld>
@@ -4351,7 +4361,7 @@
     <p:bg>
       <p:bgPr>
         <a:blipFill dpi="0" rotWithShape="0">
-          <a:blip r:embed="rId2">
+          <a:blip r:embed="rId2" cstate="print">
             <a:lum/>
           </a:blip>
           <a:srcRect/>
@@ -4381,7 +4391,7 @@
           <p:cNvPr id="3" name="Εικόνα 2">
             <a:extLst>
               <a:ext uri="{FF2B5EF4-FFF2-40B4-BE49-F238E27FC236}">
-                <a16:creationId xmlns:a16="http://schemas.microsoft.com/office/drawing/2014/main" id="{2036A9F0-EF8C-4399-BAC0-0F4A9EBBB909}"/>
+                <a16:creationId xmlns:a16="http://schemas.microsoft.com/office/drawing/2014/main" xmlns="" id="{2036A9F0-EF8C-4399-BAC0-0F4A9EBBB909}"/>
               </a:ext>
             </a:extLst>
           </p:cNvPr>
@@ -4391,7 +4401,7 @@
           <p:nvPr/>
         </p:nvPicPr>
         <p:blipFill>
-          <a:blip r:embed="rId3"/>
+          <a:blip r:embed="rId3" cstate="print"/>
           <a:stretch>
             <a:fillRect/>
           </a:stretch>
@@ -4411,7 +4421,7 @@
           <p:cNvPr id="2" name="Ορθογώνιο 1">
             <a:extLst>
               <a:ext uri="{FF2B5EF4-FFF2-40B4-BE49-F238E27FC236}">
-                <a16:creationId xmlns:a16="http://schemas.microsoft.com/office/drawing/2014/main" id="{7C7B8017-EC96-4686-A821-7348D3493D8E}"/>
+                <a16:creationId xmlns:a16="http://schemas.microsoft.com/office/drawing/2014/main" xmlns="" id="{7C7B8017-EC96-4686-A821-7348D3493D8E}"/>
               </a:ext>
             </a:extLst>
           </p:cNvPr>
@@ -4808,7 +4818,7 @@
           <p:cNvPr id="7" name="Rectangle 2">
             <a:extLst>
               <a:ext uri="{FF2B5EF4-FFF2-40B4-BE49-F238E27FC236}">
-                <a16:creationId xmlns:a16="http://schemas.microsoft.com/office/drawing/2014/main" id="{AFF43FAF-FC8E-4278-95A7-7E10B4826E2D}"/>
+                <a16:creationId xmlns:a16="http://schemas.microsoft.com/office/drawing/2014/main" xmlns="" id="{AFF43FAF-FC8E-4278-95A7-7E10B4826E2D}"/>
               </a:ext>
             </a:extLst>
           </p:cNvPr>
@@ -4876,7 +4886,7 @@
     </p:spTree>
     <p:extLst>
       <p:ext uri="{BB962C8B-B14F-4D97-AF65-F5344CB8AC3E}">
-        <p14:creationId xmlns:p14="http://schemas.microsoft.com/office/powerpoint/2010/main" val="2425994327"/>
+        <p14:creationId xmlns:p14="http://schemas.microsoft.com/office/powerpoint/2010/main" xmlns="" val="2425994327"/>
       </p:ext>
     </p:extLst>
   </p:cSld>
@@ -4892,7 +4902,7 @@
     <p:bg>
       <p:bgPr>
         <a:blipFill dpi="0" rotWithShape="0">
-          <a:blip r:embed="rId2">
+          <a:blip r:embed="rId2" cstate="print">
             <a:lum/>
           </a:blip>
           <a:srcRect/>
@@ -4922,7 +4932,7 @@
           <p:cNvPr id="2" name="Ορθογώνιο 1">
             <a:extLst>
               <a:ext uri="{FF2B5EF4-FFF2-40B4-BE49-F238E27FC236}">
-                <a16:creationId xmlns:a16="http://schemas.microsoft.com/office/drawing/2014/main" id="{7C7B8017-EC96-4686-A821-7348D3493D8E}"/>
+                <a16:creationId xmlns:a16="http://schemas.microsoft.com/office/drawing/2014/main" xmlns="" id="{7C7B8017-EC96-4686-A821-7348D3493D8E}"/>
               </a:ext>
             </a:extLst>
           </p:cNvPr>
@@ -5073,7 +5083,7 @@
           <p:cNvPr id="7" name="Rectangle 2">
             <a:extLst>
               <a:ext uri="{FF2B5EF4-FFF2-40B4-BE49-F238E27FC236}">
-                <a16:creationId xmlns:a16="http://schemas.microsoft.com/office/drawing/2014/main" id="{40495734-AFE3-496B-A12C-F11F733ACD28}"/>
+                <a16:creationId xmlns:a16="http://schemas.microsoft.com/office/drawing/2014/main" xmlns="" id="{40495734-AFE3-496B-A12C-F11F733ACD28}"/>
               </a:ext>
             </a:extLst>
           </p:cNvPr>
@@ -5163,7 +5173,7 @@
     </p:spTree>
     <p:extLst>
       <p:ext uri="{BB962C8B-B14F-4D97-AF65-F5344CB8AC3E}">
-        <p14:creationId xmlns:p14="http://schemas.microsoft.com/office/powerpoint/2010/main" val="1373200867"/>
+        <p14:creationId xmlns:p14="http://schemas.microsoft.com/office/powerpoint/2010/main" xmlns="" val="1373200867"/>
       </p:ext>
     </p:extLst>
   </p:cSld>
@@ -5179,7 +5189,7 @@
     <p:bg>
       <p:bgPr>
         <a:blipFill dpi="0" rotWithShape="0">
-          <a:blip r:embed="rId2">
+          <a:blip r:embed="rId2" cstate="print">
             <a:lum/>
           </a:blip>
           <a:srcRect/>
@@ -5209,7 +5219,7 @@
           <p:cNvPr id="2" name="Ορθογώνιο 1">
             <a:extLst>
               <a:ext uri="{FF2B5EF4-FFF2-40B4-BE49-F238E27FC236}">
-                <a16:creationId xmlns:a16="http://schemas.microsoft.com/office/drawing/2014/main" id="{7C7B8017-EC96-4686-A821-7348D3493D8E}"/>
+                <a16:creationId xmlns:a16="http://schemas.microsoft.com/office/drawing/2014/main" xmlns="" id="{7C7B8017-EC96-4686-A821-7348D3493D8E}"/>
               </a:ext>
             </a:extLst>
           </p:cNvPr>
@@ -5628,7 +5638,7 @@
           <p:cNvPr id="6" name="Rectangle 2">
             <a:extLst>
               <a:ext uri="{FF2B5EF4-FFF2-40B4-BE49-F238E27FC236}">
-                <a16:creationId xmlns:a16="http://schemas.microsoft.com/office/drawing/2014/main" id="{55E8F6C5-F1C4-4800-B74A-A1E41A46CC98}"/>
+                <a16:creationId xmlns:a16="http://schemas.microsoft.com/office/drawing/2014/main" xmlns="" id="{55E8F6C5-F1C4-4800-B74A-A1E41A46CC98}"/>
               </a:ext>
             </a:extLst>
           </p:cNvPr>
@@ -5696,7 +5706,7 @@
     </p:spTree>
     <p:extLst>
       <p:ext uri="{BB962C8B-B14F-4D97-AF65-F5344CB8AC3E}">
-        <p14:creationId xmlns:p14="http://schemas.microsoft.com/office/powerpoint/2010/main" val="1422321153"/>
+        <p14:creationId xmlns:p14="http://schemas.microsoft.com/office/powerpoint/2010/main" xmlns="" val="1422321153"/>
       </p:ext>
     </p:extLst>
   </p:cSld>
@@ -5712,7 +5722,7 @@
     <p:bg>
       <p:bgPr>
         <a:blipFill dpi="0" rotWithShape="0">
-          <a:blip r:embed="rId2">
+          <a:blip r:embed="rId2" cstate="print">
             <a:lum/>
           </a:blip>
           <a:srcRect/>
@@ -5742,7 +5752,7 @@
           <p:cNvPr id="2" name="Ορθογώνιο 1">
             <a:extLst>
               <a:ext uri="{FF2B5EF4-FFF2-40B4-BE49-F238E27FC236}">
-                <a16:creationId xmlns:a16="http://schemas.microsoft.com/office/drawing/2014/main" id="{7C7B8017-EC96-4686-A821-7348D3493D8E}"/>
+                <a16:creationId xmlns:a16="http://schemas.microsoft.com/office/drawing/2014/main" xmlns="" id="{7C7B8017-EC96-4686-A821-7348D3493D8E}"/>
               </a:ext>
             </a:extLst>
           </p:cNvPr>
@@ -6037,7 +6047,7 @@
           <p:cNvPr id="6" name="Rectangle 2">
             <a:extLst>
               <a:ext uri="{FF2B5EF4-FFF2-40B4-BE49-F238E27FC236}">
-                <a16:creationId xmlns:a16="http://schemas.microsoft.com/office/drawing/2014/main" id="{0BCB5EA5-592D-4F09-A7CA-ABF7BA41AC12}"/>
+                <a16:creationId xmlns:a16="http://schemas.microsoft.com/office/drawing/2014/main" xmlns="" id="{0BCB5EA5-592D-4F09-A7CA-ABF7BA41AC12}"/>
               </a:ext>
             </a:extLst>
           </p:cNvPr>
@@ -6127,7 +6137,7 @@
     </p:spTree>
     <p:extLst>
       <p:ext uri="{BB962C8B-B14F-4D97-AF65-F5344CB8AC3E}">
-        <p14:creationId xmlns:p14="http://schemas.microsoft.com/office/powerpoint/2010/main" val="727961905"/>
+        <p14:creationId xmlns:p14="http://schemas.microsoft.com/office/powerpoint/2010/main" xmlns="" val="727961905"/>
       </p:ext>
     </p:extLst>
   </p:cSld>
@@ -6143,7 +6153,7 @@
     <p:bg>
       <p:bgPr>
         <a:blipFill dpi="0" rotWithShape="0">
-          <a:blip r:embed="rId2">
+          <a:blip r:embed="rId2" cstate="print">
             <a:lum/>
           </a:blip>
           <a:srcRect/>
@@ -6173,7 +6183,7 @@
           <p:cNvPr id="2" name="Ορθογώνιο 1">
             <a:extLst>
               <a:ext uri="{FF2B5EF4-FFF2-40B4-BE49-F238E27FC236}">
-                <a16:creationId xmlns:a16="http://schemas.microsoft.com/office/drawing/2014/main" id="{7C7B8017-EC96-4686-A821-7348D3493D8E}"/>
+                <a16:creationId xmlns:a16="http://schemas.microsoft.com/office/drawing/2014/main" xmlns="" id="{7C7B8017-EC96-4686-A821-7348D3493D8E}"/>
               </a:ext>
             </a:extLst>
           </p:cNvPr>
@@ -6699,7 +6709,7 @@
           <p:cNvPr id="6" name="Rectangle 2">
             <a:extLst>
               <a:ext uri="{FF2B5EF4-FFF2-40B4-BE49-F238E27FC236}">
-                <a16:creationId xmlns:a16="http://schemas.microsoft.com/office/drawing/2014/main" id="{F84B8DAE-73D9-4A04-A2A9-933B5CE35547}"/>
+                <a16:creationId xmlns:a16="http://schemas.microsoft.com/office/drawing/2014/main" xmlns="" id="{F84B8DAE-73D9-4A04-A2A9-933B5CE35547}"/>
               </a:ext>
             </a:extLst>
           </p:cNvPr>
@@ -6767,7 +6777,7 @@
     </p:spTree>
     <p:extLst>
       <p:ext uri="{BB962C8B-B14F-4D97-AF65-F5344CB8AC3E}">
-        <p14:creationId xmlns:p14="http://schemas.microsoft.com/office/powerpoint/2010/main" val="3120832157"/>
+        <p14:creationId xmlns:p14="http://schemas.microsoft.com/office/powerpoint/2010/main" xmlns="" val="3120832157"/>
       </p:ext>
     </p:extLst>
   </p:cSld>
@@ -6783,7 +6793,7 @@
     <p:bg>
       <p:bgPr>
         <a:blipFill dpi="0" rotWithShape="0">
-          <a:blip r:embed="rId2">
+          <a:blip r:embed="rId2" cstate="print">
             <a:lum/>
           </a:blip>
           <a:srcRect/>
@@ -6813,7 +6823,7 @@
           <p:cNvPr id="144386" name="Rectangle 2">
             <a:extLst>
               <a:ext uri="{FF2B5EF4-FFF2-40B4-BE49-F238E27FC236}">
-                <a16:creationId xmlns:a16="http://schemas.microsoft.com/office/drawing/2014/main" id="{B2EB9881-15D2-4027-87B7-1B2E12624292}"/>
+                <a16:creationId xmlns:a16="http://schemas.microsoft.com/office/drawing/2014/main" xmlns="" id="{B2EB9881-15D2-4027-87B7-1B2E12624292}"/>
               </a:ext>
             </a:extLst>
           </p:cNvPr>
@@ -6878,7 +6888,7 @@
           <p:cNvPr id="2" name="Ορθογώνιο 1">
             <a:extLst>
               <a:ext uri="{FF2B5EF4-FFF2-40B4-BE49-F238E27FC236}">
-                <a16:creationId xmlns:a16="http://schemas.microsoft.com/office/drawing/2014/main" id="{7C7B8017-EC96-4686-A821-7348D3493D8E}"/>
+                <a16:creationId xmlns:a16="http://schemas.microsoft.com/office/drawing/2014/main" xmlns="" id="{7C7B8017-EC96-4686-A821-7348D3493D8E}"/>
               </a:ext>
             </a:extLst>
           </p:cNvPr>
@@ -6966,7 +6976,7 @@
     </p:spTree>
     <p:extLst>
       <p:ext uri="{BB962C8B-B14F-4D97-AF65-F5344CB8AC3E}">
-        <p14:creationId xmlns:p14="http://schemas.microsoft.com/office/powerpoint/2010/main" val="4156339628"/>
+        <p14:creationId xmlns:p14="http://schemas.microsoft.com/office/powerpoint/2010/main" xmlns="" val="4156339628"/>
       </p:ext>
     </p:extLst>
   </p:cSld>
@@ -6982,7 +6992,7 @@
     <p:bg>
       <p:bgPr>
         <a:blipFill dpi="0" rotWithShape="0">
-          <a:blip r:embed="rId2">
+          <a:blip r:embed="rId2" cstate="print">
             <a:lum/>
           </a:blip>
           <a:srcRect/>
@@ -7012,7 +7022,7 @@
           <p:cNvPr id="144386" name="Rectangle 2">
             <a:extLst>
               <a:ext uri="{FF2B5EF4-FFF2-40B4-BE49-F238E27FC236}">
-                <a16:creationId xmlns:a16="http://schemas.microsoft.com/office/drawing/2014/main" id="{B2EB9881-15D2-4027-87B7-1B2E12624292}"/>
+                <a16:creationId xmlns:a16="http://schemas.microsoft.com/office/drawing/2014/main" xmlns="" id="{B2EB9881-15D2-4027-87B7-1B2E12624292}"/>
               </a:ext>
             </a:extLst>
           </p:cNvPr>
@@ -7069,7 +7079,7 @@
           <p:cNvPr id="2" name="Ορθογώνιο 1">
             <a:extLst>
               <a:ext uri="{FF2B5EF4-FFF2-40B4-BE49-F238E27FC236}">
-                <a16:creationId xmlns:a16="http://schemas.microsoft.com/office/drawing/2014/main" id="{7C7B8017-EC96-4686-A821-7348D3493D8E}"/>
+                <a16:creationId xmlns:a16="http://schemas.microsoft.com/office/drawing/2014/main" xmlns="" id="{7C7B8017-EC96-4686-A821-7348D3493D8E}"/>
               </a:ext>
             </a:extLst>
           </p:cNvPr>
@@ -7360,7 +7370,7 @@
     </p:spTree>
     <p:extLst>
       <p:ext uri="{BB962C8B-B14F-4D97-AF65-F5344CB8AC3E}">
-        <p14:creationId xmlns:p14="http://schemas.microsoft.com/office/powerpoint/2010/main" val="961527294"/>
+        <p14:creationId xmlns:p14="http://schemas.microsoft.com/office/powerpoint/2010/main" xmlns="" val="961527294"/>
       </p:ext>
     </p:extLst>
   </p:cSld>
@@ -7376,7 +7386,7 @@
     <p:bg>
       <p:bgPr>
         <a:blipFill dpi="0" rotWithShape="0">
-          <a:blip r:embed="rId2">
+          <a:blip r:embed="rId2" cstate="print">
             <a:lum/>
           </a:blip>
           <a:srcRect/>
@@ -7406,7 +7416,7 @@
           <p:cNvPr id="144386" name="Rectangle 2">
             <a:extLst>
               <a:ext uri="{FF2B5EF4-FFF2-40B4-BE49-F238E27FC236}">
-                <a16:creationId xmlns:a16="http://schemas.microsoft.com/office/drawing/2014/main" id="{B2EB9881-15D2-4027-87B7-1B2E12624292}"/>
+                <a16:creationId xmlns:a16="http://schemas.microsoft.com/office/drawing/2014/main" xmlns="" id="{B2EB9881-15D2-4027-87B7-1B2E12624292}"/>
               </a:ext>
             </a:extLst>
           </p:cNvPr>
@@ -7463,7 +7473,7 @@
           <p:cNvPr id="2" name="Ορθογώνιο 1">
             <a:extLst>
               <a:ext uri="{FF2B5EF4-FFF2-40B4-BE49-F238E27FC236}">
-                <a16:creationId xmlns:a16="http://schemas.microsoft.com/office/drawing/2014/main" id="{7C7B8017-EC96-4686-A821-7348D3493D8E}"/>
+                <a16:creationId xmlns:a16="http://schemas.microsoft.com/office/drawing/2014/main" xmlns="" id="{7C7B8017-EC96-4686-A821-7348D3493D8E}"/>
               </a:ext>
             </a:extLst>
           </p:cNvPr>
@@ -7662,7 +7672,7 @@
     </p:spTree>
     <p:extLst>
       <p:ext uri="{BB962C8B-B14F-4D97-AF65-F5344CB8AC3E}">
-        <p14:creationId xmlns:p14="http://schemas.microsoft.com/office/powerpoint/2010/main" val="1882066487"/>
+        <p14:creationId xmlns:p14="http://schemas.microsoft.com/office/powerpoint/2010/main" xmlns="" val="1882066487"/>
       </p:ext>
     </p:extLst>
   </p:cSld>
@@ -7678,7 +7688,7 @@
     <p:bg>
       <p:bgPr>
         <a:blipFill dpi="0" rotWithShape="0">
-          <a:blip r:embed="rId2">
+          <a:blip r:embed="rId2" cstate="print">
             <a:lum/>
           </a:blip>
           <a:srcRect/>
@@ -7708,7 +7718,7 @@
           <p:cNvPr id="144386" name="Rectangle 2">
             <a:extLst>
               <a:ext uri="{FF2B5EF4-FFF2-40B4-BE49-F238E27FC236}">
-                <a16:creationId xmlns:a16="http://schemas.microsoft.com/office/drawing/2014/main" id="{B2EB9881-15D2-4027-87B7-1B2E12624292}"/>
+                <a16:creationId xmlns:a16="http://schemas.microsoft.com/office/drawing/2014/main" xmlns="" id="{B2EB9881-15D2-4027-87B7-1B2E12624292}"/>
               </a:ext>
             </a:extLst>
           </p:cNvPr>
@@ -7773,7 +7783,7 @@
           <p:cNvPr id="2" name="Ορθογώνιο 1">
             <a:extLst>
               <a:ext uri="{FF2B5EF4-FFF2-40B4-BE49-F238E27FC236}">
-                <a16:creationId xmlns:a16="http://schemas.microsoft.com/office/drawing/2014/main" id="{7C7B8017-EC96-4686-A821-7348D3493D8E}"/>
+                <a16:creationId xmlns:a16="http://schemas.microsoft.com/office/drawing/2014/main" xmlns="" id="{7C7B8017-EC96-4686-A821-7348D3493D8E}"/>
               </a:ext>
             </a:extLst>
           </p:cNvPr>
@@ -8055,7 +8065,7 @@
     </p:spTree>
     <p:extLst>
       <p:ext uri="{BB962C8B-B14F-4D97-AF65-F5344CB8AC3E}">
-        <p14:creationId xmlns:p14="http://schemas.microsoft.com/office/powerpoint/2010/main" val="2167706445"/>
+        <p14:creationId xmlns:p14="http://schemas.microsoft.com/office/powerpoint/2010/main" xmlns="" val="2167706445"/>
       </p:ext>
     </p:extLst>
   </p:cSld>
@@ -8071,7 +8081,7 @@
     <p:bg>
       <p:bgPr>
         <a:blipFill dpi="0" rotWithShape="0">
-          <a:blip r:embed="rId2">
+          <a:blip r:embed="rId2" cstate="print">
             <a:lum/>
           </a:blip>
           <a:srcRect/>
@@ -8101,7 +8111,7 @@
           <p:cNvPr id="144386" name="Rectangle 2">
             <a:extLst>
               <a:ext uri="{FF2B5EF4-FFF2-40B4-BE49-F238E27FC236}">
-                <a16:creationId xmlns:a16="http://schemas.microsoft.com/office/drawing/2014/main" id="{B2EB9881-15D2-4027-87B7-1B2E12624292}"/>
+                <a16:creationId xmlns:a16="http://schemas.microsoft.com/office/drawing/2014/main" xmlns="" id="{B2EB9881-15D2-4027-87B7-1B2E12624292}"/>
               </a:ext>
             </a:extLst>
           </p:cNvPr>
@@ -8137,7 +8147,7 @@
           <p:cNvPr id="144387" name="Rectangle 3">
             <a:extLst>
               <a:ext uri="{FF2B5EF4-FFF2-40B4-BE49-F238E27FC236}">
-                <a16:creationId xmlns:a16="http://schemas.microsoft.com/office/drawing/2014/main" id="{A5117173-5269-49CE-9C9C-5972DE27F6FF}"/>
+                <a16:creationId xmlns:a16="http://schemas.microsoft.com/office/drawing/2014/main" xmlns="" id="{A5117173-5269-49CE-9C9C-5972DE27F6FF}"/>
               </a:ext>
             </a:extLst>
           </p:cNvPr>
@@ -8331,7 +8341,7 @@
     <p:bg>
       <p:bgPr>
         <a:blipFill dpi="0" rotWithShape="0">
-          <a:blip r:embed="rId2">
+          <a:blip r:embed="rId2" cstate="print">
             <a:lum/>
           </a:blip>
           <a:srcRect/>
@@ -8361,7 +8371,7 @@
           <p:cNvPr id="144386" name="Rectangle 2">
             <a:extLst>
               <a:ext uri="{FF2B5EF4-FFF2-40B4-BE49-F238E27FC236}">
-                <a16:creationId xmlns:a16="http://schemas.microsoft.com/office/drawing/2014/main" id="{B2EB9881-15D2-4027-87B7-1B2E12624292}"/>
+                <a16:creationId xmlns:a16="http://schemas.microsoft.com/office/drawing/2014/main" xmlns="" id="{B2EB9881-15D2-4027-87B7-1B2E12624292}"/>
               </a:ext>
             </a:extLst>
           </p:cNvPr>
@@ -8397,7 +8407,7 @@
           <p:cNvPr id="2" name="Ορθογώνιο 1">
             <a:extLst>
               <a:ext uri="{FF2B5EF4-FFF2-40B4-BE49-F238E27FC236}">
-                <a16:creationId xmlns:a16="http://schemas.microsoft.com/office/drawing/2014/main" id="{7C7B8017-EC96-4686-A821-7348D3493D8E}"/>
+                <a16:creationId xmlns:a16="http://schemas.microsoft.com/office/drawing/2014/main" xmlns="" id="{7C7B8017-EC96-4686-A821-7348D3493D8E}"/>
               </a:ext>
             </a:extLst>
           </p:cNvPr>
@@ -8639,7 +8649,7 @@
     </p:spTree>
     <p:extLst>
       <p:ext uri="{BB962C8B-B14F-4D97-AF65-F5344CB8AC3E}">
-        <p14:creationId xmlns:p14="http://schemas.microsoft.com/office/powerpoint/2010/main" val="1812781141"/>
+        <p14:creationId xmlns:p14="http://schemas.microsoft.com/office/powerpoint/2010/main" xmlns="" val="1812781141"/>
       </p:ext>
     </p:extLst>
   </p:cSld>
@@ -8655,7 +8665,7 @@
     <p:bg>
       <p:bgPr>
         <a:blipFill dpi="0" rotWithShape="0">
-          <a:blip r:embed="rId2">
+          <a:blip r:embed="rId2" cstate="print">
             <a:lum/>
           </a:blip>
           <a:srcRect/>
@@ -8685,7 +8695,7 @@
           <p:cNvPr id="144386" name="Rectangle 2">
             <a:extLst>
               <a:ext uri="{FF2B5EF4-FFF2-40B4-BE49-F238E27FC236}">
-                <a16:creationId xmlns:a16="http://schemas.microsoft.com/office/drawing/2014/main" id="{B2EB9881-15D2-4027-87B7-1B2E12624292}"/>
+                <a16:creationId xmlns:a16="http://schemas.microsoft.com/office/drawing/2014/main" xmlns="" id="{B2EB9881-15D2-4027-87B7-1B2E12624292}"/>
               </a:ext>
             </a:extLst>
           </p:cNvPr>
@@ -8726,7 +8736,7 @@
           <p:cNvPr id="2" name="Ορθογώνιο 1">
             <a:extLst>
               <a:ext uri="{FF2B5EF4-FFF2-40B4-BE49-F238E27FC236}">
-                <a16:creationId xmlns:a16="http://schemas.microsoft.com/office/drawing/2014/main" id="{7C7B8017-EC96-4686-A821-7348D3493D8E}"/>
+                <a16:creationId xmlns:a16="http://schemas.microsoft.com/office/drawing/2014/main" xmlns="" id="{7C7B8017-EC96-4686-A821-7348D3493D8E}"/>
               </a:ext>
             </a:extLst>
           </p:cNvPr>
@@ -8776,7 +8786,7 @@
     </p:spTree>
     <p:extLst>
       <p:ext uri="{BB962C8B-B14F-4D97-AF65-F5344CB8AC3E}">
-        <p14:creationId xmlns:p14="http://schemas.microsoft.com/office/powerpoint/2010/main" val="3332542315"/>
+        <p14:creationId xmlns:p14="http://schemas.microsoft.com/office/powerpoint/2010/main" xmlns="" val="3332542315"/>
       </p:ext>
     </p:extLst>
   </p:cSld>
@@ -8792,7 +8802,7 @@
     <p:bg>
       <p:bgPr>
         <a:blipFill dpi="0" rotWithShape="0">
-          <a:blip r:embed="rId2">
+          <a:blip r:embed="rId2" cstate="print">
             <a:lum/>
           </a:blip>
           <a:srcRect/>
@@ -8822,7 +8832,7 @@
           <p:cNvPr id="144386" name="Rectangle 2">
             <a:extLst>
               <a:ext uri="{FF2B5EF4-FFF2-40B4-BE49-F238E27FC236}">
-                <a16:creationId xmlns:a16="http://schemas.microsoft.com/office/drawing/2014/main" id="{B2EB9881-15D2-4027-87B7-1B2E12624292}"/>
+                <a16:creationId xmlns:a16="http://schemas.microsoft.com/office/drawing/2014/main" xmlns="" id="{B2EB9881-15D2-4027-87B7-1B2E12624292}"/>
               </a:ext>
             </a:extLst>
           </p:cNvPr>
@@ -8853,68 +8863,2079 @@
           </a:p>
         </p:txBody>
       </p:sp>
-      <p:sp>
-        <p:nvSpPr>
-          <p:cNvPr id="2" name="Ορθογώνιο 1">
-            <a:extLst>
-              <a:ext uri="{FF2B5EF4-FFF2-40B4-BE49-F238E27FC236}">
-                <a16:creationId xmlns:a16="http://schemas.microsoft.com/office/drawing/2014/main" id="{7C7B8017-EC96-4686-A821-7348D3493D8E}"/>
-              </a:ext>
-            </a:extLst>
-          </p:cNvPr>
-          <p:cNvSpPr/>
+      <p:graphicFrame>
+        <p:nvGraphicFramePr>
+          <p:cNvPr id="4" name="Table 3"/>
+          <p:cNvGraphicFramePr>
+            <a:graphicFrameLocks noGrp="1"/>
+          </p:cNvGraphicFramePr>
           <p:nvPr/>
-        </p:nvSpPr>
-        <p:spPr>
-          <a:xfrm>
-            <a:off x="179512" y="1643548"/>
-            <a:ext cx="8856984" cy="584775"/>
-          </a:xfrm>
-          <a:prstGeom prst="rect">
-            <a:avLst/>
-          </a:prstGeom>
-        </p:spPr>
-        <p:txBody>
-          <a:bodyPr wrap="square">
-            <a:spAutoFit/>
-          </a:bodyPr>
-          <a:lstStyle/>
-          <a:p>
-            <a:pPr marL="457200" lvl="0" indent="-381000">
-              <a:spcBef>
-                <a:spcPts val="0"/>
-              </a:spcBef>
-              <a:spcAft>
-                <a:spcPts val="0"/>
-              </a:spcAft>
-              <a:buClr>
-                <a:schemeClr val="dk1"/>
-              </a:buClr>
-              <a:buSzPts val="2400"/>
-              <a:buChar char="●"/>
-            </a:pPr>
-            <a:r>
-              <a:rPr lang="en-US" sz="3200" dirty="0">
-                <a:solidFill>
-                  <a:schemeClr val="dk1"/>
-                </a:solidFill>
-                <a:latin typeface="Bookman Old Style" panose="02050604050505020204" pitchFamily="18" charset="0"/>
-              </a:rPr>
-              <a:t>H</a:t>
-            </a:r>
-          </a:p>
-        </p:txBody>
-      </p:sp>
+        </p:nvGraphicFramePr>
+        <p:xfrm>
+          <a:off x="179512" y="1196752"/>
+          <a:ext cx="8856986" cy="5152531"/>
+        </p:xfrm>
+        <a:graphic>
+          <a:graphicData uri="http://schemas.openxmlformats.org/drawingml/2006/table">
+            <a:tbl>
+              <a:tblPr/>
+              <a:tblGrid>
+                <a:gridCol w="758246"/>
+                <a:gridCol w="6550418"/>
+                <a:gridCol w="1548322"/>
+              </a:tblGrid>
+              <a:tr h="518119">
+                <a:tc gridSpan="2">
+                  <a:txBody>
+                    <a:bodyPr/>
+                    <a:lstStyle/>
+                    <a:p>
+                      <a:pPr marL="0" marR="0" algn="ctr">
+                        <a:lnSpc>
+                          <a:spcPct val="115000"/>
+                        </a:lnSpc>
+                        <a:spcBef>
+                          <a:spcPts val="0"/>
+                        </a:spcBef>
+                        <a:spcAft>
+                          <a:spcPts val="0"/>
+                        </a:spcAft>
+                      </a:pPr>
+                      <a:r>
+                        <a:rPr lang="en-US" sz="2000" b="1" dirty="0">
+                          <a:latin typeface="Arial"/>
+                          <a:ea typeface="Arial"/>
+                          <a:cs typeface="Times New Roman"/>
+                        </a:rPr>
+                        <a:t>Major Version Control</a:t>
+                      </a:r>
+                      <a:endParaRPr lang="en-US" sz="2000" dirty="0">
+                        <a:latin typeface="Arial"/>
+                        <a:ea typeface="Arial"/>
+                        <a:cs typeface="Times New Roman"/>
+                      </a:endParaRPr>
+                    </a:p>
+                  </a:txBody>
+                  <a:tcPr marL="79353" marR="79353" marT="79353" marB="79353">
+                    <a:lnL w="12700" cap="flat" cmpd="sng" algn="ctr">
+                      <a:solidFill>
+                        <a:srgbClr val="9E9E9E"/>
+                      </a:solidFill>
+                      <a:prstDash val="solid"/>
+                      <a:round/>
+                      <a:headEnd type="none" w="med" len="med"/>
+                      <a:tailEnd type="none" w="med" len="med"/>
+                    </a:lnL>
+                    <a:lnR w="12700" cap="flat" cmpd="sng" algn="ctr">
+                      <a:solidFill>
+                        <a:srgbClr val="9E9E9E"/>
+                      </a:solidFill>
+                      <a:prstDash val="solid"/>
+                      <a:round/>
+                      <a:headEnd type="none" w="med" len="med"/>
+                      <a:tailEnd type="none" w="med" len="med"/>
+                    </a:lnR>
+                    <a:lnT w="12700" cap="flat" cmpd="sng" algn="ctr">
+                      <a:solidFill>
+                        <a:srgbClr val="9E9E9E"/>
+                      </a:solidFill>
+                      <a:prstDash val="solid"/>
+                      <a:round/>
+                      <a:headEnd type="none" w="med" len="med"/>
+                      <a:tailEnd type="none" w="med" len="med"/>
+                    </a:lnT>
+                    <a:lnB w="12700" cap="flat" cmpd="sng" algn="ctr">
+                      <a:solidFill>
+                        <a:srgbClr val="9E9E9E"/>
+                      </a:solidFill>
+                      <a:prstDash val="solid"/>
+                      <a:round/>
+                      <a:headEnd type="none" w="med" len="med"/>
+                      <a:tailEnd type="none" w="med" len="med"/>
+                    </a:lnB>
+                  </a:tcPr>
+                </a:tc>
+                <a:tc hMerge="1">
+                  <a:txBody>
+                    <a:bodyPr/>
+                    <a:lstStyle/>
+                    <a:p>
+                      <a:endParaRPr lang="en-US"/>
+                    </a:p>
+                  </a:txBody>
+                  <a:tcPr/>
+                </a:tc>
+                <a:tc>
+                  <a:txBody>
+                    <a:bodyPr/>
+                    <a:lstStyle/>
+                    <a:p>
+                      <a:pPr marL="0" marR="0" algn="ctr">
+                        <a:lnSpc>
+                          <a:spcPct val="115000"/>
+                        </a:lnSpc>
+                        <a:spcBef>
+                          <a:spcPts val="0"/>
+                        </a:spcBef>
+                        <a:spcAft>
+                          <a:spcPts val="0"/>
+                        </a:spcAft>
+                      </a:pPr>
+                      <a:r>
+                        <a:rPr lang="en-US" sz="2000" b="1" dirty="0">
+                          <a:latin typeface="Arial"/>
+                          <a:ea typeface="Arial"/>
+                          <a:cs typeface="Times New Roman"/>
+                        </a:rPr>
+                        <a:t>Date</a:t>
+                      </a:r>
+                      <a:endParaRPr lang="en-US" sz="2000" dirty="0">
+                        <a:latin typeface="Arial"/>
+                        <a:ea typeface="Arial"/>
+                        <a:cs typeface="Times New Roman"/>
+                      </a:endParaRPr>
+                    </a:p>
+                  </a:txBody>
+                  <a:tcPr marL="79353" marR="79353" marT="79353" marB="79353">
+                    <a:lnL w="12700" cap="flat" cmpd="sng" algn="ctr">
+                      <a:solidFill>
+                        <a:srgbClr val="9E9E9E"/>
+                      </a:solidFill>
+                      <a:prstDash val="solid"/>
+                      <a:round/>
+                      <a:headEnd type="none" w="med" len="med"/>
+                      <a:tailEnd type="none" w="med" len="med"/>
+                    </a:lnL>
+                    <a:lnR w="12700" cap="flat" cmpd="sng" algn="ctr">
+                      <a:solidFill>
+                        <a:srgbClr val="9E9E9E"/>
+                      </a:solidFill>
+                      <a:prstDash val="solid"/>
+                      <a:round/>
+                      <a:headEnd type="none" w="med" len="med"/>
+                      <a:tailEnd type="none" w="med" len="med"/>
+                    </a:lnR>
+                    <a:lnT w="12700" cap="flat" cmpd="sng" algn="ctr">
+                      <a:solidFill>
+                        <a:srgbClr val="9E9E9E"/>
+                      </a:solidFill>
+                      <a:prstDash val="solid"/>
+                      <a:round/>
+                      <a:headEnd type="none" w="med" len="med"/>
+                      <a:tailEnd type="none" w="med" len="med"/>
+                    </a:lnT>
+                    <a:lnB w="12700" cap="flat" cmpd="sng" algn="ctr">
+                      <a:solidFill>
+                        <a:srgbClr val="9E9E9E"/>
+                      </a:solidFill>
+                      <a:prstDash val="solid"/>
+                      <a:round/>
+                      <a:headEnd type="none" w="med" len="med"/>
+                      <a:tailEnd type="none" w="med" len="med"/>
+                    </a:lnB>
+                  </a:tcPr>
+                </a:tc>
+              </a:tr>
+              <a:tr h="489996">
+                <a:tc>
+                  <a:txBody>
+                    <a:bodyPr/>
+                    <a:lstStyle/>
+                    <a:p>
+                      <a:pPr marL="0" marR="0">
+                        <a:lnSpc>
+                          <a:spcPct val="115000"/>
+                        </a:lnSpc>
+                        <a:spcBef>
+                          <a:spcPts val="0"/>
+                        </a:spcBef>
+                        <a:spcAft>
+                          <a:spcPts val="0"/>
+                        </a:spcAft>
+                      </a:pPr>
+                      <a:r>
+                        <a:rPr lang="en-US" sz="1800" b="1" dirty="0">
+                          <a:latin typeface="Arial"/>
+                          <a:ea typeface="Arial"/>
+                          <a:cs typeface="Times New Roman"/>
+                        </a:rPr>
+                        <a:t>V1.0</a:t>
+                      </a:r>
+                      <a:endParaRPr lang="en-US" sz="1800" dirty="0">
+                        <a:latin typeface="Arial"/>
+                        <a:ea typeface="Arial"/>
+                        <a:cs typeface="Times New Roman"/>
+                      </a:endParaRPr>
+                    </a:p>
+                  </a:txBody>
+                  <a:tcPr marL="79353" marR="79353" marT="79353" marB="79353">
+                    <a:lnL w="12700" cap="flat" cmpd="sng" algn="ctr">
+                      <a:solidFill>
+                        <a:srgbClr val="9E9E9E"/>
+                      </a:solidFill>
+                      <a:prstDash val="solid"/>
+                      <a:round/>
+                      <a:headEnd type="none" w="med" len="med"/>
+                      <a:tailEnd type="none" w="med" len="med"/>
+                    </a:lnL>
+                    <a:lnR w="12700" cap="flat" cmpd="sng" algn="ctr">
+                      <a:solidFill>
+                        <a:srgbClr val="9E9E9E"/>
+                      </a:solidFill>
+                      <a:prstDash val="solid"/>
+                      <a:round/>
+                      <a:headEnd type="none" w="med" len="med"/>
+                      <a:tailEnd type="none" w="med" len="med"/>
+                    </a:lnR>
+                    <a:lnT w="12700" cap="flat" cmpd="sng" algn="ctr">
+                      <a:solidFill>
+                        <a:srgbClr val="9E9E9E"/>
+                      </a:solidFill>
+                      <a:prstDash val="solid"/>
+                      <a:round/>
+                      <a:headEnd type="none" w="med" len="med"/>
+                      <a:tailEnd type="none" w="med" len="med"/>
+                    </a:lnT>
+                    <a:lnB w="12700" cap="flat" cmpd="sng" algn="ctr">
+                      <a:solidFill>
+                        <a:srgbClr val="9E9E9E"/>
+                      </a:solidFill>
+                      <a:prstDash val="solid"/>
+                      <a:round/>
+                      <a:headEnd type="none" w="med" len="med"/>
+                      <a:tailEnd type="none" w="med" len="med"/>
+                    </a:lnB>
+                  </a:tcPr>
+                </a:tc>
+                <a:tc>
+                  <a:txBody>
+                    <a:bodyPr/>
+                    <a:lstStyle/>
+                    <a:p>
+                      <a:pPr marL="0" marR="0">
+                        <a:lnSpc>
+                          <a:spcPct val="115000"/>
+                        </a:lnSpc>
+                        <a:spcBef>
+                          <a:spcPts val="0"/>
+                        </a:spcBef>
+                        <a:spcAft>
+                          <a:spcPts val="0"/>
+                        </a:spcAft>
+                      </a:pPr>
+                      <a:r>
+                        <a:rPr lang="en-US" sz="1800" dirty="0">
+                          <a:latin typeface="Arial"/>
+                          <a:ea typeface="Arial"/>
+                          <a:cs typeface="Times New Roman"/>
+                        </a:rPr>
+                        <a:t>First Edition implemented with PHP</a:t>
+                      </a:r>
+                      <a:endParaRPr lang="en-US" sz="2000" dirty="0">
+                        <a:latin typeface="Arial"/>
+                        <a:ea typeface="Arial"/>
+                        <a:cs typeface="Times New Roman"/>
+                      </a:endParaRPr>
+                    </a:p>
+                  </a:txBody>
+                  <a:tcPr marL="79353" marR="79353" marT="79353" marB="79353">
+                    <a:lnL w="12700" cap="flat" cmpd="sng" algn="ctr">
+                      <a:solidFill>
+                        <a:srgbClr val="9E9E9E"/>
+                      </a:solidFill>
+                      <a:prstDash val="solid"/>
+                      <a:round/>
+                      <a:headEnd type="none" w="med" len="med"/>
+                      <a:tailEnd type="none" w="med" len="med"/>
+                    </a:lnL>
+                    <a:lnR w="12700" cap="flat" cmpd="sng" algn="ctr">
+                      <a:solidFill>
+                        <a:srgbClr val="9E9E9E"/>
+                      </a:solidFill>
+                      <a:prstDash val="solid"/>
+                      <a:round/>
+                      <a:headEnd type="none" w="med" len="med"/>
+                      <a:tailEnd type="none" w="med" len="med"/>
+                    </a:lnR>
+                    <a:lnT w="12700" cap="flat" cmpd="sng" algn="ctr">
+                      <a:solidFill>
+                        <a:srgbClr val="9E9E9E"/>
+                      </a:solidFill>
+                      <a:prstDash val="solid"/>
+                      <a:round/>
+                      <a:headEnd type="none" w="med" len="med"/>
+                      <a:tailEnd type="none" w="med" len="med"/>
+                    </a:lnT>
+                    <a:lnB w="12700" cap="flat" cmpd="sng" algn="ctr">
+                      <a:solidFill>
+                        <a:srgbClr val="9E9E9E"/>
+                      </a:solidFill>
+                      <a:prstDash val="solid"/>
+                      <a:round/>
+                      <a:headEnd type="none" w="med" len="med"/>
+                      <a:tailEnd type="none" w="med" len="med"/>
+                    </a:lnB>
+                  </a:tcPr>
+                </a:tc>
+                <a:tc>
+                  <a:txBody>
+                    <a:bodyPr/>
+                    <a:lstStyle/>
+                    <a:p>
+                      <a:pPr marL="0" marR="0" algn="l">
+                        <a:lnSpc>
+                          <a:spcPct val="115000"/>
+                        </a:lnSpc>
+                        <a:spcBef>
+                          <a:spcPts val="0"/>
+                        </a:spcBef>
+                        <a:spcAft>
+                          <a:spcPts val="0"/>
+                        </a:spcAft>
+                      </a:pPr>
+                      <a:r>
+                        <a:rPr lang="en-US" sz="1800" dirty="0">
+                          <a:latin typeface="Arial"/>
+                          <a:ea typeface="Arial"/>
+                          <a:cs typeface="Times New Roman"/>
+                        </a:rPr>
+                        <a:t>4/11/2018</a:t>
+                      </a:r>
+                    </a:p>
+                  </a:txBody>
+                  <a:tcPr marL="79353" marR="79353" marT="79353" marB="79353">
+                    <a:lnL w="12700" cap="flat" cmpd="sng" algn="ctr">
+                      <a:solidFill>
+                        <a:srgbClr val="9E9E9E"/>
+                      </a:solidFill>
+                      <a:prstDash val="solid"/>
+                      <a:round/>
+                      <a:headEnd type="none" w="med" len="med"/>
+                      <a:tailEnd type="none" w="med" len="med"/>
+                    </a:lnL>
+                    <a:lnR w="12700" cap="flat" cmpd="sng" algn="ctr">
+                      <a:solidFill>
+                        <a:srgbClr val="9E9E9E"/>
+                      </a:solidFill>
+                      <a:prstDash val="solid"/>
+                      <a:round/>
+                      <a:headEnd type="none" w="med" len="med"/>
+                      <a:tailEnd type="none" w="med" len="med"/>
+                    </a:lnR>
+                    <a:lnT w="12700" cap="flat" cmpd="sng" algn="ctr">
+                      <a:solidFill>
+                        <a:srgbClr val="9E9E9E"/>
+                      </a:solidFill>
+                      <a:prstDash val="solid"/>
+                      <a:round/>
+                      <a:headEnd type="none" w="med" len="med"/>
+                      <a:tailEnd type="none" w="med" len="med"/>
+                    </a:lnT>
+                    <a:lnB w="12700" cap="flat" cmpd="sng" algn="ctr">
+                      <a:solidFill>
+                        <a:srgbClr val="9E9E9E"/>
+                      </a:solidFill>
+                      <a:prstDash val="solid"/>
+                      <a:round/>
+                      <a:headEnd type="none" w="med" len="med"/>
+                      <a:tailEnd type="none" w="med" len="med"/>
+                    </a:lnB>
+                  </a:tcPr>
+                </a:tc>
+              </a:tr>
+              <a:tr h="447377">
+                <a:tc>
+                  <a:txBody>
+                    <a:bodyPr/>
+                    <a:lstStyle/>
+                    <a:p>
+                      <a:pPr marL="0" marR="0">
+                        <a:lnSpc>
+                          <a:spcPct val="115000"/>
+                        </a:lnSpc>
+                        <a:spcBef>
+                          <a:spcPts val="0"/>
+                        </a:spcBef>
+                        <a:spcAft>
+                          <a:spcPts val="0"/>
+                        </a:spcAft>
+                      </a:pPr>
+                      <a:r>
+                        <a:rPr lang="en-US" sz="1800" b="1" dirty="0">
+                          <a:latin typeface="Arial"/>
+                          <a:ea typeface="Arial"/>
+                          <a:cs typeface="Times New Roman"/>
+                        </a:rPr>
+                        <a:t>V1.1</a:t>
+                      </a:r>
+                      <a:endParaRPr lang="en-US" sz="1800" dirty="0">
+                        <a:latin typeface="Arial"/>
+                        <a:ea typeface="Arial"/>
+                        <a:cs typeface="Times New Roman"/>
+                      </a:endParaRPr>
+                    </a:p>
+                  </a:txBody>
+                  <a:tcPr marL="79353" marR="79353" marT="79353" marB="79353">
+                    <a:lnL w="12700" cap="flat" cmpd="sng" algn="ctr">
+                      <a:solidFill>
+                        <a:srgbClr val="9E9E9E"/>
+                      </a:solidFill>
+                      <a:prstDash val="solid"/>
+                      <a:round/>
+                      <a:headEnd type="none" w="med" len="med"/>
+                      <a:tailEnd type="none" w="med" len="med"/>
+                    </a:lnL>
+                    <a:lnR w="12700" cap="flat" cmpd="sng" algn="ctr">
+                      <a:solidFill>
+                        <a:srgbClr val="9E9E9E"/>
+                      </a:solidFill>
+                      <a:prstDash val="solid"/>
+                      <a:round/>
+                      <a:headEnd type="none" w="med" len="med"/>
+                      <a:tailEnd type="none" w="med" len="med"/>
+                    </a:lnR>
+                    <a:lnT w="12700" cap="flat" cmpd="sng" algn="ctr">
+                      <a:solidFill>
+                        <a:srgbClr val="9E9E9E"/>
+                      </a:solidFill>
+                      <a:prstDash val="solid"/>
+                      <a:round/>
+                      <a:headEnd type="none" w="med" len="med"/>
+                      <a:tailEnd type="none" w="med" len="med"/>
+                    </a:lnT>
+                    <a:lnB w="12700" cap="flat" cmpd="sng" algn="ctr">
+                      <a:solidFill>
+                        <a:srgbClr val="9E9E9E"/>
+                      </a:solidFill>
+                      <a:prstDash val="solid"/>
+                      <a:round/>
+                      <a:headEnd type="none" w="med" len="med"/>
+                      <a:tailEnd type="none" w="med" len="med"/>
+                    </a:lnB>
+                  </a:tcPr>
+                </a:tc>
+                <a:tc>
+                  <a:txBody>
+                    <a:bodyPr/>
+                    <a:lstStyle/>
+                    <a:p>
+                      <a:pPr marL="0" marR="0">
+                        <a:lnSpc>
+                          <a:spcPct val="115000"/>
+                        </a:lnSpc>
+                        <a:spcBef>
+                          <a:spcPts val="0"/>
+                        </a:spcBef>
+                        <a:spcAft>
+                          <a:spcPts val="0"/>
+                        </a:spcAft>
+                      </a:pPr>
+                      <a:r>
+                        <a:rPr lang="en-US" sz="1800" dirty="0">
+                          <a:latin typeface="Arial"/>
+                          <a:ea typeface="Arial"/>
+                          <a:cs typeface="Times New Roman"/>
+                        </a:rPr>
+                        <a:t>First Bootstrap Implementation</a:t>
+                      </a:r>
+                      <a:endParaRPr lang="en-US" sz="2000" dirty="0">
+                        <a:latin typeface="Arial"/>
+                        <a:ea typeface="Arial"/>
+                        <a:cs typeface="Times New Roman"/>
+                      </a:endParaRPr>
+                    </a:p>
+                  </a:txBody>
+                  <a:tcPr marL="79353" marR="79353" marT="79353" marB="79353">
+                    <a:lnL w="12700" cap="flat" cmpd="sng" algn="ctr">
+                      <a:solidFill>
+                        <a:srgbClr val="9E9E9E"/>
+                      </a:solidFill>
+                      <a:prstDash val="solid"/>
+                      <a:round/>
+                      <a:headEnd type="none" w="med" len="med"/>
+                      <a:tailEnd type="none" w="med" len="med"/>
+                    </a:lnL>
+                    <a:lnR w="12700" cap="flat" cmpd="sng" algn="ctr">
+                      <a:solidFill>
+                        <a:srgbClr val="9E9E9E"/>
+                      </a:solidFill>
+                      <a:prstDash val="solid"/>
+                      <a:round/>
+                      <a:headEnd type="none" w="med" len="med"/>
+                      <a:tailEnd type="none" w="med" len="med"/>
+                    </a:lnR>
+                    <a:lnT w="12700" cap="flat" cmpd="sng" algn="ctr">
+                      <a:solidFill>
+                        <a:srgbClr val="9E9E9E"/>
+                      </a:solidFill>
+                      <a:prstDash val="solid"/>
+                      <a:round/>
+                      <a:headEnd type="none" w="med" len="med"/>
+                      <a:tailEnd type="none" w="med" len="med"/>
+                    </a:lnT>
+                    <a:lnB w="12700" cap="flat" cmpd="sng" algn="ctr">
+                      <a:solidFill>
+                        <a:srgbClr val="9E9E9E"/>
+                      </a:solidFill>
+                      <a:prstDash val="solid"/>
+                      <a:round/>
+                      <a:headEnd type="none" w="med" len="med"/>
+                      <a:tailEnd type="none" w="med" len="med"/>
+                    </a:lnB>
+                  </a:tcPr>
+                </a:tc>
+                <a:tc>
+                  <a:txBody>
+                    <a:bodyPr/>
+                    <a:lstStyle/>
+                    <a:p>
+                      <a:pPr marL="0" marR="0" algn="l">
+                        <a:lnSpc>
+                          <a:spcPct val="115000"/>
+                        </a:lnSpc>
+                        <a:spcBef>
+                          <a:spcPts val="0"/>
+                        </a:spcBef>
+                        <a:spcAft>
+                          <a:spcPts val="0"/>
+                        </a:spcAft>
+                      </a:pPr>
+                      <a:r>
+                        <a:rPr lang="en-US" sz="1800" dirty="0">
+                          <a:latin typeface="Arial"/>
+                          <a:ea typeface="Arial"/>
+                          <a:cs typeface="Times New Roman"/>
+                        </a:rPr>
+                        <a:t>23/11/2018</a:t>
+                      </a:r>
+                    </a:p>
+                  </a:txBody>
+                  <a:tcPr marL="79353" marR="79353" marT="79353" marB="79353">
+                    <a:lnL w="12700" cap="flat" cmpd="sng" algn="ctr">
+                      <a:solidFill>
+                        <a:srgbClr val="9E9E9E"/>
+                      </a:solidFill>
+                      <a:prstDash val="solid"/>
+                      <a:round/>
+                      <a:headEnd type="none" w="med" len="med"/>
+                      <a:tailEnd type="none" w="med" len="med"/>
+                    </a:lnL>
+                    <a:lnR w="12700" cap="flat" cmpd="sng" algn="ctr">
+                      <a:solidFill>
+                        <a:srgbClr val="9E9E9E"/>
+                      </a:solidFill>
+                      <a:prstDash val="solid"/>
+                      <a:round/>
+                      <a:headEnd type="none" w="med" len="med"/>
+                      <a:tailEnd type="none" w="med" len="med"/>
+                    </a:lnR>
+                    <a:lnT w="12700" cap="flat" cmpd="sng" algn="ctr">
+                      <a:solidFill>
+                        <a:srgbClr val="9E9E9E"/>
+                      </a:solidFill>
+                      <a:prstDash val="solid"/>
+                      <a:round/>
+                      <a:headEnd type="none" w="med" len="med"/>
+                      <a:tailEnd type="none" w="med" len="med"/>
+                    </a:lnT>
+                    <a:lnB w="12700" cap="flat" cmpd="sng" algn="ctr">
+                      <a:solidFill>
+                        <a:srgbClr val="9E9E9E"/>
+                      </a:solidFill>
+                      <a:prstDash val="solid"/>
+                      <a:round/>
+                      <a:headEnd type="none" w="med" len="med"/>
+                      <a:tailEnd type="none" w="med" len="med"/>
+                    </a:lnB>
+                  </a:tcPr>
+                </a:tc>
+              </a:tr>
+              <a:tr h="447377">
+                <a:tc>
+                  <a:txBody>
+                    <a:bodyPr/>
+                    <a:lstStyle/>
+                    <a:p>
+                      <a:pPr marL="0" marR="0">
+                        <a:lnSpc>
+                          <a:spcPct val="115000"/>
+                        </a:lnSpc>
+                        <a:spcBef>
+                          <a:spcPts val="0"/>
+                        </a:spcBef>
+                        <a:spcAft>
+                          <a:spcPts val="0"/>
+                        </a:spcAft>
+                      </a:pPr>
+                      <a:r>
+                        <a:rPr lang="en-US" sz="1800" b="1" dirty="0">
+                          <a:latin typeface="Arial"/>
+                          <a:ea typeface="Arial"/>
+                          <a:cs typeface="Times New Roman"/>
+                        </a:rPr>
+                        <a:t>V1.2</a:t>
+                      </a:r>
+                      <a:endParaRPr lang="en-US" sz="1800" dirty="0">
+                        <a:latin typeface="Arial"/>
+                        <a:ea typeface="Arial"/>
+                        <a:cs typeface="Times New Roman"/>
+                      </a:endParaRPr>
+                    </a:p>
+                  </a:txBody>
+                  <a:tcPr marL="79353" marR="79353" marT="79353" marB="79353">
+                    <a:lnL w="12700" cap="flat" cmpd="sng" algn="ctr">
+                      <a:solidFill>
+                        <a:srgbClr val="9E9E9E"/>
+                      </a:solidFill>
+                      <a:prstDash val="solid"/>
+                      <a:round/>
+                      <a:headEnd type="none" w="med" len="med"/>
+                      <a:tailEnd type="none" w="med" len="med"/>
+                    </a:lnL>
+                    <a:lnR w="12700" cap="flat" cmpd="sng" algn="ctr">
+                      <a:solidFill>
+                        <a:srgbClr val="9E9E9E"/>
+                      </a:solidFill>
+                      <a:prstDash val="solid"/>
+                      <a:round/>
+                      <a:headEnd type="none" w="med" len="med"/>
+                      <a:tailEnd type="none" w="med" len="med"/>
+                    </a:lnR>
+                    <a:lnT w="12700" cap="flat" cmpd="sng" algn="ctr">
+                      <a:solidFill>
+                        <a:srgbClr val="9E9E9E"/>
+                      </a:solidFill>
+                      <a:prstDash val="solid"/>
+                      <a:round/>
+                      <a:headEnd type="none" w="med" len="med"/>
+                      <a:tailEnd type="none" w="med" len="med"/>
+                    </a:lnT>
+                    <a:lnB w="12700" cap="flat" cmpd="sng" algn="ctr">
+                      <a:solidFill>
+                        <a:srgbClr val="9E9E9E"/>
+                      </a:solidFill>
+                      <a:prstDash val="solid"/>
+                      <a:round/>
+                      <a:headEnd type="none" w="med" len="med"/>
+                      <a:tailEnd type="none" w="med" len="med"/>
+                    </a:lnB>
+                  </a:tcPr>
+                </a:tc>
+                <a:tc>
+                  <a:txBody>
+                    <a:bodyPr/>
+                    <a:lstStyle/>
+                    <a:p>
+                      <a:pPr marL="0" marR="0">
+                        <a:lnSpc>
+                          <a:spcPct val="115000"/>
+                        </a:lnSpc>
+                        <a:spcBef>
+                          <a:spcPts val="0"/>
+                        </a:spcBef>
+                        <a:spcAft>
+                          <a:spcPts val="0"/>
+                        </a:spcAft>
+                      </a:pPr>
+                      <a:r>
+                        <a:rPr lang="en-US" sz="1800" dirty="0">
+                          <a:latin typeface="Arial"/>
+                          <a:ea typeface="Arial"/>
+                          <a:cs typeface="Times New Roman"/>
+                        </a:rPr>
+                        <a:t>Mobile Ready Web Application </a:t>
+                      </a:r>
+                      <a:endParaRPr lang="en-US" sz="2000" dirty="0">
+                        <a:latin typeface="Arial"/>
+                        <a:ea typeface="Arial"/>
+                        <a:cs typeface="Times New Roman"/>
+                      </a:endParaRPr>
+                    </a:p>
+                  </a:txBody>
+                  <a:tcPr marL="79353" marR="79353" marT="79353" marB="79353">
+                    <a:lnL w="12700" cap="flat" cmpd="sng" algn="ctr">
+                      <a:solidFill>
+                        <a:srgbClr val="9E9E9E"/>
+                      </a:solidFill>
+                      <a:prstDash val="solid"/>
+                      <a:round/>
+                      <a:headEnd type="none" w="med" len="med"/>
+                      <a:tailEnd type="none" w="med" len="med"/>
+                    </a:lnL>
+                    <a:lnR w="12700" cap="flat" cmpd="sng" algn="ctr">
+                      <a:solidFill>
+                        <a:srgbClr val="9E9E9E"/>
+                      </a:solidFill>
+                      <a:prstDash val="solid"/>
+                      <a:round/>
+                      <a:headEnd type="none" w="med" len="med"/>
+                      <a:tailEnd type="none" w="med" len="med"/>
+                    </a:lnR>
+                    <a:lnT w="12700" cap="flat" cmpd="sng" algn="ctr">
+                      <a:solidFill>
+                        <a:srgbClr val="9E9E9E"/>
+                      </a:solidFill>
+                      <a:prstDash val="solid"/>
+                      <a:round/>
+                      <a:headEnd type="none" w="med" len="med"/>
+                      <a:tailEnd type="none" w="med" len="med"/>
+                    </a:lnT>
+                    <a:lnB w="12700" cap="flat" cmpd="sng" algn="ctr">
+                      <a:solidFill>
+                        <a:srgbClr val="9E9E9E"/>
+                      </a:solidFill>
+                      <a:prstDash val="solid"/>
+                      <a:round/>
+                      <a:headEnd type="none" w="med" len="med"/>
+                      <a:tailEnd type="none" w="med" len="med"/>
+                    </a:lnB>
+                  </a:tcPr>
+                </a:tc>
+                <a:tc>
+                  <a:txBody>
+                    <a:bodyPr/>
+                    <a:lstStyle/>
+                    <a:p>
+                      <a:pPr marL="0" marR="0" algn="l">
+                        <a:lnSpc>
+                          <a:spcPct val="115000"/>
+                        </a:lnSpc>
+                        <a:spcBef>
+                          <a:spcPts val="0"/>
+                        </a:spcBef>
+                        <a:spcAft>
+                          <a:spcPts val="0"/>
+                        </a:spcAft>
+                      </a:pPr>
+                      <a:r>
+                        <a:rPr lang="en-US" sz="1800" dirty="0">
+                          <a:latin typeface="Arial"/>
+                          <a:ea typeface="Arial"/>
+                          <a:cs typeface="Times New Roman"/>
+                        </a:rPr>
+                        <a:t>30/11/2018</a:t>
+                      </a:r>
+                    </a:p>
+                  </a:txBody>
+                  <a:tcPr marL="79353" marR="79353" marT="79353" marB="79353">
+                    <a:lnL w="12700" cap="flat" cmpd="sng" algn="ctr">
+                      <a:solidFill>
+                        <a:srgbClr val="9E9E9E"/>
+                      </a:solidFill>
+                      <a:prstDash val="solid"/>
+                      <a:round/>
+                      <a:headEnd type="none" w="med" len="med"/>
+                      <a:tailEnd type="none" w="med" len="med"/>
+                    </a:lnL>
+                    <a:lnR w="12700" cap="flat" cmpd="sng" algn="ctr">
+                      <a:solidFill>
+                        <a:srgbClr val="9E9E9E"/>
+                      </a:solidFill>
+                      <a:prstDash val="solid"/>
+                      <a:round/>
+                      <a:headEnd type="none" w="med" len="med"/>
+                      <a:tailEnd type="none" w="med" len="med"/>
+                    </a:lnR>
+                    <a:lnT w="12700" cap="flat" cmpd="sng" algn="ctr">
+                      <a:solidFill>
+                        <a:srgbClr val="9E9E9E"/>
+                      </a:solidFill>
+                      <a:prstDash val="solid"/>
+                      <a:round/>
+                      <a:headEnd type="none" w="med" len="med"/>
+                      <a:tailEnd type="none" w="med" len="med"/>
+                    </a:lnT>
+                    <a:lnB w="12700" cap="flat" cmpd="sng" algn="ctr">
+                      <a:solidFill>
+                        <a:srgbClr val="9E9E9E"/>
+                      </a:solidFill>
+                      <a:prstDash val="solid"/>
+                      <a:round/>
+                      <a:headEnd type="none" w="med" len="med"/>
+                      <a:tailEnd type="none" w="med" len="med"/>
+                    </a:lnB>
+                  </a:tcPr>
+                </a:tc>
+              </a:tr>
+              <a:tr h="807417">
+                <a:tc>
+                  <a:txBody>
+                    <a:bodyPr/>
+                    <a:lstStyle/>
+                    <a:p>
+                      <a:pPr marL="0" marR="0">
+                        <a:lnSpc>
+                          <a:spcPct val="115000"/>
+                        </a:lnSpc>
+                        <a:spcBef>
+                          <a:spcPts val="0"/>
+                        </a:spcBef>
+                        <a:spcAft>
+                          <a:spcPts val="0"/>
+                        </a:spcAft>
+                      </a:pPr>
+                      <a:r>
+                        <a:rPr lang="en-US" sz="1800" b="1" dirty="0">
+                          <a:latin typeface="Arial"/>
+                          <a:ea typeface="Arial"/>
+                          <a:cs typeface="Times New Roman"/>
+                        </a:rPr>
+                        <a:t>V2.0</a:t>
+                      </a:r>
+                      <a:endParaRPr lang="en-US" sz="1800" dirty="0">
+                        <a:latin typeface="Arial"/>
+                        <a:ea typeface="Arial"/>
+                        <a:cs typeface="Times New Roman"/>
+                      </a:endParaRPr>
+                    </a:p>
+                  </a:txBody>
+                  <a:tcPr marL="79353" marR="79353" marT="79353" marB="79353">
+                    <a:lnL w="12700" cap="flat" cmpd="sng" algn="ctr">
+                      <a:solidFill>
+                        <a:srgbClr val="9E9E9E"/>
+                      </a:solidFill>
+                      <a:prstDash val="solid"/>
+                      <a:round/>
+                      <a:headEnd type="none" w="med" len="med"/>
+                      <a:tailEnd type="none" w="med" len="med"/>
+                    </a:lnL>
+                    <a:lnR w="12700" cap="flat" cmpd="sng" algn="ctr">
+                      <a:solidFill>
+                        <a:srgbClr val="9E9E9E"/>
+                      </a:solidFill>
+                      <a:prstDash val="solid"/>
+                      <a:round/>
+                      <a:headEnd type="none" w="med" len="med"/>
+                      <a:tailEnd type="none" w="med" len="med"/>
+                    </a:lnR>
+                    <a:lnT w="12700" cap="flat" cmpd="sng" algn="ctr">
+                      <a:solidFill>
+                        <a:srgbClr val="9E9E9E"/>
+                      </a:solidFill>
+                      <a:prstDash val="solid"/>
+                      <a:round/>
+                      <a:headEnd type="none" w="med" len="med"/>
+                      <a:tailEnd type="none" w="med" len="med"/>
+                    </a:lnT>
+                    <a:lnB w="12700" cap="flat" cmpd="sng" algn="ctr">
+                      <a:solidFill>
+                        <a:srgbClr val="9E9E9E"/>
+                      </a:solidFill>
+                      <a:prstDash val="solid"/>
+                      <a:round/>
+                      <a:headEnd type="none" w="med" len="med"/>
+                      <a:tailEnd type="none" w="med" len="med"/>
+                    </a:lnB>
+                  </a:tcPr>
+                </a:tc>
+                <a:tc>
+                  <a:txBody>
+                    <a:bodyPr/>
+                    <a:lstStyle/>
+                    <a:p>
+                      <a:pPr marL="0" marR="0">
+                        <a:lnSpc>
+                          <a:spcPct val="115000"/>
+                        </a:lnSpc>
+                        <a:spcBef>
+                          <a:spcPts val="0"/>
+                        </a:spcBef>
+                        <a:spcAft>
+                          <a:spcPts val="0"/>
+                        </a:spcAft>
+                      </a:pPr>
+                      <a:r>
+                        <a:rPr lang="en-US" sz="1800" dirty="0">
+                          <a:latin typeface="Arial"/>
+                          <a:ea typeface="Arial"/>
+                          <a:cs typeface="Times New Roman"/>
+                        </a:rPr>
+                        <a:t>The site is in </a:t>
+                      </a:r>
+                      <a:r>
+                        <a:rPr lang="en-US" sz="1800" dirty="0" err="1">
+                          <a:latin typeface="Arial"/>
+                          <a:ea typeface="Arial"/>
+                          <a:cs typeface="Times New Roman"/>
+                        </a:rPr>
+                        <a:t>english</a:t>
+                      </a:r>
+                      <a:r>
+                        <a:rPr lang="en-US" sz="1800" dirty="0">
+                          <a:latin typeface="Arial"/>
+                          <a:ea typeface="Arial"/>
+                          <a:cs typeface="Times New Roman"/>
+                        </a:rPr>
+                        <a:t>, MVC Logic, All main pages are pure front end html clean and tidy code sections </a:t>
+                      </a:r>
+                      <a:endParaRPr lang="en-US" sz="2000" dirty="0">
+                        <a:latin typeface="Arial"/>
+                        <a:ea typeface="Arial"/>
+                        <a:cs typeface="Times New Roman"/>
+                      </a:endParaRPr>
+                    </a:p>
+                  </a:txBody>
+                  <a:tcPr marL="79353" marR="79353" marT="79353" marB="79353">
+                    <a:lnL w="12700" cap="flat" cmpd="sng" algn="ctr">
+                      <a:solidFill>
+                        <a:srgbClr val="9E9E9E"/>
+                      </a:solidFill>
+                      <a:prstDash val="solid"/>
+                      <a:round/>
+                      <a:headEnd type="none" w="med" len="med"/>
+                      <a:tailEnd type="none" w="med" len="med"/>
+                    </a:lnL>
+                    <a:lnR w="12700" cap="flat" cmpd="sng" algn="ctr">
+                      <a:solidFill>
+                        <a:srgbClr val="9E9E9E"/>
+                      </a:solidFill>
+                      <a:prstDash val="solid"/>
+                      <a:round/>
+                      <a:headEnd type="none" w="med" len="med"/>
+                      <a:tailEnd type="none" w="med" len="med"/>
+                    </a:lnR>
+                    <a:lnT w="12700" cap="flat" cmpd="sng" algn="ctr">
+                      <a:solidFill>
+                        <a:srgbClr val="9E9E9E"/>
+                      </a:solidFill>
+                      <a:prstDash val="solid"/>
+                      <a:round/>
+                      <a:headEnd type="none" w="med" len="med"/>
+                      <a:tailEnd type="none" w="med" len="med"/>
+                    </a:lnT>
+                    <a:lnB w="12700" cap="flat" cmpd="sng" algn="ctr">
+                      <a:solidFill>
+                        <a:srgbClr val="9E9E9E"/>
+                      </a:solidFill>
+                      <a:prstDash val="solid"/>
+                      <a:round/>
+                      <a:headEnd type="none" w="med" len="med"/>
+                      <a:tailEnd type="none" w="med" len="med"/>
+                    </a:lnB>
+                  </a:tcPr>
+                </a:tc>
+                <a:tc>
+                  <a:txBody>
+                    <a:bodyPr/>
+                    <a:lstStyle/>
+                    <a:p>
+                      <a:pPr marL="0" marR="0" algn="l">
+                        <a:lnSpc>
+                          <a:spcPct val="115000"/>
+                        </a:lnSpc>
+                        <a:spcBef>
+                          <a:spcPts val="0"/>
+                        </a:spcBef>
+                        <a:spcAft>
+                          <a:spcPts val="0"/>
+                        </a:spcAft>
+                      </a:pPr>
+                      <a:r>
+                        <a:rPr lang="en-US" sz="1800" dirty="0">
+                          <a:latin typeface="Arial"/>
+                          <a:ea typeface="Arial"/>
+                          <a:cs typeface="Times New Roman"/>
+                        </a:rPr>
+                        <a:t>7/12/2018</a:t>
+                      </a:r>
+                    </a:p>
+                  </a:txBody>
+                  <a:tcPr marL="79353" marR="79353" marT="79353" marB="79353">
+                    <a:lnL w="12700" cap="flat" cmpd="sng" algn="ctr">
+                      <a:solidFill>
+                        <a:srgbClr val="9E9E9E"/>
+                      </a:solidFill>
+                      <a:prstDash val="solid"/>
+                      <a:round/>
+                      <a:headEnd type="none" w="med" len="med"/>
+                      <a:tailEnd type="none" w="med" len="med"/>
+                    </a:lnL>
+                    <a:lnR w="12700" cap="flat" cmpd="sng" algn="ctr">
+                      <a:solidFill>
+                        <a:srgbClr val="9E9E9E"/>
+                      </a:solidFill>
+                      <a:prstDash val="solid"/>
+                      <a:round/>
+                      <a:headEnd type="none" w="med" len="med"/>
+                      <a:tailEnd type="none" w="med" len="med"/>
+                    </a:lnR>
+                    <a:lnT w="12700" cap="flat" cmpd="sng" algn="ctr">
+                      <a:solidFill>
+                        <a:srgbClr val="9E9E9E"/>
+                      </a:solidFill>
+                      <a:prstDash val="solid"/>
+                      <a:round/>
+                      <a:headEnd type="none" w="med" len="med"/>
+                      <a:tailEnd type="none" w="med" len="med"/>
+                    </a:lnT>
+                    <a:lnB w="12700" cap="flat" cmpd="sng" algn="ctr">
+                      <a:solidFill>
+                        <a:srgbClr val="9E9E9E"/>
+                      </a:solidFill>
+                      <a:prstDash val="solid"/>
+                      <a:round/>
+                      <a:headEnd type="none" w="med" len="med"/>
+                      <a:tailEnd type="none" w="med" len="med"/>
+                    </a:lnB>
+                  </a:tcPr>
+                </a:tc>
+              </a:tr>
+              <a:tr h="508721">
+                <a:tc>
+                  <a:txBody>
+                    <a:bodyPr/>
+                    <a:lstStyle/>
+                    <a:p>
+                      <a:pPr marL="0" marR="0">
+                        <a:lnSpc>
+                          <a:spcPct val="115000"/>
+                        </a:lnSpc>
+                        <a:spcBef>
+                          <a:spcPts val="0"/>
+                        </a:spcBef>
+                        <a:spcAft>
+                          <a:spcPts val="0"/>
+                        </a:spcAft>
+                      </a:pPr>
+                      <a:r>
+                        <a:rPr lang="en-US" sz="1800" b="1" dirty="0">
+                          <a:latin typeface="Arial"/>
+                          <a:ea typeface="Arial"/>
+                          <a:cs typeface="Times New Roman"/>
+                        </a:rPr>
+                        <a:t>V2.1</a:t>
+                      </a:r>
+                      <a:endParaRPr lang="en-US" sz="1800" dirty="0">
+                        <a:latin typeface="Arial"/>
+                        <a:ea typeface="Arial"/>
+                        <a:cs typeface="Times New Roman"/>
+                      </a:endParaRPr>
+                    </a:p>
+                  </a:txBody>
+                  <a:tcPr marL="79353" marR="79353" marT="79353" marB="79353">
+                    <a:lnL w="12700" cap="flat" cmpd="sng" algn="ctr">
+                      <a:solidFill>
+                        <a:srgbClr val="9E9E9E"/>
+                      </a:solidFill>
+                      <a:prstDash val="solid"/>
+                      <a:round/>
+                      <a:headEnd type="none" w="med" len="med"/>
+                      <a:tailEnd type="none" w="med" len="med"/>
+                    </a:lnL>
+                    <a:lnR w="12700" cap="flat" cmpd="sng" algn="ctr">
+                      <a:solidFill>
+                        <a:srgbClr val="9E9E9E"/>
+                      </a:solidFill>
+                      <a:prstDash val="solid"/>
+                      <a:round/>
+                      <a:headEnd type="none" w="med" len="med"/>
+                      <a:tailEnd type="none" w="med" len="med"/>
+                    </a:lnR>
+                    <a:lnT w="12700" cap="flat" cmpd="sng" algn="ctr">
+                      <a:solidFill>
+                        <a:srgbClr val="9E9E9E"/>
+                      </a:solidFill>
+                      <a:prstDash val="solid"/>
+                      <a:round/>
+                      <a:headEnd type="none" w="med" len="med"/>
+                      <a:tailEnd type="none" w="med" len="med"/>
+                    </a:lnT>
+                    <a:lnB w="12700" cap="flat" cmpd="sng" algn="ctr">
+                      <a:solidFill>
+                        <a:srgbClr val="9E9E9E"/>
+                      </a:solidFill>
+                      <a:prstDash val="solid"/>
+                      <a:round/>
+                      <a:headEnd type="none" w="med" len="med"/>
+                      <a:tailEnd type="none" w="med" len="med"/>
+                    </a:lnB>
+                  </a:tcPr>
+                </a:tc>
+                <a:tc>
+                  <a:txBody>
+                    <a:bodyPr/>
+                    <a:lstStyle/>
+                    <a:p>
+                      <a:pPr marL="0" marR="0">
+                        <a:lnSpc>
+                          <a:spcPct val="115000"/>
+                        </a:lnSpc>
+                        <a:spcBef>
+                          <a:spcPts val="0"/>
+                        </a:spcBef>
+                        <a:spcAft>
+                          <a:spcPts val="0"/>
+                        </a:spcAft>
+                      </a:pPr>
+                      <a:r>
+                        <a:rPr lang="en-US" sz="1800" dirty="0">
+                          <a:latin typeface="Arial"/>
+                          <a:ea typeface="Arial"/>
+                          <a:cs typeface="Times New Roman"/>
+                        </a:rPr>
+                        <a:t>Token implemented in site navigation</a:t>
+                      </a:r>
+                      <a:endParaRPr lang="en-US" sz="2000" dirty="0">
+                        <a:latin typeface="Arial"/>
+                        <a:ea typeface="Arial"/>
+                        <a:cs typeface="Times New Roman"/>
+                      </a:endParaRPr>
+                    </a:p>
+                  </a:txBody>
+                  <a:tcPr marL="79353" marR="79353" marT="79353" marB="79353">
+                    <a:lnL w="12700" cap="flat" cmpd="sng" algn="ctr">
+                      <a:solidFill>
+                        <a:srgbClr val="9E9E9E"/>
+                      </a:solidFill>
+                      <a:prstDash val="solid"/>
+                      <a:round/>
+                      <a:headEnd type="none" w="med" len="med"/>
+                      <a:tailEnd type="none" w="med" len="med"/>
+                    </a:lnL>
+                    <a:lnR w="12700" cap="flat" cmpd="sng" algn="ctr">
+                      <a:solidFill>
+                        <a:srgbClr val="9E9E9E"/>
+                      </a:solidFill>
+                      <a:prstDash val="solid"/>
+                      <a:round/>
+                      <a:headEnd type="none" w="med" len="med"/>
+                      <a:tailEnd type="none" w="med" len="med"/>
+                    </a:lnR>
+                    <a:lnT w="12700" cap="flat" cmpd="sng" algn="ctr">
+                      <a:solidFill>
+                        <a:srgbClr val="9E9E9E"/>
+                      </a:solidFill>
+                      <a:prstDash val="solid"/>
+                      <a:round/>
+                      <a:headEnd type="none" w="med" len="med"/>
+                      <a:tailEnd type="none" w="med" len="med"/>
+                    </a:lnT>
+                    <a:lnB w="12700" cap="flat" cmpd="sng" algn="ctr">
+                      <a:solidFill>
+                        <a:srgbClr val="9E9E9E"/>
+                      </a:solidFill>
+                      <a:prstDash val="solid"/>
+                      <a:round/>
+                      <a:headEnd type="none" w="med" len="med"/>
+                      <a:tailEnd type="none" w="med" len="med"/>
+                    </a:lnB>
+                  </a:tcPr>
+                </a:tc>
+                <a:tc>
+                  <a:txBody>
+                    <a:bodyPr/>
+                    <a:lstStyle/>
+                    <a:p>
+                      <a:pPr marL="0" marR="0" algn="l">
+                        <a:lnSpc>
+                          <a:spcPct val="115000"/>
+                        </a:lnSpc>
+                        <a:spcBef>
+                          <a:spcPts val="0"/>
+                        </a:spcBef>
+                        <a:spcAft>
+                          <a:spcPts val="0"/>
+                        </a:spcAft>
+                      </a:pPr>
+                      <a:r>
+                        <a:rPr lang="en-US" sz="1800" dirty="0">
+                          <a:latin typeface="Arial"/>
+                          <a:ea typeface="Arial"/>
+                          <a:cs typeface="Times New Roman"/>
+                        </a:rPr>
+                        <a:t>9/12/2018</a:t>
+                      </a:r>
+                    </a:p>
+                  </a:txBody>
+                  <a:tcPr marL="79353" marR="79353" marT="79353" marB="79353">
+                    <a:lnL w="12700" cap="flat" cmpd="sng" algn="ctr">
+                      <a:solidFill>
+                        <a:srgbClr val="9E9E9E"/>
+                      </a:solidFill>
+                      <a:prstDash val="solid"/>
+                      <a:round/>
+                      <a:headEnd type="none" w="med" len="med"/>
+                      <a:tailEnd type="none" w="med" len="med"/>
+                    </a:lnL>
+                    <a:lnR w="12700" cap="flat" cmpd="sng" algn="ctr">
+                      <a:solidFill>
+                        <a:srgbClr val="9E9E9E"/>
+                      </a:solidFill>
+                      <a:prstDash val="solid"/>
+                      <a:round/>
+                      <a:headEnd type="none" w="med" len="med"/>
+                      <a:tailEnd type="none" w="med" len="med"/>
+                    </a:lnR>
+                    <a:lnT w="12700" cap="flat" cmpd="sng" algn="ctr">
+                      <a:solidFill>
+                        <a:srgbClr val="9E9E9E"/>
+                      </a:solidFill>
+                      <a:prstDash val="solid"/>
+                      <a:round/>
+                      <a:headEnd type="none" w="med" len="med"/>
+                      <a:tailEnd type="none" w="med" len="med"/>
+                    </a:lnT>
+                    <a:lnB w="12700" cap="flat" cmpd="sng" algn="ctr">
+                      <a:solidFill>
+                        <a:srgbClr val="9E9E9E"/>
+                      </a:solidFill>
+                      <a:prstDash val="solid"/>
+                      <a:round/>
+                      <a:headEnd type="none" w="med" len="med"/>
+                      <a:tailEnd type="none" w="med" len="med"/>
+                    </a:lnB>
+                  </a:tcPr>
+                </a:tc>
+              </a:tr>
+              <a:tr h="375369">
+                <a:tc>
+                  <a:txBody>
+                    <a:bodyPr/>
+                    <a:lstStyle/>
+                    <a:p>
+                      <a:pPr marL="0" marR="0">
+                        <a:lnSpc>
+                          <a:spcPct val="115000"/>
+                        </a:lnSpc>
+                        <a:spcBef>
+                          <a:spcPts val="0"/>
+                        </a:spcBef>
+                        <a:spcAft>
+                          <a:spcPts val="0"/>
+                        </a:spcAft>
+                      </a:pPr>
+                      <a:r>
+                        <a:rPr lang="en-US" sz="1800" b="1" dirty="0">
+                          <a:latin typeface="Arial"/>
+                          <a:ea typeface="Arial"/>
+                          <a:cs typeface="Times New Roman"/>
+                        </a:rPr>
+                        <a:t>V2.2</a:t>
+                      </a:r>
+                      <a:endParaRPr lang="en-US" sz="1800" dirty="0">
+                        <a:latin typeface="Arial"/>
+                        <a:ea typeface="Arial"/>
+                        <a:cs typeface="Times New Roman"/>
+                      </a:endParaRPr>
+                    </a:p>
+                  </a:txBody>
+                  <a:tcPr marL="79353" marR="79353" marT="79353" marB="79353">
+                    <a:lnL w="12700" cap="flat" cmpd="sng" algn="ctr">
+                      <a:solidFill>
+                        <a:srgbClr val="9E9E9E"/>
+                      </a:solidFill>
+                      <a:prstDash val="solid"/>
+                      <a:round/>
+                      <a:headEnd type="none" w="med" len="med"/>
+                      <a:tailEnd type="none" w="med" len="med"/>
+                    </a:lnL>
+                    <a:lnR w="12700" cap="flat" cmpd="sng" algn="ctr">
+                      <a:solidFill>
+                        <a:srgbClr val="9E9E9E"/>
+                      </a:solidFill>
+                      <a:prstDash val="solid"/>
+                      <a:round/>
+                      <a:headEnd type="none" w="med" len="med"/>
+                      <a:tailEnd type="none" w="med" len="med"/>
+                    </a:lnR>
+                    <a:lnT w="12700" cap="flat" cmpd="sng" algn="ctr">
+                      <a:solidFill>
+                        <a:srgbClr val="9E9E9E"/>
+                      </a:solidFill>
+                      <a:prstDash val="solid"/>
+                      <a:round/>
+                      <a:headEnd type="none" w="med" len="med"/>
+                      <a:tailEnd type="none" w="med" len="med"/>
+                    </a:lnT>
+                    <a:lnB w="12700" cap="flat" cmpd="sng" algn="ctr">
+                      <a:solidFill>
+                        <a:srgbClr val="9E9E9E"/>
+                      </a:solidFill>
+                      <a:prstDash val="solid"/>
+                      <a:round/>
+                      <a:headEnd type="none" w="med" len="med"/>
+                      <a:tailEnd type="none" w="med" len="med"/>
+                    </a:lnB>
+                  </a:tcPr>
+                </a:tc>
+                <a:tc>
+                  <a:txBody>
+                    <a:bodyPr/>
+                    <a:lstStyle/>
+                    <a:p>
+                      <a:pPr marL="0" marR="0">
+                        <a:lnSpc>
+                          <a:spcPct val="115000"/>
+                        </a:lnSpc>
+                        <a:spcBef>
+                          <a:spcPts val="0"/>
+                        </a:spcBef>
+                        <a:spcAft>
+                          <a:spcPts val="0"/>
+                        </a:spcAft>
+                      </a:pPr>
+                      <a:r>
+                        <a:rPr lang="en-US" sz="1800" dirty="0">
+                          <a:latin typeface="Arial"/>
+                          <a:ea typeface="Arial"/>
+                          <a:cs typeface="Times New Roman"/>
+                        </a:rPr>
+                        <a:t>Front end Improvements</a:t>
+                      </a:r>
+                      <a:endParaRPr lang="en-US" sz="2000" dirty="0">
+                        <a:latin typeface="Arial"/>
+                        <a:ea typeface="Arial"/>
+                        <a:cs typeface="Times New Roman"/>
+                      </a:endParaRPr>
+                    </a:p>
+                  </a:txBody>
+                  <a:tcPr marL="79353" marR="79353" marT="79353" marB="79353">
+                    <a:lnL w="12700" cap="flat" cmpd="sng" algn="ctr">
+                      <a:solidFill>
+                        <a:srgbClr val="9E9E9E"/>
+                      </a:solidFill>
+                      <a:prstDash val="solid"/>
+                      <a:round/>
+                      <a:headEnd type="none" w="med" len="med"/>
+                      <a:tailEnd type="none" w="med" len="med"/>
+                    </a:lnL>
+                    <a:lnR w="12700" cap="flat" cmpd="sng" algn="ctr">
+                      <a:solidFill>
+                        <a:srgbClr val="9E9E9E"/>
+                      </a:solidFill>
+                      <a:prstDash val="solid"/>
+                      <a:round/>
+                      <a:headEnd type="none" w="med" len="med"/>
+                      <a:tailEnd type="none" w="med" len="med"/>
+                    </a:lnR>
+                    <a:lnT w="12700" cap="flat" cmpd="sng" algn="ctr">
+                      <a:solidFill>
+                        <a:srgbClr val="9E9E9E"/>
+                      </a:solidFill>
+                      <a:prstDash val="solid"/>
+                      <a:round/>
+                      <a:headEnd type="none" w="med" len="med"/>
+                      <a:tailEnd type="none" w="med" len="med"/>
+                    </a:lnT>
+                    <a:lnB w="12700" cap="flat" cmpd="sng" algn="ctr">
+                      <a:solidFill>
+                        <a:srgbClr val="9E9E9E"/>
+                      </a:solidFill>
+                      <a:prstDash val="solid"/>
+                      <a:round/>
+                      <a:headEnd type="none" w="med" len="med"/>
+                      <a:tailEnd type="none" w="med" len="med"/>
+                    </a:lnB>
+                  </a:tcPr>
+                </a:tc>
+                <a:tc>
+                  <a:txBody>
+                    <a:bodyPr/>
+                    <a:lstStyle/>
+                    <a:p>
+                      <a:pPr marL="0" marR="0" algn="l">
+                        <a:lnSpc>
+                          <a:spcPct val="115000"/>
+                        </a:lnSpc>
+                        <a:spcBef>
+                          <a:spcPts val="0"/>
+                        </a:spcBef>
+                        <a:spcAft>
+                          <a:spcPts val="0"/>
+                        </a:spcAft>
+                      </a:pPr>
+                      <a:r>
+                        <a:rPr lang="en-US" sz="1800" dirty="0">
+                          <a:latin typeface="Arial"/>
+                          <a:ea typeface="Arial"/>
+                          <a:cs typeface="Times New Roman"/>
+                        </a:rPr>
+                        <a:t>15/12/2018</a:t>
+                      </a:r>
+                    </a:p>
+                  </a:txBody>
+                  <a:tcPr marL="79353" marR="79353" marT="79353" marB="79353">
+                    <a:lnL w="12700" cap="flat" cmpd="sng" algn="ctr">
+                      <a:solidFill>
+                        <a:srgbClr val="9E9E9E"/>
+                      </a:solidFill>
+                      <a:prstDash val="solid"/>
+                      <a:round/>
+                      <a:headEnd type="none" w="med" len="med"/>
+                      <a:tailEnd type="none" w="med" len="med"/>
+                    </a:lnL>
+                    <a:lnR w="12700" cap="flat" cmpd="sng" algn="ctr">
+                      <a:solidFill>
+                        <a:srgbClr val="9E9E9E"/>
+                      </a:solidFill>
+                      <a:prstDash val="solid"/>
+                      <a:round/>
+                      <a:headEnd type="none" w="med" len="med"/>
+                      <a:tailEnd type="none" w="med" len="med"/>
+                    </a:lnR>
+                    <a:lnT w="12700" cap="flat" cmpd="sng" algn="ctr">
+                      <a:solidFill>
+                        <a:srgbClr val="9E9E9E"/>
+                      </a:solidFill>
+                      <a:prstDash val="solid"/>
+                      <a:round/>
+                      <a:headEnd type="none" w="med" len="med"/>
+                      <a:tailEnd type="none" w="med" len="med"/>
+                    </a:lnT>
+                    <a:lnB w="12700" cap="flat" cmpd="sng" algn="ctr">
+                      <a:solidFill>
+                        <a:srgbClr val="9E9E9E"/>
+                      </a:solidFill>
+                      <a:prstDash val="solid"/>
+                      <a:round/>
+                      <a:headEnd type="none" w="med" len="med"/>
+                      <a:tailEnd type="none" w="med" len="med"/>
+                    </a:lnB>
+                  </a:tcPr>
+                </a:tc>
+              </a:tr>
+              <a:tr h="591393">
+                <a:tc>
+                  <a:txBody>
+                    <a:bodyPr/>
+                    <a:lstStyle/>
+                    <a:p>
+                      <a:pPr marL="0" marR="0">
+                        <a:lnSpc>
+                          <a:spcPct val="115000"/>
+                        </a:lnSpc>
+                        <a:spcBef>
+                          <a:spcPts val="0"/>
+                        </a:spcBef>
+                        <a:spcAft>
+                          <a:spcPts val="0"/>
+                        </a:spcAft>
+                      </a:pPr>
+                      <a:r>
+                        <a:rPr lang="en-US" sz="1800" b="1" dirty="0">
+                          <a:latin typeface="Arial"/>
+                          <a:ea typeface="Arial"/>
+                          <a:cs typeface="Times New Roman"/>
+                        </a:rPr>
+                        <a:t>V2.3</a:t>
+                      </a:r>
+                      <a:endParaRPr lang="en-US" sz="1800" dirty="0">
+                        <a:latin typeface="Arial"/>
+                        <a:ea typeface="Arial"/>
+                        <a:cs typeface="Times New Roman"/>
+                      </a:endParaRPr>
+                    </a:p>
+                  </a:txBody>
+                  <a:tcPr marL="79353" marR="79353" marT="79353" marB="79353">
+                    <a:lnL w="12700" cap="flat" cmpd="sng" algn="ctr">
+                      <a:solidFill>
+                        <a:srgbClr val="9E9E9E"/>
+                      </a:solidFill>
+                      <a:prstDash val="solid"/>
+                      <a:round/>
+                      <a:headEnd type="none" w="med" len="med"/>
+                      <a:tailEnd type="none" w="med" len="med"/>
+                    </a:lnL>
+                    <a:lnR w="12700" cap="flat" cmpd="sng" algn="ctr">
+                      <a:solidFill>
+                        <a:srgbClr val="9E9E9E"/>
+                      </a:solidFill>
+                      <a:prstDash val="solid"/>
+                      <a:round/>
+                      <a:headEnd type="none" w="med" len="med"/>
+                      <a:tailEnd type="none" w="med" len="med"/>
+                    </a:lnR>
+                    <a:lnT w="12700" cap="flat" cmpd="sng" algn="ctr">
+                      <a:solidFill>
+                        <a:srgbClr val="9E9E9E"/>
+                      </a:solidFill>
+                      <a:prstDash val="solid"/>
+                      <a:round/>
+                      <a:headEnd type="none" w="med" len="med"/>
+                      <a:tailEnd type="none" w="med" len="med"/>
+                    </a:lnT>
+                    <a:lnB w="12700" cap="flat" cmpd="sng" algn="ctr">
+                      <a:solidFill>
+                        <a:srgbClr val="9E9E9E"/>
+                      </a:solidFill>
+                      <a:prstDash val="solid"/>
+                      <a:round/>
+                      <a:headEnd type="none" w="med" len="med"/>
+                      <a:tailEnd type="none" w="med" len="med"/>
+                    </a:lnB>
+                  </a:tcPr>
+                </a:tc>
+                <a:tc>
+                  <a:txBody>
+                    <a:bodyPr/>
+                    <a:lstStyle/>
+                    <a:p>
+                      <a:pPr marL="0" marR="0">
+                        <a:lnSpc>
+                          <a:spcPct val="115000"/>
+                        </a:lnSpc>
+                        <a:spcBef>
+                          <a:spcPts val="0"/>
+                        </a:spcBef>
+                        <a:spcAft>
+                          <a:spcPts val="0"/>
+                        </a:spcAft>
+                      </a:pPr>
+                      <a:r>
+                        <a:rPr lang="en-US" sz="1800" dirty="0">
+                          <a:latin typeface="Arial"/>
+                          <a:ea typeface="Arial"/>
+                          <a:cs typeface="Times New Roman"/>
+                        </a:rPr>
+                        <a:t>Forgot Password. Minor bugs, improvements</a:t>
+                      </a:r>
+                      <a:endParaRPr lang="en-US" sz="2000" dirty="0">
+                        <a:latin typeface="Arial"/>
+                        <a:ea typeface="Arial"/>
+                        <a:cs typeface="Times New Roman"/>
+                      </a:endParaRPr>
+                    </a:p>
+                  </a:txBody>
+                  <a:tcPr marL="79353" marR="79353" marT="79353" marB="79353">
+                    <a:lnL w="12700" cap="flat" cmpd="sng" algn="ctr">
+                      <a:solidFill>
+                        <a:srgbClr val="9E9E9E"/>
+                      </a:solidFill>
+                      <a:prstDash val="solid"/>
+                      <a:round/>
+                      <a:headEnd type="none" w="med" len="med"/>
+                      <a:tailEnd type="none" w="med" len="med"/>
+                    </a:lnL>
+                    <a:lnR w="12700" cap="flat" cmpd="sng" algn="ctr">
+                      <a:solidFill>
+                        <a:srgbClr val="9E9E9E"/>
+                      </a:solidFill>
+                      <a:prstDash val="solid"/>
+                      <a:round/>
+                      <a:headEnd type="none" w="med" len="med"/>
+                      <a:tailEnd type="none" w="med" len="med"/>
+                    </a:lnR>
+                    <a:lnT w="12700" cap="flat" cmpd="sng" algn="ctr">
+                      <a:solidFill>
+                        <a:srgbClr val="9E9E9E"/>
+                      </a:solidFill>
+                      <a:prstDash val="solid"/>
+                      <a:round/>
+                      <a:headEnd type="none" w="med" len="med"/>
+                      <a:tailEnd type="none" w="med" len="med"/>
+                    </a:lnT>
+                    <a:lnB w="12700" cap="flat" cmpd="sng" algn="ctr">
+                      <a:solidFill>
+                        <a:srgbClr val="9E9E9E"/>
+                      </a:solidFill>
+                      <a:prstDash val="solid"/>
+                      <a:round/>
+                      <a:headEnd type="none" w="med" len="med"/>
+                      <a:tailEnd type="none" w="med" len="med"/>
+                    </a:lnB>
+                  </a:tcPr>
+                </a:tc>
+                <a:tc>
+                  <a:txBody>
+                    <a:bodyPr/>
+                    <a:lstStyle/>
+                    <a:p>
+                      <a:pPr marL="0" marR="0" algn="l">
+                        <a:lnSpc>
+                          <a:spcPct val="115000"/>
+                        </a:lnSpc>
+                        <a:spcBef>
+                          <a:spcPts val="0"/>
+                        </a:spcBef>
+                        <a:spcAft>
+                          <a:spcPts val="0"/>
+                        </a:spcAft>
+                      </a:pPr>
+                      <a:r>
+                        <a:rPr lang="en-US" sz="1800" dirty="0">
+                          <a:latin typeface="Arial"/>
+                          <a:ea typeface="Arial"/>
+                          <a:cs typeface="Times New Roman"/>
+                        </a:rPr>
+                        <a:t>27/12/2018</a:t>
+                      </a:r>
+                    </a:p>
+                  </a:txBody>
+                  <a:tcPr marL="79353" marR="79353" marT="79353" marB="79353">
+                    <a:lnL w="12700" cap="flat" cmpd="sng" algn="ctr">
+                      <a:solidFill>
+                        <a:srgbClr val="9E9E9E"/>
+                      </a:solidFill>
+                      <a:prstDash val="solid"/>
+                      <a:round/>
+                      <a:headEnd type="none" w="med" len="med"/>
+                      <a:tailEnd type="none" w="med" len="med"/>
+                    </a:lnL>
+                    <a:lnR w="12700" cap="flat" cmpd="sng" algn="ctr">
+                      <a:solidFill>
+                        <a:srgbClr val="9E9E9E"/>
+                      </a:solidFill>
+                      <a:prstDash val="solid"/>
+                      <a:round/>
+                      <a:headEnd type="none" w="med" len="med"/>
+                      <a:tailEnd type="none" w="med" len="med"/>
+                    </a:lnR>
+                    <a:lnT w="12700" cap="flat" cmpd="sng" algn="ctr">
+                      <a:solidFill>
+                        <a:srgbClr val="9E9E9E"/>
+                      </a:solidFill>
+                      <a:prstDash val="solid"/>
+                      <a:round/>
+                      <a:headEnd type="none" w="med" len="med"/>
+                      <a:tailEnd type="none" w="med" len="med"/>
+                    </a:lnT>
+                    <a:lnB w="12700" cap="flat" cmpd="sng" algn="ctr">
+                      <a:solidFill>
+                        <a:srgbClr val="9E9E9E"/>
+                      </a:solidFill>
+                      <a:prstDash val="solid"/>
+                      <a:round/>
+                      <a:headEnd type="none" w="med" len="med"/>
+                      <a:tailEnd type="none" w="med" len="med"/>
+                    </a:lnB>
+                  </a:tcPr>
+                </a:tc>
+              </a:tr>
+              <a:tr h="447377">
+                <a:tc>
+                  <a:txBody>
+                    <a:bodyPr/>
+                    <a:lstStyle/>
+                    <a:p>
+                      <a:pPr marL="0" marR="0">
+                        <a:lnSpc>
+                          <a:spcPct val="115000"/>
+                        </a:lnSpc>
+                        <a:spcBef>
+                          <a:spcPts val="0"/>
+                        </a:spcBef>
+                        <a:spcAft>
+                          <a:spcPts val="0"/>
+                        </a:spcAft>
+                      </a:pPr>
+                      <a:r>
+                        <a:rPr lang="en-US" sz="1800" b="1" dirty="0">
+                          <a:latin typeface="Arial"/>
+                          <a:ea typeface="Arial"/>
+                          <a:cs typeface="Times New Roman"/>
+                        </a:rPr>
+                        <a:t>V2.4</a:t>
+                      </a:r>
+                      <a:endParaRPr lang="en-US" sz="1800" dirty="0">
+                        <a:latin typeface="Arial"/>
+                        <a:ea typeface="Arial"/>
+                        <a:cs typeface="Times New Roman"/>
+                      </a:endParaRPr>
+                    </a:p>
+                  </a:txBody>
+                  <a:tcPr marL="79353" marR="79353" marT="79353" marB="79353">
+                    <a:lnL w="12700" cap="flat" cmpd="sng" algn="ctr">
+                      <a:solidFill>
+                        <a:srgbClr val="9E9E9E"/>
+                      </a:solidFill>
+                      <a:prstDash val="solid"/>
+                      <a:round/>
+                      <a:headEnd type="none" w="med" len="med"/>
+                      <a:tailEnd type="none" w="med" len="med"/>
+                    </a:lnL>
+                    <a:lnR w="12700" cap="flat" cmpd="sng" algn="ctr">
+                      <a:solidFill>
+                        <a:srgbClr val="9E9E9E"/>
+                      </a:solidFill>
+                      <a:prstDash val="solid"/>
+                      <a:round/>
+                      <a:headEnd type="none" w="med" len="med"/>
+                      <a:tailEnd type="none" w="med" len="med"/>
+                    </a:lnR>
+                    <a:lnT w="12700" cap="flat" cmpd="sng" algn="ctr">
+                      <a:solidFill>
+                        <a:srgbClr val="9E9E9E"/>
+                      </a:solidFill>
+                      <a:prstDash val="solid"/>
+                      <a:round/>
+                      <a:headEnd type="none" w="med" len="med"/>
+                      <a:tailEnd type="none" w="med" len="med"/>
+                    </a:lnT>
+                    <a:lnB w="12700" cap="flat" cmpd="sng" algn="ctr">
+                      <a:solidFill>
+                        <a:srgbClr val="9E9E9E"/>
+                      </a:solidFill>
+                      <a:prstDash val="solid"/>
+                      <a:round/>
+                      <a:headEnd type="none" w="med" len="med"/>
+                      <a:tailEnd type="none" w="med" len="med"/>
+                    </a:lnB>
+                  </a:tcPr>
+                </a:tc>
+                <a:tc>
+                  <a:txBody>
+                    <a:bodyPr/>
+                    <a:lstStyle/>
+                    <a:p>
+                      <a:pPr marL="0" marR="0">
+                        <a:lnSpc>
+                          <a:spcPct val="115000"/>
+                        </a:lnSpc>
+                        <a:spcBef>
+                          <a:spcPts val="0"/>
+                        </a:spcBef>
+                        <a:spcAft>
+                          <a:spcPts val="0"/>
+                        </a:spcAft>
+                      </a:pPr>
+                      <a:r>
+                        <a:rPr lang="en-US" sz="1800">
+                          <a:latin typeface="Arial"/>
+                          <a:ea typeface="Arial"/>
+                          <a:cs typeface="Times New Roman"/>
+                        </a:rPr>
+                        <a:t>Save, Load, Delete search filters</a:t>
+                      </a:r>
+                      <a:endParaRPr lang="en-US" sz="2000">
+                        <a:latin typeface="Arial"/>
+                        <a:ea typeface="Arial"/>
+                        <a:cs typeface="Times New Roman"/>
+                      </a:endParaRPr>
+                    </a:p>
+                  </a:txBody>
+                  <a:tcPr marL="79353" marR="79353" marT="79353" marB="79353">
+                    <a:lnL w="12700" cap="flat" cmpd="sng" algn="ctr">
+                      <a:solidFill>
+                        <a:srgbClr val="9E9E9E"/>
+                      </a:solidFill>
+                      <a:prstDash val="solid"/>
+                      <a:round/>
+                      <a:headEnd type="none" w="med" len="med"/>
+                      <a:tailEnd type="none" w="med" len="med"/>
+                    </a:lnL>
+                    <a:lnR w="12700" cap="flat" cmpd="sng" algn="ctr">
+                      <a:solidFill>
+                        <a:srgbClr val="9E9E9E"/>
+                      </a:solidFill>
+                      <a:prstDash val="solid"/>
+                      <a:round/>
+                      <a:headEnd type="none" w="med" len="med"/>
+                      <a:tailEnd type="none" w="med" len="med"/>
+                    </a:lnR>
+                    <a:lnT w="12700" cap="flat" cmpd="sng" algn="ctr">
+                      <a:solidFill>
+                        <a:srgbClr val="9E9E9E"/>
+                      </a:solidFill>
+                      <a:prstDash val="solid"/>
+                      <a:round/>
+                      <a:headEnd type="none" w="med" len="med"/>
+                      <a:tailEnd type="none" w="med" len="med"/>
+                    </a:lnT>
+                    <a:lnB w="12700" cap="flat" cmpd="sng" algn="ctr">
+                      <a:solidFill>
+                        <a:srgbClr val="9E9E9E"/>
+                      </a:solidFill>
+                      <a:prstDash val="solid"/>
+                      <a:round/>
+                      <a:headEnd type="none" w="med" len="med"/>
+                      <a:tailEnd type="none" w="med" len="med"/>
+                    </a:lnB>
+                  </a:tcPr>
+                </a:tc>
+                <a:tc>
+                  <a:txBody>
+                    <a:bodyPr/>
+                    <a:lstStyle/>
+                    <a:p>
+                      <a:pPr marL="0" marR="0" algn="l">
+                        <a:lnSpc>
+                          <a:spcPct val="115000"/>
+                        </a:lnSpc>
+                        <a:spcBef>
+                          <a:spcPts val="0"/>
+                        </a:spcBef>
+                        <a:spcAft>
+                          <a:spcPts val="0"/>
+                        </a:spcAft>
+                      </a:pPr>
+                      <a:r>
+                        <a:rPr lang="en-US" sz="1800" dirty="0">
+                          <a:latin typeface="Arial"/>
+                          <a:ea typeface="Arial"/>
+                          <a:cs typeface="Times New Roman"/>
+                        </a:rPr>
+                        <a:t>3/1/2019</a:t>
+                      </a:r>
+                    </a:p>
+                  </a:txBody>
+                  <a:tcPr marL="79353" marR="79353" marT="79353" marB="79353">
+                    <a:lnL w="12700" cap="flat" cmpd="sng" algn="ctr">
+                      <a:solidFill>
+                        <a:srgbClr val="9E9E9E"/>
+                      </a:solidFill>
+                      <a:prstDash val="solid"/>
+                      <a:round/>
+                      <a:headEnd type="none" w="med" len="med"/>
+                      <a:tailEnd type="none" w="med" len="med"/>
+                    </a:lnL>
+                    <a:lnR w="12700" cap="flat" cmpd="sng" algn="ctr">
+                      <a:solidFill>
+                        <a:srgbClr val="9E9E9E"/>
+                      </a:solidFill>
+                      <a:prstDash val="solid"/>
+                      <a:round/>
+                      <a:headEnd type="none" w="med" len="med"/>
+                      <a:tailEnd type="none" w="med" len="med"/>
+                    </a:lnR>
+                    <a:lnT w="12700" cap="flat" cmpd="sng" algn="ctr">
+                      <a:solidFill>
+                        <a:srgbClr val="9E9E9E"/>
+                      </a:solidFill>
+                      <a:prstDash val="solid"/>
+                      <a:round/>
+                      <a:headEnd type="none" w="med" len="med"/>
+                      <a:tailEnd type="none" w="med" len="med"/>
+                    </a:lnT>
+                    <a:lnB w="12700" cap="flat" cmpd="sng" algn="ctr">
+                      <a:solidFill>
+                        <a:srgbClr val="9E9E9E"/>
+                      </a:solidFill>
+                      <a:prstDash val="solid"/>
+                      <a:round/>
+                      <a:headEnd type="none" w="med" len="med"/>
+                      <a:tailEnd type="none" w="med" len="med"/>
+                    </a:lnB>
+                  </a:tcPr>
+                </a:tc>
+              </a:tr>
+              <a:tr h="360040">
+                <a:tc>
+                  <a:txBody>
+                    <a:bodyPr/>
+                    <a:lstStyle/>
+                    <a:p>
+                      <a:pPr marL="0" marR="0">
+                        <a:lnSpc>
+                          <a:spcPct val="115000"/>
+                        </a:lnSpc>
+                        <a:spcBef>
+                          <a:spcPts val="0"/>
+                        </a:spcBef>
+                        <a:spcAft>
+                          <a:spcPts val="0"/>
+                        </a:spcAft>
+                      </a:pPr>
+                      <a:r>
+                        <a:rPr lang="en-US" sz="1800" b="1" dirty="0">
+                          <a:latin typeface="Arial"/>
+                          <a:ea typeface="Arial"/>
+                          <a:cs typeface="Times New Roman"/>
+                        </a:rPr>
+                        <a:t>V2.5</a:t>
+                      </a:r>
+                      <a:endParaRPr lang="en-US" sz="1800" dirty="0">
+                        <a:latin typeface="Arial"/>
+                        <a:ea typeface="Arial"/>
+                        <a:cs typeface="Times New Roman"/>
+                      </a:endParaRPr>
+                    </a:p>
+                  </a:txBody>
+                  <a:tcPr marL="79353" marR="79353" marT="79353" marB="79353">
+                    <a:lnL w="12700" cap="flat" cmpd="sng" algn="ctr">
+                      <a:solidFill>
+                        <a:srgbClr val="9E9E9E"/>
+                      </a:solidFill>
+                      <a:prstDash val="solid"/>
+                      <a:round/>
+                      <a:headEnd type="none" w="med" len="med"/>
+                      <a:tailEnd type="none" w="med" len="med"/>
+                    </a:lnL>
+                    <a:lnR w="12700" cap="flat" cmpd="sng" algn="ctr">
+                      <a:solidFill>
+                        <a:srgbClr val="9E9E9E"/>
+                      </a:solidFill>
+                      <a:prstDash val="solid"/>
+                      <a:round/>
+                      <a:headEnd type="none" w="med" len="med"/>
+                      <a:tailEnd type="none" w="med" len="med"/>
+                    </a:lnR>
+                    <a:lnT w="12700" cap="flat" cmpd="sng" algn="ctr">
+                      <a:solidFill>
+                        <a:srgbClr val="9E9E9E"/>
+                      </a:solidFill>
+                      <a:prstDash val="solid"/>
+                      <a:round/>
+                      <a:headEnd type="none" w="med" len="med"/>
+                      <a:tailEnd type="none" w="med" len="med"/>
+                    </a:lnT>
+                    <a:lnB w="12700" cap="flat" cmpd="sng" algn="ctr">
+                      <a:solidFill>
+                        <a:srgbClr val="9E9E9E"/>
+                      </a:solidFill>
+                      <a:prstDash val="solid"/>
+                      <a:round/>
+                      <a:headEnd type="none" w="med" len="med"/>
+                      <a:tailEnd type="none" w="med" len="med"/>
+                    </a:lnB>
+                  </a:tcPr>
+                </a:tc>
+                <a:tc>
+                  <a:txBody>
+                    <a:bodyPr/>
+                    <a:lstStyle/>
+                    <a:p>
+                      <a:pPr marL="0" marR="0">
+                        <a:lnSpc>
+                          <a:spcPct val="115000"/>
+                        </a:lnSpc>
+                        <a:spcBef>
+                          <a:spcPts val="0"/>
+                        </a:spcBef>
+                        <a:spcAft>
+                          <a:spcPts val="0"/>
+                        </a:spcAft>
+                      </a:pPr>
+                      <a:r>
+                        <a:rPr lang="en-US" sz="1800">
+                          <a:latin typeface="Arial"/>
+                          <a:ea typeface="Arial"/>
+                          <a:cs typeface="Times New Roman"/>
+                        </a:rPr>
+                        <a:t>Change profile settings</a:t>
+                      </a:r>
+                      <a:endParaRPr lang="en-US" sz="2000">
+                        <a:latin typeface="Arial"/>
+                        <a:ea typeface="Arial"/>
+                        <a:cs typeface="Times New Roman"/>
+                      </a:endParaRPr>
+                    </a:p>
+                  </a:txBody>
+                  <a:tcPr marL="79353" marR="79353" marT="79353" marB="79353">
+                    <a:lnL w="12700" cap="flat" cmpd="sng" algn="ctr">
+                      <a:solidFill>
+                        <a:srgbClr val="9E9E9E"/>
+                      </a:solidFill>
+                      <a:prstDash val="solid"/>
+                      <a:round/>
+                      <a:headEnd type="none" w="med" len="med"/>
+                      <a:tailEnd type="none" w="med" len="med"/>
+                    </a:lnL>
+                    <a:lnR w="12700" cap="flat" cmpd="sng" algn="ctr">
+                      <a:solidFill>
+                        <a:srgbClr val="9E9E9E"/>
+                      </a:solidFill>
+                      <a:prstDash val="solid"/>
+                      <a:round/>
+                      <a:headEnd type="none" w="med" len="med"/>
+                      <a:tailEnd type="none" w="med" len="med"/>
+                    </a:lnR>
+                    <a:lnT w="12700" cap="flat" cmpd="sng" algn="ctr">
+                      <a:solidFill>
+                        <a:srgbClr val="9E9E9E"/>
+                      </a:solidFill>
+                      <a:prstDash val="solid"/>
+                      <a:round/>
+                      <a:headEnd type="none" w="med" len="med"/>
+                      <a:tailEnd type="none" w="med" len="med"/>
+                    </a:lnT>
+                    <a:lnB w="12700" cap="flat" cmpd="sng" algn="ctr">
+                      <a:solidFill>
+                        <a:srgbClr val="9E9E9E"/>
+                      </a:solidFill>
+                      <a:prstDash val="solid"/>
+                      <a:round/>
+                      <a:headEnd type="none" w="med" len="med"/>
+                      <a:tailEnd type="none" w="med" len="med"/>
+                    </a:lnB>
+                  </a:tcPr>
+                </a:tc>
+                <a:tc>
+                  <a:txBody>
+                    <a:bodyPr/>
+                    <a:lstStyle/>
+                    <a:p>
+                      <a:pPr marL="0" marR="0" algn="l">
+                        <a:lnSpc>
+                          <a:spcPct val="115000"/>
+                        </a:lnSpc>
+                        <a:spcBef>
+                          <a:spcPts val="0"/>
+                        </a:spcBef>
+                        <a:spcAft>
+                          <a:spcPts val="0"/>
+                        </a:spcAft>
+                      </a:pPr>
+                      <a:r>
+                        <a:rPr lang="en-US" sz="1800" dirty="0">
+                          <a:latin typeface="Arial"/>
+                          <a:ea typeface="Arial"/>
+                          <a:cs typeface="Times New Roman"/>
+                        </a:rPr>
+                        <a:t>6/1/2019</a:t>
+                      </a:r>
+                    </a:p>
+                  </a:txBody>
+                  <a:tcPr marL="79353" marR="79353" marT="79353" marB="79353">
+                    <a:lnL w="12700" cap="flat" cmpd="sng" algn="ctr">
+                      <a:solidFill>
+                        <a:srgbClr val="9E9E9E"/>
+                      </a:solidFill>
+                      <a:prstDash val="solid"/>
+                      <a:round/>
+                      <a:headEnd type="none" w="med" len="med"/>
+                      <a:tailEnd type="none" w="med" len="med"/>
+                    </a:lnL>
+                    <a:lnR w="12700" cap="flat" cmpd="sng" algn="ctr">
+                      <a:solidFill>
+                        <a:srgbClr val="9E9E9E"/>
+                      </a:solidFill>
+                      <a:prstDash val="solid"/>
+                      <a:round/>
+                      <a:headEnd type="none" w="med" len="med"/>
+                      <a:tailEnd type="none" w="med" len="med"/>
+                    </a:lnR>
+                    <a:lnT w="12700" cap="flat" cmpd="sng" algn="ctr">
+                      <a:solidFill>
+                        <a:srgbClr val="9E9E9E"/>
+                      </a:solidFill>
+                      <a:prstDash val="solid"/>
+                      <a:round/>
+                      <a:headEnd type="none" w="med" len="med"/>
+                      <a:tailEnd type="none" w="med" len="med"/>
+                    </a:lnT>
+                    <a:lnB w="12700" cap="flat" cmpd="sng" algn="ctr">
+                      <a:solidFill>
+                        <a:srgbClr val="9E9E9E"/>
+                      </a:solidFill>
+                      <a:prstDash val="solid"/>
+                      <a:round/>
+                      <a:headEnd type="none" w="med" len="med"/>
+                      <a:tailEnd type="none" w="med" len="med"/>
+                    </a:lnB>
+                  </a:tcPr>
+                </a:tc>
+              </a:tr>
+            </a:tbl>
+          </a:graphicData>
+        </a:graphic>
+      </p:graphicFrame>
     </p:spTree>
     <p:extLst>
       <p:ext uri="{BB962C8B-B14F-4D97-AF65-F5344CB8AC3E}">
-        <p14:creationId xmlns:p14="http://schemas.microsoft.com/office/powerpoint/2010/main" val="1625168946"/>
+        <p14:creationId xmlns:p14="http://schemas.microsoft.com/office/powerpoint/2010/main" xmlns="" val="1625168946"/>
       </p:ext>
     </p:extLst>
   </p:cSld>
   <p:clrMapOvr>
     <a:masterClrMapping/>
   </p:clrMapOvr>
+  <p:timing>
+    <p:tnLst>
+      <p:par>
+        <p:cTn id="1" dur="indefinite" restart="never" nodeType="tmRoot"/>
+      </p:par>
+    </p:tnLst>
+  </p:timing>
 </p:sld>
 </file>
 
@@ -8924,7 +10945,7 @@
     <p:bg>
       <p:bgPr>
         <a:blipFill dpi="0" rotWithShape="0">
-          <a:blip r:embed="rId2">
+          <a:blip r:embed="rId2" cstate="print">
             <a:lum/>
           </a:blip>
           <a:srcRect/>
@@ -8954,7 +10975,7 @@
           <p:cNvPr id="144386" name="Rectangle 2">
             <a:extLst>
               <a:ext uri="{FF2B5EF4-FFF2-40B4-BE49-F238E27FC236}">
-                <a16:creationId xmlns:a16="http://schemas.microsoft.com/office/drawing/2014/main" id="{B2EB9881-15D2-4027-87B7-1B2E12624292}"/>
+                <a16:creationId xmlns:a16="http://schemas.microsoft.com/office/drawing/2014/main" xmlns="" id="{B2EB9881-15D2-4027-87B7-1B2E12624292}"/>
               </a:ext>
             </a:extLst>
           </p:cNvPr>
@@ -8980,6 +11001,15 @@
               </a:rPr>
               <a:t>System Usability Scale </a:t>
             </a:r>
+            <a:r>
+              <a:rPr lang="el-GR" dirty="0">
+                <a:solidFill>
+                  <a:schemeClr val="bg1"/>
+                </a:solidFill>
+                <a:latin typeface="Bookman Old Style" panose="02050604050505020204" pitchFamily="18" charset="0"/>
+              </a:rPr>
+              <a:t/>
+            </a:r>
             <a:br>
               <a:rPr lang="el-GR" dirty="0">
                 <a:solidFill>
@@ -8989,13 +11019,22 @@
               </a:rPr>
             </a:br>
             <a:r>
-              <a:rPr lang="en" dirty="0">
+              <a:rPr lang="en" dirty="0" smtClean="0">
                 <a:solidFill>
                   <a:schemeClr val="bg1"/>
                 </a:solidFill>
                 <a:latin typeface="Bookman Old Style" panose="02050604050505020204" pitchFamily="18" charset="0"/>
               </a:rPr>
               <a:t>SUS</a:t>
+            </a:r>
+            <a:r>
+              <a:rPr lang="el-GR" dirty="0" smtClean="0">
+                <a:solidFill>
+                  <a:schemeClr val="bg1"/>
+                </a:solidFill>
+                <a:latin typeface="Bookman Old Style" panose="02050604050505020204" pitchFamily="18" charset="0"/>
+              </a:rPr>
+              <a:t> (1/2)</a:t>
             </a:r>
             <a:endParaRPr lang="el-GR" altLang="el-GR" dirty="0">
               <a:solidFill>
@@ -9006,68 +11045,77 @@
           </a:p>
         </p:txBody>
       </p:sp>
+      <p:pic>
+        <p:nvPicPr>
+          <p:cNvPr id="4" name="image4.png"/>
+          <p:cNvPicPr/>
+          <p:nvPr/>
+        </p:nvPicPr>
+        <p:blipFill>
+          <a:blip r:embed="rId3" cstate="print"/>
+          <a:srcRect/>
+          <a:stretch>
+            <a:fillRect/>
+          </a:stretch>
+        </p:blipFill>
+        <p:spPr>
+          <a:xfrm>
+            <a:off x="1043608" y="2636912"/>
+            <a:ext cx="6653213" cy="3590925"/>
+          </a:xfrm>
+          <a:prstGeom prst="rect">
+            <a:avLst/>
+          </a:prstGeom>
+          <a:ln/>
+        </p:spPr>
+      </p:pic>
       <p:sp>
         <p:nvSpPr>
-          <p:cNvPr id="2" name="Ορθογώνιο 1">
-            <a:extLst>
-              <a:ext uri="{FF2B5EF4-FFF2-40B4-BE49-F238E27FC236}">
-                <a16:creationId xmlns:a16="http://schemas.microsoft.com/office/drawing/2014/main" id="{7C7B8017-EC96-4686-A821-7348D3493D8E}"/>
-              </a:ext>
-            </a:extLst>
-          </p:cNvPr>
-          <p:cNvSpPr/>
+          <p:cNvPr id="5" name="TextBox 4"/>
+          <p:cNvSpPr txBox="1"/>
           <p:nvPr/>
         </p:nvSpPr>
         <p:spPr>
           <a:xfrm>
-            <a:off x="179512" y="1643548"/>
-            <a:ext cx="8856984" cy="584775"/>
+            <a:off x="611560" y="1844824"/>
+            <a:ext cx="2232248" cy="369332"/>
           </a:xfrm>
           <a:prstGeom prst="rect">
             <a:avLst/>
           </a:prstGeom>
+          <a:noFill/>
         </p:spPr>
         <p:txBody>
-          <a:bodyPr wrap="square">
+          <a:bodyPr wrap="square" rtlCol="0">
             <a:spAutoFit/>
           </a:bodyPr>
           <a:lstStyle/>
           <a:p>
-            <a:pPr marL="457200" lvl="0" indent="-381000">
-              <a:spcBef>
-                <a:spcPts val="0"/>
-              </a:spcBef>
-              <a:spcAft>
-                <a:spcPts val="0"/>
-              </a:spcAft>
-              <a:buClr>
-                <a:schemeClr val="dk1"/>
-              </a:buClr>
-              <a:buSzPts val="2400"/>
-              <a:buChar char="●"/>
-            </a:pPr>
-            <a:r>
-              <a:rPr lang="en-US" sz="3200" dirty="0">
-                <a:solidFill>
-                  <a:schemeClr val="dk1"/>
-                </a:solidFill>
-                <a:latin typeface="Bookman Old Style" panose="02050604050505020204" pitchFamily="18" charset="0"/>
-              </a:rPr>
-              <a:t>H</a:t>
-            </a:r>
+            <a:r>
+              <a:rPr lang="el-GR" dirty="0" smtClean="0"/>
+              <a:t>Θετικές ερωτήσεις</a:t>
+            </a:r>
+            <a:endParaRPr lang="en-US" dirty="0"/>
           </a:p>
         </p:txBody>
       </p:sp>
     </p:spTree>
     <p:extLst>
       <p:ext uri="{BB962C8B-B14F-4D97-AF65-F5344CB8AC3E}">
-        <p14:creationId xmlns:p14="http://schemas.microsoft.com/office/powerpoint/2010/main" val="1229389099"/>
+        <p14:creationId xmlns:p14="http://schemas.microsoft.com/office/powerpoint/2010/main" xmlns="" val="1229389099"/>
       </p:ext>
     </p:extLst>
   </p:cSld>
   <p:clrMapOvr>
     <a:masterClrMapping/>
   </p:clrMapOvr>
+  <p:timing>
+    <p:tnLst>
+      <p:par>
+        <p:cTn id="1" dur="indefinite" restart="never" nodeType="tmRoot"/>
+      </p:par>
+    </p:tnLst>
+  </p:timing>
 </p:sld>
 </file>
 
@@ -9077,7 +11125,7 @@
     <p:bg>
       <p:bgPr>
         <a:blipFill dpi="0" rotWithShape="0">
-          <a:blip r:embed="rId2">
+          <a:blip r:embed="rId2" cstate="print">
             <a:lum/>
           </a:blip>
           <a:srcRect/>
@@ -9107,7 +11155,7 @@
           <p:cNvPr id="144386" name="Rectangle 2">
             <a:extLst>
               <a:ext uri="{FF2B5EF4-FFF2-40B4-BE49-F238E27FC236}">
-                <a16:creationId xmlns:a16="http://schemas.microsoft.com/office/drawing/2014/main" id="{B2EB9881-15D2-4027-87B7-1B2E12624292}"/>
+                <a16:creationId xmlns:a16="http://schemas.microsoft.com/office/drawing/2014/main" xmlns="" id="{B2EB9881-15D2-4027-87B7-1B2E12624292}"/>
               </a:ext>
             </a:extLst>
           </p:cNvPr>
@@ -9125,13 +11173,48 @@
           <a:p>
             <a:pPr algn="l"/>
             <a:r>
-              <a:rPr lang="en-US" altLang="el-GR" dirty="0">
+              <a:rPr lang="en" dirty="0">
                 <a:solidFill>
                   <a:schemeClr val="bg1"/>
                 </a:solidFill>
                 <a:latin typeface="Bookman Old Style" panose="02050604050505020204" pitchFamily="18" charset="0"/>
               </a:rPr>
-              <a:t>Google analytics 1/4</a:t>
+              <a:t>System Usability Scale </a:t>
+            </a:r>
+            <a:r>
+              <a:rPr lang="el-GR" dirty="0">
+                <a:solidFill>
+                  <a:schemeClr val="bg1"/>
+                </a:solidFill>
+                <a:latin typeface="Bookman Old Style" panose="02050604050505020204" pitchFamily="18" charset="0"/>
+              </a:rPr>
+              <a:t/>
+            </a:r>
+            <a:br>
+              <a:rPr lang="el-GR" dirty="0">
+                <a:solidFill>
+                  <a:schemeClr val="bg1"/>
+                </a:solidFill>
+                <a:latin typeface="Bookman Old Style" panose="02050604050505020204" pitchFamily="18" charset="0"/>
+              </a:rPr>
+            </a:br>
+            <a:r>
+              <a:rPr lang="en" dirty="0" smtClean="0">
+                <a:solidFill>
+                  <a:schemeClr val="bg1"/>
+                </a:solidFill>
+                <a:latin typeface="Bookman Old Style" panose="02050604050505020204" pitchFamily="18" charset="0"/>
+              </a:rPr>
+              <a:t>SUS</a:t>
+            </a:r>
+            <a:r>
+              <a:rPr lang="el-GR" dirty="0" smtClean="0">
+                <a:solidFill>
+                  <a:schemeClr val="bg1"/>
+                </a:solidFill>
+                <a:latin typeface="Bookman Old Style" panose="02050604050505020204" pitchFamily="18" charset="0"/>
+              </a:rPr>
+              <a:t> (2/2)</a:t>
             </a:r>
             <a:endParaRPr lang="el-GR" altLang="el-GR" dirty="0">
               <a:solidFill>
@@ -9142,52 +11225,77 @@
           </a:p>
         </p:txBody>
       </p:sp>
+      <p:sp>
+        <p:nvSpPr>
+          <p:cNvPr id="5" name="TextBox 4"/>
+          <p:cNvSpPr txBox="1"/>
+          <p:nvPr/>
+        </p:nvSpPr>
+        <p:spPr>
+          <a:xfrm>
+            <a:off x="611560" y="1844824"/>
+            <a:ext cx="2448272" cy="369332"/>
+          </a:xfrm>
+          <a:prstGeom prst="rect">
+            <a:avLst/>
+          </a:prstGeom>
+          <a:noFill/>
+        </p:spPr>
+        <p:txBody>
+          <a:bodyPr wrap="square" rtlCol="0">
+            <a:spAutoFit/>
+          </a:bodyPr>
+          <a:lstStyle/>
+          <a:p>
+            <a:r>
+              <a:rPr lang="el-GR" dirty="0" smtClean="0"/>
+              <a:t>Αρνητικές ερωτήσεις</a:t>
+            </a:r>
+            <a:endParaRPr lang="en-US" dirty="0"/>
+          </a:p>
+        </p:txBody>
+      </p:sp>
       <p:pic>
         <p:nvPicPr>
-          <p:cNvPr id="3" name="Εικόνα 2">
-            <a:extLst>
-              <a:ext uri="{FF2B5EF4-FFF2-40B4-BE49-F238E27FC236}">
-                <a16:creationId xmlns:a16="http://schemas.microsoft.com/office/drawing/2014/main" id="{CBE286AE-7413-4716-B3EB-DDF5DD358E81}"/>
-              </a:ext>
-            </a:extLst>
-          </p:cNvPr>
-          <p:cNvPicPr>
-            <a:picLocks noChangeAspect="1"/>
-          </p:cNvPicPr>
+          <p:cNvPr id="6" name="image3.png"/>
+          <p:cNvPicPr/>
           <p:nvPr/>
         </p:nvPicPr>
         <p:blipFill>
-          <a:blip r:embed="rId3">
-            <a:extLst>
-              <a:ext uri="{28A0092B-C50C-407E-A947-70E740481C1C}">
-                <a14:useLocalDpi xmlns:a14="http://schemas.microsoft.com/office/drawing/2010/main" val="0"/>
-              </a:ext>
-            </a:extLst>
-          </a:blip>
+          <a:blip r:embed="rId3" cstate="print"/>
+          <a:srcRect/>
           <a:stretch>
             <a:fillRect/>
           </a:stretch>
         </p:blipFill>
         <p:spPr>
           <a:xfrm>
-            <a:off x="0" y="2601348"/>
-            <a:ext cx="9144000" cy="2195804"/>
+            <a:off x="1043608" y="2852936"/>
+            <a:ext cx="6724650" cy="3262313"/>
           </a:xfrm>
           <a:prstGeom prst="rect">
             <a:avLst/>
           </a:prstGeom>
+          <a:ln/>
         </p:spPr>
       </p:pic>
     </p:spTree>
     <p:extLst>
       <p:ext uri="{BB962C8B-B14F-4D97-AF65-F5344CB8AC3E}">
-        <p14:creationId xmlns:p14="http://schemas.microsoft.com/office/powerpoint/2010/main" val="1894443459"/>
+        <p14:creationId xmlns:p14="http://schemas.microsoft.com/office/powerpoint/2010/main" xmlns="" val="1229389099"/>
       </p:ext>
     </p:extLst>
   </p:cSld>
   <p:clrMapOvr>
     <a:masterClrMapping/>
   </p:clrMapOvr>
+  <p:timing>
+    <p:tnLst>
+      <p:par>
+        <p:cTn id="1" dur="indefinite" restart="never" nodeType="tmRoot"/>
+      </p:par>
+    </p:tnLst>
+  </p:timing>
 </p:sld>
 </file>
 
@@ -9197,7 +11305,7 @@
     <p:bg>
       <p:bgPr>
         <a:blipFill dpi="0" rotWithShape="0">
-          <a:blip r:embed="rId2">
+          <a:blip r:embed="rId2" cstate="print">
             <a:lum/>
           </a:blip>
           <a:srcRect/>
@@ -9227,7 +11335,7 @@
           <p:cNvPr id="144386" name="Rectangle 2">
             <a:extLst>
               <a:ext uri="{FF2B5EF4-FFF2-40B4-BE49-F238E27FC236}">
-                <a16:creationId xmlns:a16="http://schemas.microsoft.com/office/drawing/2014/main" id="{B2EB9881-15D2-4027-87B7-1B2E12624292}"/>
+                <a16:creationId xmlns:a16="http://schemas.microsoft.com/office/drawing/2014/main" xmlns="" id="{B2EB9881-15D2-4027-87B7-1B2E12624292}"/>
               </a:ext>
             </a:extLst>
           </p:cNvPr>
@@ -9251,7 +11359,7 @@
                 </a:solidFill>
                 <a:latin typeface="Bookman Old Style" panose="02050604050505020204" pitchFamily="18" charset="0"/>
               </a:rPr>
-              <a:t>Google analytics 2/4</a:t>
+              <a:t>Google analytics 1/4</a:t>
             </a:r>
             <a:endParaRPr lang="el-GR" altLang="el-GR" dirty="0">
               <a:solidFill>
@@ -9264,10 +11372,10 @@
       </p:sp>
       <p:pic>
         <p:nvPicPr>
-          <p:cNvPr id="4" name="Εικόνα 3" descr="Εικόνα που περιέχει κείμενο, χάρτης&#10;&#10;Η περιγραφή δημιουργήθηκε με υψηλή αξιοπιστία">
+          <p:cNvPr id="3" name="Εικόνα 2">
             <a:extLst>
               <a:ext uri="{FF2B5EF4-FFF2-40B4-BE49-F238E27FC236}">
-                <a16:creationId xmlns:a16="http://schemas.microsoft.com/office/drawing/2014/main" id="{2FDD032F-3B38-43CB-8351-1C8DBF673831}"/>
+                <a16:creationId xmlns:a16="http://schemas.microsoft.com/office/drawing/2014/main" xmlns="" id="{CBE286AE-7413-4716-B3EB-DDF5DD358E81}"/>
               </a:ext>
             </a:extLst>
           </p:cNvPr>
@@ -9277,10 +11385,10 @@
           <p:nvPr/>
         </p:nvPicPr>
         <p:blipFill>
-          <a:blip r:embed="rId3">
+          <a:blip r:embed="rId3" cstate="print">
             <a:extLst>
               <a:ext uri="{28A0092B-C50C-407E-A947-70E740481C1C}">
-                <a14:useLocalDpi xmlns:a14="http://schemas.microsoft.com/office/drawing/2010/main" val="0"/>
+                <a14:useLocalDpi xmlns:a14="http://schemas.microsoft.com/office/drawing/2010/main" xmlns="" val="0"/>
               </a:ext>
             </a:extLst>
           </a:blip>
@@ -9290,8 +11398,8 @@
         </p:blipFill>
         <p:spPr>
           <a:xfrm>
-            <a:off x="0" y="2823867"/>
-            <a:ext cx="9144000" cy="3735658"/>
+            <a:off x="0" y="2601348"/>
+            <a:ext cx="9144000" cy="2195804"/>
           </a:xfrm>
           <a:prstGeom prst="rect">
             <a:avLst/>
@@ -9301,7 +11409,7 @@
     </p:spTree>
     <p:extLst>
       <p:ext uri="{BB962C8B-B14F-4D97-AF65-F5344CB8AC3E}">
-        <p14:creationId xmlns:p14="http://schemas.microsoft.com/office/powerpoint/2010/main" val="613517467"/>
+        <p14:creationId xmlns:p14="http://schemas.microsoft.com/office/powerpoint/2010/main" xmlns="" val="1894443459"/>
       </p:ext>
     </p:extLst>
   </p:cSld>
@@ -9317,7 +11425,7 @@
     <p:bg>
       <p:bgPr>
         <a:blipFill dpi="0" rotWithShape="0">
-          <a:blip r:embed="rId2">
+          <a:blip r:embed="rId2" cstate="print">
             <a:lum/>
           </a:blip>
           <a:srcRect/>
@@ -9347,7 +11455,7 @@
           <p:cNvPr id="144386" name="Rectangle 2">
             <a:extLst>
               <a:ext uri="{FF2B5EF4-FFF2-40B4-BE49-F238E27FC236}">
-                <a16:creationId xmlns:a16="http://schemas.microsoft.com/office/drawing/2014/main" id="{B2EB9881-15D2-4027-87B7-1B2E12624292}"/>
+                <a16:creationId xmlns:a16="http://schemas.microsoft.com/office/drawing/2014/main" xmlns="" id="{B2EB9881-15D2-4027-87B7-1B2E12624292}"/>
               </a:ext>
             </a:extLst>
           </p:cNvPr>
@@ -9371,7 +11479,7 @@
                 </a:solidFill>
                 <a:latin typeface="Bookman Old Style" panose="02050604050505020204" pitchFamily="18" charset="0"/>
               </a:rPr>
-              <a:t>Google analytics 3/4</a:t>
+              <a:t>Google analytics 2/4</a:t>
             </a:r>
             <a:endParaRPr lang="el-GR" altLang="el-GR" dirty="0">
               <a:solidFill>
@@ -9384,10 +11492,10 @@
       </p:sp>
       <p:pic>
         <p:nvPicPr>
-          <p:cNvPr id="3" name="Εικόνα 2" descr="Εικόνα που περιέχει στιγμιότυπο οθόνης&#10;&#10;Η περιγραφή δημιουργήθηκε με πολύ υψηλή αξιοπιστία">
+          <p:cNvPr id="4" name="Εικόνα 3" descr="Εικόνα που περιέχει κείμενο, χάρτης&#10;&#10;Η περιγραφή δημιουργήθηκε με υψηλή αξιοπιστία">
             <a:extLst>
               <a:ext uri="{FF2B5EF4-FFF2-40B4-BE49-F238E27FC236}">
-                <a16:creationId xmlns:a16="http://schemas.microsoft.com/office/drawing/2014/main" id="{A7357758-41B9-4251-9161-0F20075C2B14}"/>
+                <a16:creationId xmlns:a16="http://schemas.microsoft.com/office/drawing/2014/main" xmlns="" id="{2FDD032F-3B38-43CB-8351-1C8DBF673831}"/>
               </a:ext>
             </a:extLst>
           </p:cNvPr>
@@ -9397,10 +11505,10 @@
           <p:nvPr/>
         </p:nvPicPr>
         <p:blipFill>
-          <a:blip r:embed="rId3">
+          <a:blip r:embed="rId3" cstate="print">
             <a:extLst>
               <a:ext uri="{28A0092B-C50C-407E-A947-70E740481C1C}">
-                <a14:useLocalDpi xmlns:a14="http://schemas.microsoft.com/office/drawing/2010/main" val="0"/>
+                <a14:useLocalDpi xmlns:a14="http://schemas.microsoft.com/office/drawing/2010/main" xmlns="" val="0"/>
               </a:ext>
             </a:extLst>
           </a:blip>
@@ -9410,8 +11518,8 @@
         </p:blipFill>
         <p:spPr>
           <a:xfrm>
-            <a:off x="0" y="2191836"/>
-            <a:ext cx="9144000" cy="4391526"/>
+            <a:off x="0" y="2823867"/>
+            <a:ext cx="9144000" cy="3735658"/>
           </a:xfrm>
           <a:prstGeom prst="rect">
             <a:avLst/>
@@ -9421,7 +11529,7 @@
     </p:spTree>
     <p:extLst>
       <p:ext uri="{BB962C8B-B14F-4D97-AF65-F5344CB8AC3E}">
-        <p14:creationId xmlns:p14="http://schemas.microsoft.com/office/powerpoint/2010/main" val="178851854"/>
+        <p14:creationId xmlns:p14="http://schemas.microsoft.com/office/powerpoint/2010/main" xmlns="" val="613517467"/>
       </p:ext>
     </p:extLst>
   </p:cSld>
@@ -9437,7 +11545,7 @@
     <p:bg>
       <p:bgPr>
         <a:blipFill dpi="0" rotWithShape="0">
-          <a:blip r:embed="rId2">
+          <a:blip r:embed="rId2" cstate="print">
             <a:lum/>
           </a:blip>
           <a:srcRect/>
@@ -9467,7 +11575,7 @@
           <p:cNvPr id="144386" name="Rectangle 2">
             <a:extLst>
               <a:ext uri="{FF2B5EF4-FFF2-40B4-BE49-F238E27FC236}">
-                <a16:creationId xmlns:a16="http://schemas.microsoft.com/office/drawing/2014/main" id="{B2EB9881-15D2-4027-87B7-1B2E12624292}"/>
+                <a16:creationId xmlns:a16="http://schemas.microsoft.com/office/drawing/2014/main" xmlns="" id="{B2EB9881-15D2-4027-87B7-1B2E12624292}"/>
               </a:ext>
             </a:extLst>
           </p:cNvPr>
@@ -9491,7 +11599,7 @@
                 </a:solidFill>
                 <a:latin typeface="Bookman Old Style" panose="02050604050505020204" pitchFamily="18" charset="0"/>
               </a:rPr>
-              <a:t>Google analytics 4/4</a:t>
+              <a:t>Google analytics 3/4</a:t>
             </a:r>
             <a:endParaRPr lang="el-GR" altLang="el-GR" dirty="0">
               <a:solidFill>
@@ -9504,10 +11612,10 @@
       </p:sp>
       <p:pic>
         <p:nvPicPr>
-          <p:cNvPr id="4" name="Εικόνα 3">
+          <p:cNvPr id="3" name="Εικόνα 2" descr="Εικόνα που περιέχει στιγμιότυπο οθόνης&#10;&#10;Η περιγραφή δημιουργήθηκε με πολύ υψηλή αξιοπιστία">
             <a:extLst>
               <a:ext uri="{FF2B5EF4-FFF2-40B4-BE49-F238E27FC236}">
-                <a16:creationId xmlns:a16="http://schemas.microsoft.com/office/drawing/2014/main" id="{AB6F6696-1F79-48CF-95A7-33DDC06B88E8}"/>
+                <a16:creationId xmlns:a16="http://schemas.microsoft.com/office/drawing/2014/main" xmlns="" id="{A7357758-41B9-4251-9161-0F20075C2B14}"/>
               </a:ext>
             </a:extLst>
           </p:cNvPr>
@@ -9517,10 +11625,10 @@
           <p:nvPr/>
         </p:nvPicPr>
         <p:blipFill>
-          <a:blip r:embed="rId3">
+          <a:blip r:embed="rId3" cstate="print">
             <a:extLst>
               <a:ext uri="{28A0092B-C50C-407E-A947-70E740481C1C}">
-                <a14:useLocalDpi xmlns:a14="http://schemas.microsoft.com/office/drawing/2010/main" val="0"/>
+                <a14:useLocalDpi xmlns:a14="http://schemas.microsoft.com/office/drawing/2010/main" xmlns="" val="0"/>
               </a:ext>
             </a:extLst>
           </a:blip>
@@ -9530,8 +11638,8 @@
         </p:blipFill>
         <p:spPr>
           <a:xfrm>
-            <a:off x="0" y="2132856"/>
-            <a:ext cx="9144000" cy="4450506"/>
+            <a:off x="0" y="2191836"/>
+            <a:ext cx="9144000" cy="4391526"/>
           </a:xfrm>
           <a:prstGeom prst="rect">
             <a:avLst/>
@@ -9541,7 +11649,7 @@
     </p:spTree>
     <p:extLst>
       <p:ext uri="{BB962C8B-B14F-4D97-AF65-F5344CB8AC3E}">
-        <p14:creationId xmlns:p14="http://schemas.microsoft.com/office/powerpoint/2010/main" val="2068208576"/>
+        <p14:creationId xmlns:p14="http://schemas.microsoft.com/office/powerpoint/2010/main" xmlns="" val="178851854"/>
       </p:ext>
     </p:extLst>
   </p:cSld>
@@ -9557,7 +11665,7 @@
     <p:bg>
       <p:bgPr>
         <a:blipFill dpi="0" rotWithShape="0">
-          <a:blip r:embed="rId2">
+          <a:blip r:embed="rId2" cstate="print">
             <a:lum/>
           </a:blip>
           <a:srcRect/>
@@ -9587,7 +11695,7 @@
           <p:cNvPr id="144386" name="Rectangle 2">
             <a:extLst>
               <a:ext uri="{FF2B5EF4-FFF2-40B4-BE49-F238E27FC236}">
-                <a16:creationId xmlns:a16="http://schemas.microsoft.com/office/drawing/2014/main" id="{B2EB9881-15D2-4027-87B7-1B2E12624292}"/>
+                <a16:creationId xmlns:a16="http://schemas.microsoft.com/office/drawing/2014/main" xmlns="" id="{B2EB9881-15D2-4027-87B7-1B2E12624292}"/>
               </a:ext>
             </a:extLst>
           </p:cNvPr>
@@ -9598,12 +11706,7 @@
             <p:ph type="title"/>
           </p:nvPr>
         </p:nvSpPr>
-        <p:spPr>
-          <a:xfrm>
-            <a:off x="457200" y="274638"/>
-            <a:ext cx="8229600" cy="1143000"/>
-          </a:xfrm>
-        </p:spPr>
+        <p:spPr/>
         <p:txBody>
           <a:bodyPr/>
           <a:lstStyle/>
@@ -9616,7 +11719,7 @@
                 </a:solidFill>
                 <a:latin typeface="Bookman Old Style" panose="02050604050505020204" pitchFamily="18" charset="0"/>
               </a:rPr>
-              <a:t>Vega Security platform</a:t>
+              <a:t>Google analytics 4/4</a:t>
             </a:r>
             <a:endParaRPr lang="el-GR" altLang="el-GR" dirty="0">
               <a:solidFill>
@@ -9629,10 +11732,10 @@
       </p:sp>
       <p:pic>
         <p:nvPicPr>
-          <p:cNvPr id="6" name="Εικόνα 5">
+          <p:cNvPr id="4" name="Εικόνα 3">
             <a:extLst>
               <a:ext uri="{FF2B5EF4-FFF2-40B4-BE49-F238E27FC236}">
-                <a16:creationId xmlns:a16="http://schemas.microsoft.com/office/drawing/2014/main" id="{597EFF02-63A7-4B57-BA26-D7C9E1B099D2}"/>
+                <a16:creationId xmlns:a16="http://schemas.microsoft.com/office/drawing/2014/main" xmlns="" id="{AB6F6696-1F79-48CF-95A7-33DDC06B88E8}"/>
               </a:ext>
             </a:extLst>
           </p:cNvPr>
@@ -9642,75 +11745,21 @@
           <p:nvPr/>
         </p:nvPicPr>
         <p:blipFill>
-          <a:blip r:embed="rId3"/>
+          <a:blip r:embed="rId3" cstate="print">
+            <a:extLst>
+              <a:ext uri="{28A0092B-C50C-407E-A947-70E740481C1C}">
+                <a14:useLocalDpi xmlns:a14="http://schemas.microsoft.com/office/drawing/2010/main" xmlns="" val="0"/>
+              </a:ext>
+            </a:extLst>
+          </a:blip>
           <a:stretch>
             <a:fillRect/>
           </a:stretch>
         </p:blipFill>
         <p:spPr>
           <a:xfrm>
-            <a:off x="6804248" y="2060848"/>
-            <a:ext cx="2181529" cy="933580"/>
-          </a:xfrm>
-          <a:prstGeom prst="rect">
-            <a:avLst/>
-          </a:prstGeom>
-        </p:spPr>
-      </p:pic>
-      <p:pic>
-        <p:nvPicPr>
-          <p:cNvPr id="7" name="Εικόνα 6">
-            <a:extLst>
-              <a:ext uri="{FF2B5EF4-FFF2-40B4-BE49-F238E27FC236}">
-                <a16:creationId xmlns:a16="http://schemas.microsoft.com/office/drawing/2014/main" id="{E3558EA8-960B-4AE6-9E85-725908EE801A}"/>
-              </a:ext>
-            </a:extLst>
-          </p:cNvPr>
-          <p:cNvPicPr>
-            <a:picLocks noChangeAspect="1"/>
-          </p:cNvPicPr>
-          <p:nvPr/>
-        </p:nvPicPr>
-        <p:blipFill>
-          <a:blip r:embed="rId4"/>
-          <a:stretch>
-            <a:fillRect/>
-          </a:stretch>
-        </p:blipFill>
-        <p:spPr>
-          <a:xfrm>
-            <a:off x="395537" y="1700808"/>
-            <a:ext cx="2340072" cy="4860150"/>
-          </a:xfrm>
-          <a:prstGeom prst="rect">
-            <a:avLst/>
-          </a:prstGeom>
-        </p:spPr>
-      </p:pic>
-      <p:pic>
-        <p:nvPicPr>
-          <p:cNvPr id="9" name="Εικόνα 8">
-            <a:extLst>
-              <a:ext uri="{FF2B5EF4-FFF2-40B4-BE49-F238E27FC236}">
-                <a16:creationId xmlns:a16="http://schemas.microsoft.com/office/drawing/2014/main" id="{085544D1-D21E-4054-8142-68211766E179}"/>
-              </a:ext>
-            </a:extLst>
-          </p:cNvPr>
-          <p:cNvPicPr>
-            <a:picLocks noChangeAspect="1"/>
-          </p:cNvPicPr>
-          <p:nvPr/>
-        </p:nvPicPr>
-        <p:blipFill>
-          <a:blip r:embed="rId5"/>
-          <a:stretch>
-            <a:fillRect/>
-          </a:stretch>
-        </p:blipFill>
-        <p:spPr>
-          <a:xfrm>
-            <a:off x="3347419" y="2852936"/>
-            <a:ext cx="5578017" cy="2664296"/>
+            <a:off x="0" y="2132856"/>
+            <a:ext cx="9144000" cy="4450506"/>
           </a:xfrm>
           <a:prstGeom prst="rect">
             <a:avLst/>
@@ -9720,7 +11769,7 @@
     </p:spTree>
     <p:extLst>
       <p:ext uri="{BB962C8B-B14F-4D97-AF65-F5344CB8AC3E}">
-        <p14:creationId xmlns:p14="http://schemas.microsoft.com/office/powerpoint/2010/main" val="152443888"/>
+        <p14:creationId xmlns:p14="http://schemas.microsoft.com/office/powerpoint/2010/main" xmlns="" val="2068208576"/>
       </p:ext>
     </p:extLst>
   </p:cSld>
@@ -9736,7 +11785,7 @@
     <p:bg>
       <p:bgPr>
         <a:blipFill dpi="0" rotWithShape="0">
-          <a:blip r:embed="rId2">
+          <a:blip r:embed="rId2" cstate="print">
             <a:lum/>
           </a:blip>
           <a:srcRect/>
@@ -9766,7 +11815,7 @@
           <p:cNvPr id="144386" name="Rectangle 2">
             <a:extLst>
               <a:ext uri="{FF2B5EF4-FFF2-40B4-BE49-F238E27FC236}">
-                <a16:creationId xmlns:a16="http://schemas.microsoft.com/office/drawing/2014/main" id="{B2EB9881-15D2-4027-87B7-1B2E12624292}"/>
+                <a16:creationId xmlns:a16="http://schemas.microsoft.com/office/drawing/2014/main" xmlns="" id="{B2EB9881-15D2-4027-87B7-1B2E12624292}"/>
               </a:ext>
             </a:extLst>
           </p:cNvPr>
@@ -9811,7 +11860,7 @@
           <p:cNvPr id="6" name="Εικόνα 5">
             <a:extLst>
               <a:ext uri="{FF2B5EF4-FFF2-40B4-BE49-F238E27FC236}">
-                <a16:creationId xmlns:a16="http://schemas.microsoft.com/office/drawing/2014/main" id="{597EFF02-63A7-4B57-BA26-D7C9E1B099D2}"/>
+                <a16:creationId xmlns:a16="http://schemas.microsoft.com/office/drawing/2014/main" xmlns="" id="{597EFF02-63A7-4B57-BA26-D7C9E1B099D2}"/>
               </a:ext>
             </a:extLst>
           </p:cNvPr>
@@ -9821,7 +11870,7 @@
           <p:nvPr/>
         </p:nvPicPr>
         <p:blipFill>
-          <a:blip r:embed="rId3"/>
+          <a:blip r:embed="rId3" cstate="print"/>
           <a:stretch>
             <a:fillRect/>
           </a:stretch>
@@ -9838,10 +11887,10 @@
       </p:pic>
       <p:pic>
         <p:nvPicPr>
-          <p:cNvPr id="2" name="Εικόνα 1">
+          <p:cNvPr id="7" name="Εικόνα 6">
             <a:extLst>
               <a:ext uri="{FF2B5EF4-FFF2-40B4-BE49-F238E27FC236}">
-                <a16:creationId xmlns:a16="http://schemas.microsoft.com/office/drawing/2014/main" id="{40E2FC4B-7414-4922-B240-24B4E198883D}"/>
+                <a16:creationId xmlns:a16="http://schemas.microsoft.com/office/drawing/2014/main" xmlns="" id="{E3558EA8-960B-4AE6-9E85-725908EE801A}"/>
               </a:ext>
             </a:extLst>
           </p:cNvPr>
@@ -9851,15 +11900,45 @@
           <p:nvPr/>
         </p:nvPicPr>
         <p:blipFill>
-          <a:blip r:embed="rId4"/>
+          <a:blip r:embed="rId4" cstate="print"/>
           <a:stretch>
             <a:fillRect/>
           </a:stretch>
         </p:blipFill>
         <p:spPr>
           <a:xfrm>
-            <a:off x="486571" y="2435970"/>
-            <a:ext cx="8216946" cy="3312368"/>
+            <a:off x="395537" y="1700808"/>
+            <a:ext cx="2340072" cy="4860150"/>
+          </a:xfrm>
+          <a:prstGeom prst="rect">
+            <a:avLst/>
+          </a:prstGeom>
+        </p:spPr>
+      </p:pic>
+      <p:pic>
+        <p:nvPicPr>
+          <p:cNvPr id="9" name="Εικόνα 8">
+            <a:extLst>
+              <a:ext uri="{FF2B5EF4-FFF2-40B4-BE49-F238E27FC236}">
+                <a16:creationId xmlns:a16="http://schemas.microsoft.com/office/drawing/2014/main" xmlns="" id="{085544D1-D21E-4054-8142-68211766E179}"/>
+              </a:ext>
+            </a:extLst>
+          </p:cNvPr>
+          <p:cNvPicPr>
+            <a:picLocks noChangeAspect="1"/>
+          </p:cNvPicPr>
+          <p:nvPr/>
+        </p:nvPicPr>
+        <p:blipFill>
+          <a:blip r:embed="rId5" cstate="print"/>
+          <a:stretch>
+            <a:fillRect/>
+          </a:stretch>
+        </p:blipFill>
+        <p:spPr>
+          <a:xfrm>
+            <a:off x="3347419" y="2852936"/>
+            <a:ext cx="5578017" cy="2664296"/>
           </a:xfrm>
           <a:prstGeom prst="rect">
             <a:avLst/>
@@ -9869,7 +11948,7 @@
     </p:spTree>
     <p:extLst>
       <p:ext uri="{BB962C8B-B14F-4D97-AF65-F5344CB8AC3E}">
-        <p14:creationId xmlns:p14="http://schemas.microsoft.com/office/powerpoint/2010/main" val="2991606545"/>
+        <p14:creationId xmlns:p14="http://schemas.microsoft.com/office/powerpoint/2010/main" xmlns="" val="152443888"/>
       </p:ext>
     </p:extLst>
   </p:cSld>
@@ -9885,7 +11964,7 @@
     <p:bg>
       <p:bgPr>
         <a:blipFill dpi="0" rotWithShape="0">
-          <a:blip r:embed="rId2">
+          <a:blip r:embed="rId2" cstate="print">
             <a:lum/>
           </a:blip>
           <a:srcRect/>
@@ -9915,7 +11994,7 @@
           <p:cNvPr id="6" name="Google Shape;73;p16">
             <a:extLst>
               <a:ext uri="{FF2B5EF4-FFF2-40B4-BE49-F238E27FC236}">
-                <a16:creationId xmlns:a16="http://schemas.microsoft.com/office/drawing/2014/main" id="{C5ED6A7E-9836-424E-919F-E6DBC25355EF}"/>
+                <a16:creationId xmlns:a16="http://schemas.microsoft.com/office/drawing/2014/main" xmlns="" id="{C5ED6A7E-9836-424E-919F-E6DBC25355EF}"/>
               </a:ext>
             </a:extLst>
           </p:cNvPr>
@@ -9923,7 +12002,7 @@
           <p:nvPr/>
         </p:nvPicPr>
         <p:blipFill>
-          <a:blip r:embed="rId3">
+          <a:blip r:embed="rId3" cstate="print">
             <a:alphaModFix/>
           </a:blip>
           <a:stretch>
@@ -9949,7 +12028,7 @@
           <p:cNvPr id="9" name="Rectangle 2">
             <a:extLst>
               <a:ext uri="{FF2B5EF4-FFF2-40B4-BE49-F238E27FC236}">
-                <a16:creationId xmlns:a16="http://schemas.microsoft.com/office/drawing/2014/main" id="{3FD37A60-A0D2-4C70-ACB2-00BD410C124D}"/>
+                <a16:creationId xmlns:a16="http://schemas.microsoft.com/office/drawing/2014/main" xmlns="" id="{3FD37A60-A0D2-4C70-ACB2-00BD410C124D}"/>
               </a:ext>
             </a:extLst>
           </p:cNvPr>
@@ -9988,7 +12067,156 @@
     </p:spTree>
     <p:extLst>
       <p:ext uri="{BB962C8B-B14F-4D97-AF65-F5344CB8AC3E}">
-        <p14:creationId xmlns:p14="http://schemas.microsoft.com/office/powerpoint/2010/main" val="3223945246"/>
+        <p14:creationId xmlns:p14="http://schemas.microsoft.com/office/powerpoint/2010/main" xmlns="" val="3223945246"/>
+      </p:ext>
+    </p:extLst>
+  </p:cSld>
+  <p:clrMapOvr>
+    <a:masterClrMapping/>
+  </p:clrMapOvr>
+</p:sld>
+</file>
+
+<file path=ppt/slides/slide30.xml><?xml version="1.0" encoding="utf-8"?>
+<p:sld xmlns:a="http://schemas.openxmlformats.org/drawingml/2006/main" xmlns:r="http://schemas.openxmlformats.org/officeDocument/2006/relationships" xmlns:p="http://schemas.openxmlformats.org/presentationml/2006/main">
+  <p:cSld>
+    <p:bg>
+      <p:bgPr>
+        <a:blipFill dpi="0" rotWithShape="0">
+          <a:blip r:embed="rId2" cstate="print">
+            <a:lum/>
+          </a:blip>
+          <a:srcRect/>
+          <a:stretch>
+            <a:fillRect/>
+          </a:stretch>
+        </a:blipFill>
+        <a:effectLst/>
+      </p:bgPr>
+    </p:bg>
+    <p:spTree>
+      <p:nvGrpSpPr>
+        <p:cNvPr id="1" name=""/>
+        <p:cNvGrpSpPr/>
+        <p:nvPr/>
+      </p:nvGrpSpPr>
+      <p:grpSpPr>
+        <a:xfrm>
+          <a:off x="0" y="0"/>
+          <a:ext cx="0" cy="0"/>
+          <a:chOff x="0" y="0"/>
+          <a:chExt cx="0" cy="0"/>
+        </a:xfrm>
+      </p:grpSpPr>
+      <p:sp>
+        <p:nvSpPr>
+          <p:cNvPr id="144386" name="Rectangle 2">
+            <a:extLst>
+              <a:ext uri="{FF2B5EF4-FFF2-40B4-BE49-F238E27FC236}">
+                <a16:creationId xmlns:a16="http://schemas.microsoft.com/office/drawing/2014/main" xmlns="" id="{B2EB9881-15D2-4027-87B7-1B2E12624292}"/>
+              </a:ext>
+            </a:extLst>
+          </p:cNvPr>
+          <p:cNvSpPr>
+            <a:spLocks noGrp="1" noChangeArrowheads="1"/>
+          </p:cNvSpPr>
+          <p:nvPr>
+            <p:ph type="title"/>
+          </p:nvPr>
+        </p:nvSpPr>
+        <p:spPr>
+          <a:xfrm>
+            <a:off x="457200" y="274638"/>
+            <a:ext cx="8229600" cy="1143000"/>
+          </a:xfrm>
+        </p:spPr>
+        <p:txBody>
+          <a:bodyPr/>
+          <a:lstStyle/>
+          <a:p>
+            <a:pPr algn="l"/>
+            <a:r>
+              <a:rPr lang="en-US" altLang="el-GR" dirty="0">
+                <a:solidFill>
+                  <a:schemeClr val="bg1"/>
+                </a:solidFill>
+                <a:latin typeface="Bookman Old Style" panose="02050604050505020204" pitchFamily="18" charset="0"/>
+              </a:rPr>
+              <a:t>Vega Security platform</a:t>
+            </a:r>
+            <a:endParaRPr lang="el-GR" altLang="el-GR" dirty="0">
+              <a:solidFill>
+                <a:schemeClr val="bg1"/>
+              </a:solidFill>
+              <a:latin typeface="Bookman Old Style" panose="02050604050505020204" pitchFamily="18" charset="0"/>
+            </a:endParaRPr>
+          </a:p>
+        </p:txBody>
+      </p:sp>
+      <p:pic>
+        <p:nvPicPr>
+          <p:cNvPr id="6" name="Εικόνα 5">
+            <a:extLst>
+              <a:ext uri="{FF2B5EF4-FFF2-40B4-BE49-F238E27FC236}">
+                <a16:creationId xmlns:a16="http://schemas.microsoft.com/office/drawing/2014/main" xmlns="" id="{597EFF02-63A7-4B57-BA26-D7C9E1B099D2}"/>
+              </a:ext>
+            </a:extLst>
+          </p:cNvPr>
+          <p:cNvPicPr>
+            <a:picLocks noChangeAspect="1"/>
+          </p:cNvPicPr>
+          <p:nvPr/>
+        </p:nvPicPr>
+        <p:blipFill>
+          <a:blip r:embed="rId3" cstate="print"/>
+          <a:stretch>
+            <a:fillRect/>
+          </a:stretch>
+        </p:blipFill>
+        <p:spPr>
+          <a:xfrm>
+            <a:off x="6804248" y="2060848"/>
+            <a:ext cx="2181529" cy="933580"/>
+          </a:xfrm>
+          <a:prstGeom prst="rect">
+            <a:avLst/>
+          </a:prstGeom>
+        </p:spPr>
+      </p:pic>
+      <p:pic>
+        <p:nvPicPr>
+          <p:cNvPr id="2" name="Εικόνα 1">
+            <a:extLst>
+              <a:ext uri="{FF2B5EF4-FFF2-40B4-BE49-F238E27FC236}">
+                <a16:creationId xmlns:a16="http://schemas.microsoft.com/office/drawing/2014/main" xmlns="" id="{40E2FC4B-7414-4922-B240-24B4E198883D}"/>
+              </a:ext>
+            </a:extLst>
+          </p:cNvPr>
+          <p:cNvPicPr>
+            <a:picLocks noChangeAspect="1"/>
+          </p:cNvPicPr>
+          <p:nvPr/>
+        </p:nvPicPr>
+        <p:blipFill>
+          <a:blip r:embed="rId4" cstate="print"/>
+          <a:stretch>
+            <a:fillRect/>
+          </a:stretch>
+        </p:blipFill>
+        <p:spPr>
+          <a:xfrm>
+            <a:off x="486571" y="2435970"/>
+            <a:ext cx="8216946" cy="3312368"/>
+          </a:xfrm>
+          <a:prstGeom prst="rect">
+            <a:avLst/>
+          </a:prstGeom>
+        </p:spPr>
+      </p:pic>
+    </p:spTree>
+    <p:extLst>
+      <p:ext uri="{BB962C8B-B14F-4D97-AF65-F5344CB8AC3E}">
+        <p14:creationId xmlns:p14="http://schemas.microsoft.com/office/powerpoint/2010/main" xmlns="" val="2991606545"/>
       </p:ext>
     </p:extLst>
   </p:cSld>
@@ -10004,7 +12232,7 @@
     <p:bg>
       <p:bgPr>
         <a:blipFill dpi="0" rotWithShape="0">
-          <a:blip r:embed="rId2">
+          <a:blip r:embed="rId2" cstate="print">
             <a:lum/>
           </a:blip>
           <a:srcRect/>
@@ -10034,7 +12262,7 @@
           <p:cNvPr id="9" name="Google Shape;80;p17">
             <a:extLst>
               <a:ext uri="{FF2B5EF4-FFF2-40B4-BE49-F238E27FC236}">
-                <a16:creationId xmlns:a16="http://schemas.microsoft.com/office/drawing/2014/main" id="{72EF1FA3-8F9E-42FF-8893-A7E07073CE3D}"/>
+                <a16:creationId xmlns:a16="http://schemas.microsoft.com/office/drawing/2014/main" xmlns="" id="{72EF1FA3-8F9E-42FF-8893-A7E07073CE3D}"/>
               </a:ext>
             </a:extLst>
           </p:cNvPr>
@@ -10046,7 +12274,7 @@
           </p:nvPr>
         </p:nvPicPr>
         <p:blipFill>
-          <a:blip r:embed="rId3">
+          <a:blip r:embed="rId3" cstate="print">
             <a:alphaModFix/>
           </a:blip>
           <a:stretch>
@@ -10072,7 +12300,7 @@
           <p:cNvPr id="7" name="Τίτλος 6">
             <a:extLst>
               <a:ext uri="{FF2B5EF4-FFF2-40B4-BE49-F238E27FC236}">
-                <a16:creationId xmlns:a16="http://schemas.microsoft.com/office/drawing/2014/main" id="{14230427-7098-4F32-9447-3F93314407C4}"/>
+                <a16:creationId xmlns:a16="http://schemas.microsoft.com/office/drawing/2014/main" xmlns="" id="{14230427-7098-4F32-9447-3F93314407C4}"/>
               </a:ext>
             </a:extLst>
           </p:cNvPr>
@@ -10095,7 +12323,7 @@
     </p:spTree>
     <p:extLst>
       <p:ext uri="{BB962C8B-B14F-4D97-AF65-F5344CB8AC3E}">
-        <p14:creationId xmlns:p14="http://schemas.microsoft.com/office/powerpoint/2010/main" val="3197026872"/>
+        <p14:creationId xmlns:p14="http://schemas.microsoft.com/office/powerpoint/2010/main" xmlns="" val="3197026872"/>
       </p:ext>
     </p:extLst>
   </p:cSld>
@@ -10111,7 +12339,7 @@
     <p:bg>
       <p:bgPr>
         <a:blipFill dpi="0" rotWithShape="0">
-          <a:blip r:embed="rId2">
+          <a:blip r:embed="rId2" cstate="print">
             <a:lum/>
           </a:blip>
           <a:srcRect/>
@@ -10141,7 +12369,7 @@
           <p:cNvPr id="144386" name="Rectangle 2">
             <a:extLst>
               <a:ext uri="{FF2B5EF4-FFF2-40B4-BE49-F238E27FC236}">
-                <a16:creationId xmlns:a16="http://schemas.microsoft.com/office/drawing/2014/main" id="{B2EB9881-15D2-4027-87B7-1B2E12624292}"/>
+                <a16:creationId xmlns:a16="http://schemas.microsoft.com/office/drawing/2014/main" xmlns="" id="{B2EB9881-15D2-4027-87B7-1B2E12624292}"/>
               </a:ext>
             </a:extLst>
           </p:cNvPr>
@@ -10206,7 +12434,7 @@
           <p:cNvPr id="2" name="Εικόνα 1">
             <a:extLst>
               <a:ext uri="{FF2B5EF4-FFF2-40B4-BE49-F238E27FC236}">
-                <a16:creationId xmlns:a16="http://schemas.microsoft.com/office/drawing/2014/main" id="{96929277-298A-45DC-88A5-C72840CE2832}"/>
+                <a16:creationId xmlns:a16="http://schemas.microsoft.com/office/drawing/2014/main" xmlns="" id="{96929277-298A-45DC-88A5-C72840CE2832}"/>
               </a:ext>
             </a:extLst>
           </p:cNvPr>
@@ -10216,7 +12444,7 @@
           <p:nvPr/>
         </p:nvPicPr>
         <p:blipFill>
-          <a:blip r:embed="rId3"/>
+          <a:blip r:embed="rId3" cstate="print"/>
           <a:stretch>
             <a:fillRect/>
           </a:stretch>
@@ -10234,7 +12462,7 @@
     </p:spTree>
     <p:extLst>
       <p:ext uri="{BB962C8B-B14F-4D97-AF65-F5344CB8AC3E}">
-        <p14:creationId xmlns:p14="http://schemas.microsoft.com/office/powerpoint/2010/main" val="4265258759"/>
+        <p14:creationId xmlns:p14="http://schemas.microsoft.com/office/powerpoint/2010/main" xmlns="" val="4265258759"/>
       </p:ext>
     </p:extLst>
   </p:cSld>
@@ -10250,7 +12478,7 @@
     <p:bg>
       <p:bgPr>
         <a:blipFill dpi="0" rotWithShape="0">
-          <a:blip r:embed="rId2">
+          <a:blip r:embed="rId2" cstate="print">
             <a:lum/>
           </a:blip>
           <a:srcRect/>
@@ -10280,7 +12508,7 @@
           <p:cNvPr id="144386" name="Rectangle 2">
             <a:extLst>
               <a:ext uri="{FF2B5EF4-FFF2-40B4-BE49-F238E27FC236}">
-                <a16:creationId xmlns:a16="http://schemas.microsoft.com/office/drawing/2014/main" id="{B2EB9881-15D2-4027-87B7-1B2E12624292}"/>
+                <a16:creationId xmlns:a16="http://schemas.microsoft.com/office/drawing/2014/main" xmlns="" id="{B2EB9881-15D2-4027-87B7-1B2E12624292}"/>
               </a:ext>
             </a:extLst>
           </p:cNvPr>
@@ -10345,7 +12573,7 @@
           <p:cNvPr id="6" name="Google Shape;94;p19">
             <a:extLst>
               <a:ext uri="{FF2B5EF4-FFF2-40B4-BE49-F238E27FC236}">
-                <a16:creationId xmlns:a16="http://schemas.microsoft.com/office/drawing/2014/main" id="{F2ACC44A-E547-4763-B494-B0FDB4E6E195}"/>
+                <a16:creationId xmlns:a16="http://schemas.microsoft.com/office/drawing/2014/main" xmlns="" id="{F2ACC44A-E547-4763-B494-B0FDB4E6E195}"/>
               </a:ext>
             </a:extLst>
           </p:cNvPr>
@@ -10353,7 +12581,7 @@
           <p:nvPr/>
         </p:nvPicPr>
         <p:blipFill>
-          <a:blip r:embed="rId3">
+          <a:blip r:embed="rId3" cstate="print">
             <a:alphaModFix/>
           </a:blip>
           <a:stretch>
@@ -10379,7 +12607,7 @@
           <p:cNvPr id="7" name="Google Shape;95;p19">
             <a:extLst>
               <a:ext uri="{FF2B5EF4-FFF2-40B4-BE49-F238E27FC236}">
-                <a16:creationId xmlns:a16="http://schemas.microsoft.com/office/drawing/2014/main" id="{C9F505FC-03D9-4D39-BD12-CAB88219AC4D}"/>
+                <a16:creationId xmlns:a16="http://schemas.microsoft.com/office/drawing/2014/main" xmlns="" id="{C9F505FC-03D9-4D39-BD12-CAB88219AC4D}"/>
               </a:ext>
             </a:extLst>
           </p:cNvPr>
@@ -10387,7 +12615,7 @@
           <p:nvPr/>
         </p:nvPicPr>
         <p:blipFill>
-          <a:blip r:embed="rId4">
+          <a:blip r:embed="rId4" cstate="print">
             <a:alphaModFix/>
           </a:blip>
           <a:stretch>
@@ -10413,7 +12641,7 @@
           <p:cNvPr id="8" name="Google Shape;96;p19">
             <a:extLst>
               <a:ext uri="{FF2B5EF4-FFF2-40B4-BE49-F238E27FC236}">
-                <a16:creationId xmlns:a16="http://schemas.microsoft.com/office/drawing/2014/main" id="{5B3F483A-A7E9-4395-B98E-FC233459D500}"/>
+                <a16:creationId xmlns:a16="http://schemas.microsoft.com/office/drawing/2014/main" xmlns="" id="{5B3F483A-A7E9-4395-B98E-FC233459D500}"/>
               </a:ext>
             </a:extLst>
           </p:cNvPr>
@@ -10445,7 +12673,7 @@
     </p:spTree>
     <p:extLst>
       <p:ext uri="{BB962C8B-B14F-4D97-AF65-F5344CB8AC3E}">
-        <p14:creationId xmlns:p14="http://schemas.microsoft.com/office/powerpoint/2010/main" val="117583826"/>
+        <p14:creationId xmlns:p14="http://schemas.microsoft.com/office/powerpoint/2010/main" xmlns="" val="117583826"/>
       </p:ext>
     </p:extLst>
   </p:cSld>
@@ -10461,7 +12689,7 @@
     <p:bg>
       <p:bgPr>
         <a:blipFill dpi="0" rotWithShape="0">
-          <a:blip r:embed="rId2">
+          <a:blip r:embed="rId2" cstate="print">
             <a:lum/>
           </a:blip>
           <a:srcRect/>
@@ -10491,7 +12719,7 @@
           <p:cNvPr id="144386" name="Rectangle 2">
             <a:extLst>
               <a:ext uri="{FF2B5EF4-FFF2-40B4-BE49-F238E27FC236}">
-                <a16:creationId xmlns:a16="http://schemas.microsoft.com/office/drawing/2014/main" id="{B2EB9881-15D2-4027-87B7-1B2E12624292}"/>
+                <a16:creationId xmlns:a16="http://schemas.microsoft.com/office/drawing/2014/main" xmlns="" id="{B2EB9881-15D2-4027-87B7-1B2E12624292}"/>
               </a:ext>
             </a:extLst>
           </p:cNvPr>
@@ -10556,7 +12784,7 @@
           <p:cNvPr id="4" name="Εικόνα 3">
             <a:extLst>
               <a:ext uri="{FF2B5EF4-FFF2-40B4-BE49-F238E27FC236}">
-                <a16:creationId xmlns:a16="http://schemas.microsoft.com/office/drawing/2014/main" id="{9FF2CFDE-33A6-4743-B1CF-0DADF05DE1CF}"/>
+                <a16:creationId xmlns:a16="http://schemas.microsoft.com/office/drawing/2014/main" xmlns="" id="{9FF2CFDE-33A6-4743-B1CF-0DADF05DE1CF}"/>
               </a:ext>
             </a:extLst>
           </p:cNvPr>
@@ -10566,7 +12794,7 @@
           <p:nvPr/>
         </p:nvPicPr>
         <p:blipFill>
-          <a:blip r:embed="rId3"/>
+          <a:blip r:embed="rId3" cstate="print"/>
           <a:stretch>
             <a:fillRect/>
           </a:stretch>
@@ -10584,7 +12812,7 @@
     </p:spTree>
     <p:extLst>
       <p:ext uri="{BB962C8B-B14F-4D97-AF65-F5344CB8AC3E}">
-        <p14:creationId xmlns:p14="http://schemas.microsoft.com/office/powerpoint/2010/main" val="660903979"/>
+        <p14:creationId xmlns:p14="http://schemas.microsoft.com/office/powerpoint/2010/main" xmlns="" val="660903979"/>
       </p:ext>
     </p:extLst>
   </p:cSld>
@@ -10616,7 +12844,7 @@
           <p:cNvPr id="144386" name="Rectangle 2">
             <a:extLst>
               <a:ext uri="{FF2B5EF4-FFF2-40B4-BE49-F238E27FC236}">
-                <a16:creationId xmlns:a16="http://schemas.microsoft.com/office/drawing/2014/main" id="{B2EB9881-15D2-4027-87B7-1B2E12624292}"/>
+                <a16:creationId xmlns:a16="http://schemas.microsoft.com/office/drawing/2014/main" xmlns="" id="{B2EB9881-15D2-4027-87B7-1B2E12624292}"/>
               </a:ext>
             </a:extLst>
           </p:cNvPr>
@@ -10681,7 +12909,7 @@
           <p:cNvPr id="5" name="Google Shape;111;p21">
             <a:extLst>
               <a:ext uri="{FF2B5EF4-FFF2-40B4-BE49-F238E27FC236}">
-                <a16:creationId xmlns:a16="http://schemas.microsoft.com/office/drawing/2014/main" id="{3BC97FB7-40C7-478B-A15A-855F48B11FAE}"/>
+                <a16:creationId xmlns:a16="http://schemas.microsoft.com/office/drawing/2014/main" xmlns="" id="{3BC97FB7-40C7-478B-A15A-855F48B11FAE}"/>
               </a:ext>
             </a:extLst>
           </p:cNvPr>
@@ -10689,7 +12917,7 @@
           <p:nvPr/>
         </p:nvPicPr>
         <p:blipFill>
-          <a:blip r:embed="rId2">
+          <a:blip r:embed="rId2" cstate="print">
             <a:alphaModFix/>
           </a:blip>
           <a:stretch>
@@ -10715,7 +12943,7 @@
           <p:cNvPr id="6" name="Google Shape;112;p21">
             <a:extLst>
               <a:ext uri="{FF2B5EF4-FFF2-40B4-BE49-F238E27FC236}">
-                <a16:creationId xmlns:a16="http://schemas.microsoft.com/office/drawing/2014/main" id="{579E7F43-5DF3-4043-B53A-B4C0F1BD7F91}"/>
+                <a16:creationId xmlns:a16="http://schemas.microsoft.com/office/drawing/2014/main" xmlns="" id="{579E7F43-5DF3-4043-B53A-B4C0F1BD7F91}"/>
               </a:ext>
             </a:extLst>
           </p:cNvPr>
@@ -10723,7 +12951,7 @@
           <p:nvPr/>
         </p:nvPicPr>
         <p:blipFill>
-          <a:blip r:embed="rId3">
+          <a:blip r:embed="rId3" cstate="print">
             <a:alphaModFix/>
           </a:blip>
           <a:stretch>
@@ -10749,7 +12977,7 @@
           <p:cNvPr id="7" name="Google Shape;113;p21">
             <a:extLst>
               <a:ext uri="{FF2B5EF4-FFF2-40B4-BE49-F238E27FC236}">
-                <a16:creationId xmlns:a16="http://schemas.microsoft.com/office/drawing/2014/main" id="{CD467801-E869-419C-9026-21B20796CB32}"/>
+                <a16:creationId xmlns:a16="http://schemas.microsoft.com/office/drawing/2014/main" xmlns="" id="{CD467801-E869-419C-9026-21B20796CB32}"/>
               </a:ext>
             </a:extLst>
           </p:cNvPr>
@@ -10757,7 +12985,7 @@
           <p:nvPr/>
         </p:nvPicPr>
         <p:blipFill>
-          <a:blip r:embed="rId4">
+          <a:blip r:embed="rId4" cstate="print">
             <a:alphaModFix/>
           </a:blip>
           <a:stretch>
@@ -10783,7 +13011,7 @@
           <p:cNvPr id="8" name="Google Shape;114;p21">
             <a:extLst>
               <a:ext uri="{FF2B5EF4-FFF2-40B4-BE49-F238E27FC236}">
-                <a16:creationId xmlns:a16="http://schemas.microsoft.com/office/drawing/2014/main" id="{DDA37945-AC35-4CC5-8583-D750910E3D2D}"/>
+                <a16:creationId xmlns:a16="http://schemas.microsoft.com/office/drawing/2014/main" xmlns="" id="{DDA37945-AC35-4CC5-8583-D750910E3D2D}"/>
               </a:ext>
             </a:extLst>
           </p:cNvPr>
@@ -10817,7 +13045,7 @@
           <p:cNvPr id="9" name="Google Shape;115;p21">
             <a:extLst>
               <a:ext uri="{FF2B5EF4-FFF2-40B4-BE49-F238E27FC236}">
-                <a16:creationId xmlns:a16="http://schemas.microsoft.com/office/drawing/2014/main" id="{CFEED652-E06E-44D8-9A13-CC1B453BBE36}"/>
+                <a16:creationId xmlns:a16="http://schemas.microsoft.com/office/drawing/2014/main" xmlns="" id="{CFEED652-E06E-44D8-9A13-CC1B453BBE36}"/>
               </a:ext>
             </a:extLst>
           </p:cNvPr>
@@ -10850,7 +13078,7 @@
     </p:spTree>
     <p:extLst>
       <p:ext uri="{BB962C8B-B14F-4D97-AF65-F5344CB8AC3E}">
-        <p14:creationId xmlns:p14="http://schemas.microsoft.com/office/powerpoint/2010/main" val="3269342577"/>
+        <p14:creationId xmlns:p14="http://schemas.microsoft.com/office/powerpoint/2010/main" xmlns="" val="3269342577"/>
       </p:ext>
     </p:extLst>
   </p:cSld>
@@ -10866,7 +13094,7 @@
     <p:bg>
       <p:bgPr>
         <a:blipFill dpi="0" rotWithShape="0">
-          <a:blip r:embed="rId2">
+          <a:blip r:embed="rId2" cstate="print">
             <a:lum/>
           </a:blip>
           <a:srcRect/>
@@ -10896,7 +13124,7 @@
           <p:cNvPr id="144386" name="Rectangle 2">
             <a:extLst>
               <a:ext uri="{FF2B5EF4-FFF2-40B4-BE49-F238E27FC236}">
-                <a16:creationId xmlns:a16="http://schemas.microsoft.com/office/drawing/2014/main" id="{B2EB9881-15D2-4027-87B7-1B2E12624292}"/>
+                <a16:creationId xmlns:a16="http://schemas.microsoft.com/office/drawing/2014/main" xmlns="" id="{B2EB9881-15D2-4027-87B7-1B2E12624292}"/>
               </a:ext>
             </a:extLst>
           </p:cNvPr>
@@ -10961,7 +13189,7 @@
           <p:cNvPr id="6" name="Google Shape;123;p22">
             <a:extLst>
               <a:ext uri="{FF2B5EF4-FFF2-40B4-BE49-F238E27FC236}">
-                <a16:creationId xmlns:a16="http://schemas.microsoft.com/office/drawing/2014/main" id="{4F163C71-9728-4CFE-9387-8B9E2887DEB9}"/>
+                <a16:creationId xmlns:a16="http://schemas.microsoft.com/office/drawing/2014/main" xmlns="" id="{4F163C71-9728-4CFE-9387-8B9E2887DEB9}"/>
               </a:ext>
             </a:extLst>
           </p:cNvPr>
@@ -10969,7 +13197,7 @@
           <p:nvPr/>
         </p:nvPicPr>
         <p:blipFill>
-          <a:blip r:embed="rId3">
+          <a:blip r:embed="rId3" cstate="print">
             <a:alphaModFix/>
           </a:blip>
           <a:stretch>
@@ -10995,7 +13223,7 @@
           <p:cNvPr id="8" name="Google Shape;111;p21">
             <a:extLst>
               <a:ext uri="{FF2B5EF4-FFF2-40B4-BE49-F238E27FC236}">
-                <a16:creationId xmlns:a16="http://schemas.microsoft.com/office/drawing/2014/main" id="{1D60BD48-9154-46F2-A573-60BF6A55A60F}"/>
+                <a16:creationId xmlns:a16="http://schemas.microsoft.com/office/drawing/2014/main" xmlns="" id="{1D60BD48-9154-46F2-A573-60BF6A55A60F}"/>
               </a:ext>
             </a:extLst>
           </p:cNvPr>
@@ -11003,7 +13231,7 @@
           <p:nvPr/>
         </p:nvPicPr>
         <p:blipFill>
-          <a:blip r:embed="rId4">
+          <a:blip r:embed="rId4" cstate="print">
             <a:alphaModFix/>
           </a:blip>
           <a:stretch>
@@ -11029,7 +13257,7 @@
           <p:cNvPr id="7" name="Google Shape;124;p22">
             <a:extLst>
               <a:ext uri="{FF2B5EF4-FFF2-40B4-BE49-F238E27FC236}">
-                <a16:creationId xmlns:a16="http://schemas.microsoft.com/office/drawing/2014/main" id="{EBB3BB1F-3E07-4A0E-8B75-2DA5ACE61583}"/>
+                <a16:creationId xmlns:a16="http://schemas.microsoft.com/office/drawing/2014/main" xmlns="" id="{EBB3BB1F-3E07-4A0E-8B75-2DA5ACE61583}"/>
               </a:ext>
             </a:extLst>
           </p:cNvPr>
@@ -11061,7 +13289,7 @@
     </p:spTree>
     <p:extLst>
       <p:ext uri="{BB962C8B-B14F-4D97-AF65-F5344CB8AC3E}">
-        <p14:creationId xmlns:p14="http://schemas.microsoft.com/office/powerpoint/2010/main" val="2932668258"/>
+        <p14:creationId xmlns:p14="http://schemas.microsoft.com/office/powerpoint/2010/main" xmlns="" val="2932668258"/>
       </p:ext>
     </p:extLst>
   </p:cSld>
@@ -11759,7 +13987,7 @@
   </a:extraClrSchemeLst>
   <a:extLst>
     <a:ext uri="{05A4C25C-085E-4340-85A3-A5531E510DB2}">
-      <thm15:themeFamily xmlns:thm15="http://schemas.microsoft.com/office/thememl/2012/main" name="Office Theme" id="{62F939B6-93AF-4DB8-9C6B-D6C7DFDC589F}" vid="{4A3C46E8-61CC-4603-A589-7422A47A8E4A}"/>
+      <thm15:themeFamily xmlns:thm15="http://schemas.microsoft.com/office/thememl/2012/main" xmlns="" name="Office Theme" id="{62F939B6-93AF-4DB8-9C6B-D6C7DFDC589F}" vid="{4A3C46E8-61CC-4603-A589-7422A47A8E4A}"/>
     </a:ext>
   </a:extLst>
 </a:theme>

</xml_diff>